<commit_message>
Update project plan. (Kaii)
</commit_message>
<xml_diff>
--- a/PCB/02 Plans & Actuals/2.1_Project Plan/Project Plan_(presentation)v0.1.pptx
+++ b/PCB/02 Plans & Actuals/2.1_Project Plan/Project Plan_(presentation)v0.1.pptx
@@ -13,8 +13,12 @@
     <p:sldId id="261" r:id="rId7"/>
     <p:sldId id="262" r:id="rId8"/>
     <p:sldId id="263" r:id="rId9"/>
-    <p:sldId id="264" r:id="rId10"/>
-    <p:sldId id="265" r:id="rId11"/>
+    <p:sldId id="266" r:id="rId10"/>
+    <p:sldId id="267" r:id="rId11"/>
+    <p:sldId id="268" r:id="rId12"/>
+    <p:sldId id="269" r:id="rId13"/>
+    <p:sldId id="270" r:id="rId14"/>
+    <p:sldId id="265" r:id="rId15"/>
   </p:sldIdLst>
   <p:sldSz cx="9144000" cy="6858000" type="screen4x3"/>
   <p:notesSz cx="6858000" cy="9144000"/>
@@ -863,6 +867,753 @@
 </dgm:colorsDef>
 </file>
 
+<file path=ppt/diagrams/colors2.xml><?xml version="1.0" encoding="utf-8"?>
+<dgm:colorsDef xmlns:dgm="http://schemas.openxmlformats.org/drawingml/2006/diagram" xmlns:a="http://schemas.openxmlformats.org/drawingml/2006/main" uniqueId="urn:microsoft.com/office/officeart/2005/8/colors/accent1_2">
+  <dgm:title val=""/>
+  <dgm:desc val=""/>
+  <dgm:catLst>
+    <dgm:cat type="accent1" pri="11200"/>
+  </dgm:catLst>
+  <dgm:styleLbl name="node0">
+    <dgm:fillClrLst meth="repeat">
+      <a:schemeClr val="accent1"/>
+    </dgm:fillClrLst>
+    <dgm:linClrLst meth="repeat">
+      <a:schemeClr val="lt1"/>
+    </dgm:linClrLst>
+    <dgm:effectClrLst/>
+    <dgm:txLinClrLst/>
+    <dgm:txFillClrLst/>
+    <dgm:txEffectClrLst/>
+  </dgm:styleLbl>
+  <dgm:styleLbl name="alignNode1">
+    <dgm:fillClrLst meth="repeat">
+      <a:schemeClr val="accent1"/>
+    </dgm:fillClrLst>
+    <dgm:linClrLst meth="repeat">
+      <a:schemeClr val="accent1"/>
+    </dgm:linClrLst>
+    <dgm:effectClrLst/>
+    <dgm:txLinClrLst/>
+    <dgm:txFillClrLst/>
+    <dgm:txEffectClrLst/>
+  </dgm:styleLbl>
+  <dgm:styleLbl name="node1">
+    <dgm:fillClrLst meth="repeat">
+      <a:schemeClr val="accent1"/>
+    </dgm:fillClrLst>
+    <dgm:linClrLst meth="repeat">
+      <a:schemeClr val="lt1"/>
+    </dgm:linClrLst>
+    <dgm:effectClrLst/>
+    <dgm:txLinClrLst/>
+    <dgm:txFillClrLst/>
+    <dgm:txEffectClrLst/>
+  </dgm:styleLbl>
+  <dgm:styleLbl name="lnNode1">
+    <dgm:fillClrLst meth="repeat">
+      <a:schemeClr val="accent1"/>
+    </dgm:fillClrLst>
+    <dgm:linClrLst meth="repeat">
+      <a:schemeClr val="lt1"/>
+    </dgm:linClrLst>
+    <dgm:effectClrLst/>
+    <dgm:txLinClrLst/>
+    <dgm:txFillClrLst/>
+    <dgm:txEffectClrLst/>
+  </dgm:styleLbl>
+  <dgm:styleLbl name="vennNode1">
+    <dgm:fillClrLst meth="repeat">
+      <a:schemeClr val="accent1">
+        <a:alpha val="50000"/>
+      </a:schemeClr>
+    </dgm:fillClrLst>
+    <dgm:linClrLst meth="repeat">
+      <a:schemeClr val="lt1"/>
+    </dgm:linClrLst>
+    <dgm:effectClrLst/>
+    <dgm:txLinClrLst/>
+    <dgm:txFillClrLst/>
+    <dgm:txEffectClrLst/>
+  </dgm:styleLbl>
+  <dgm:styleLbl name="node2">
+    <dgm:fillClrLst meth="repeat">
+      <a:schemeClr val="accent1"/>
+    </dgm:fillClrLst>
+    <dgm:linClrLst meth="repeat">
+      <a:schemeClr val="lt1"/>
+    </dgm:linClrLst>
+    <dgm:effectClrLst/>
+    <dgm:txLinClrLst/>
+    <dgm:txFillClrLst/>
+    <dgm:txEffectClrLst/>
+  </dgm:styleLbl>
+  <dgm:styleLbl name="node3">
+    <dgm:fillClrLst meth="repeat">
+      <a:schemeClr val="accent1"/>
+    </dgm:fillClrLst>
+    <dgm:linClrLst meth="repeat">
+      <a:schemeClr val="lt1"/>
+    </dgm:linClrLst>
+    <dgm:effectClrLst/>
+    <dgm:txLinClrLst/>
+    <dgm:txFillClrLst/>
+    <dgm:txEffectClrLst/>
+  </dgm:styleLbl>
+  <dgm:styleLbl name="node4">
+    <dgm:fillClrLst meth="repeat">
+      <a:schemeClr val="accent1"/>
+    </dgm:fillClrLst>
+    <dgm:linClrLst meth="repeat">
+      <a:schemeClr val="lt1"/>
+    </dgm:linClrLst>
+    <dgm:effectClrLst/>
+    <dgm:txLinClrLst/>
+    <dgm:txFillClrLst/>
+    <dgm:txEffectClrLst/>
+  </dgm:styleLbl>
+  <dgm:styleLbl name="fgImgPlace1">
+    <dgm:fillClrLst meth="repeat">
+      <a:schemeClr val="accent1">
+        <a:tint val="50000"/>
+      </a:schemeClr>
+    </dgm:fillClrLst>
+    <dgm:linClrLst meth="repeat">
+      <a:schemeClr val="lt1"/>
+    </dgm:linClrLst>
+    <dgm:effectClrLst/>
+    <dgm:txLinClrLst/>
+    <dgm:txFillClrLst meth="repeat">
+      <a:schemeClr val="lt1"/>
+    </dgm:txFillClrLst>
+    <dgm:txEffectClrLst/>
+  </dgm:styleLbl>
+  <dgm:styleLbl name="alignImgPlace1">
+    <dgm:fillClrLst meth="repeat">
+      <a:schemeClr val="accent1">
+        <a:tint val="50000"/>
+      </a:schemeClr>
+    </dgm:fillClrLst>
+    <dgm:linClrLst meth="repeat">
+      <a:schemeClr val="lt1"/>
+    </dgm:linClrLst>
+    <dgm:effectClrLst/>
+    <dgm:txLinClrLst/>
+    <dgm:txFillClrLst meth="repeat">
+      <a:schemeClr val="lt1"/>
+    </dgm:txFillClrLst>
+    <dgm:txEffectClrLst/>
+  </dgm:styleLbl>
+  <dgm:styleLbl name="bgImgPlace1">
+    <dgm:fillClrLst meth="repeat">
+      <a:schemeClr val="accent1">
+        <a:tint val="50000"/>
+      </a:schemeClr>
+    </dgm:fillClrLst>
+    <dgm:linClrLst meth="repeat">
+      <a:schemeClr val="lt1"/>
+    </dgm:linClrLst>
+    <dgm:effectClrLst/>
+    <dgm:txLinClrLst/>
+    <dgm:txFillClrLst meth="repeat">
+      <a:schemeClr val="lt1"/>
+    </dgm:txFillClrLst>
+    <dgm:txEffectClrLst/>
+  </dgm:styleLbl>
+  <dgm:styleLbl name="sibTrans2D1">
+    <dgm:fillClrLst meth="repeat">
+      <a:schemeClr val="accent1">
+        <a:tint val="60000"/>
+      </a:schemeClr>
+    </dgm:fillClrLst>
+    <dgm:linClrLst meth="repeat">
+      <a:schemeClr val="accent1">
+        <a:tint val="60000"/>
+      </a:schemeClr>
+    </dgm:linClrLst>
+    <dgm:effectClrLst/>
+    <dgm:txLinClrLst/>
+    <dgm:txFillClrLst/>
+    <dgm:txEffectClrLst/>
+  </dgm:styleLbl>
+  <dgm:styleLbl name="fgSibTrans2D1">
+    <dgm:fillClrLst meth="repeat">
+      <a:schemeClr val="accent1">
+        <a:tint val="60000"/>
+      </a:schemeClr>
+    </dgm:fillClrLst>
+    <dgm:linClrLst meth="repeat">
+      <a:schemeClr val="accent1">
+        <a:tint val="60000"/>
+      </a:schemeClr>
+    </dgm:linClrLst>
+    <dgm:effectClrLst/>
+    <dgm:txLinClrLst/>
+    <dgm:txFillClrLst/>
+    <dgm:txEffectClrLst/>
+  </dgm:styleLbl>
+  <dgm:styleLbl name="bgSibTrans2D1">
+    <dgm:fillClrLst meth="repeat">
+      <a:schemeClr val="accent1">
+        <a:tint val="60000"/>
+      </a:schemeClr>
+    </dgm:fillClrLst>
+    <dgm:linClrLst meth="repeat">
+      <a:schemeClr val="accent1">
+        <a:tint val="60000"/>
+      </a:schemeClr>
+    </dgm:linClrLst>
+    <dgm:effectClrLst/>
+    <dgm:txLinClrLst/>
+    <dgm:txFillClrLst/>
+    <dgm:txEffectClrLst/>
+  </dgm:styleLbl>
+  <dgm:styleLbl name="sibTrans1D1">
+    <dgm:fillClrLst meth="repeat">
+      <a:schemeClr val="accent1"/>
+    </dgm:fillClrLst>
+    <dgm:linClrLst meth="repeat">
+      <a:schemeClr val="accent1"/>
+    </dgm:linClrLst>
+    <dgm:effectClrLst/>
+    <dgm:txLinClrLst/>
+    <dgm:txFillClrLst meth="repeat">
+      <a:schemeClr val="tx1"/>
+    </dgm:txFillClrLst>
+    <dgm:txEffectClrLst/>
+  </dgm:styleLbl>
+  <dgm:styleLbl name="callout">
+    <dgm:fillClrLst meth="repeat">
+      <a:schemeClr val="accent1"/>
+    </dgm:fillClrLst>
+    <dgm:linClrLst meth="repeat">
+      <a:schemeClr val="accent1">
+        <a:tint val="50000"/>
+      </a:schemeClr>
+    </dgm:linClrLst>
+    <dgm:effectClrLst/>
+    <dgm:txLinClrLst/>
+    <dgm:txFillClrLst meth="repeat">
+      <a:schemeClr val="tx1"/>
+    </dgm:txFillClrLst>
+    <dgm:txEffectClrLst/>
+  </dgm:styleLbl>
+  <dgm:styleLbl name="asst0">
+    <dgm:fillClrLst meth="repeat">
+      <a:schemeClr val="accent1"/>
+    </dgm:fillClrLst>
+    <dgm:linClrLst meth="repeat">
+      <a:schemeClr val="lt1"/>
+    </dgm:linClrLst>
+    <dgm:effectClrLst/>
+    <dgm:txLinClrLst/>
+    <dgm:txFillClrLst/>
+    <dgm:txEffectClrLst/>
+  </dgm:styleLbl>
+  <dgm:styleLbl name="asst1">
+    <dgm:fillClrLst meth="repeat">
+      <a:schemeClr val="accent1"/>
+    </dgm:fillClrLst>
+    <dgm:linClrLst meth="repeat">
+      <a:schemeClr val="lt1"/>
+    </dgm:linClrLst>
+    <dgm:effectClrLst/>
+    <dgm:txLinClrLst/>
+    <dgm:txFillClrLst/>
+    <dgm:txEffectClrLst/>
+  </dgm:styleLbl>
+  <dgm:styleLbl name="asst2">
+    <dgm:fillClrLst meth="repeat">
+      <a:schemeClr val="accent1"/>
+    </dgm:fillClrLst>
+    <dgm:linClrLst meth="repeat">
+      <a:schemeClr val="lt1"/>
+    </dgm:linClrLst>
+    <dgm:effectClrLst/>
+    <dgm:txLinClrLst/>
+    <dgm:txFillClrLst/>
+    <dgm:txEffectClrLst/>
+  </dgm:styleLbl>
+  <dgm:styleLbl name="asst3">
+    <dgm:fillClrLst meth="repeat">
+      <a:schemeClr val="accent1"/>
+    </dgm:fillClrLst>
+    <dgm:linClrLst meth="repeat">
+      <a:schemeClr val="lt1"/>
+    </dgm:linClrLst>
+    <dgm:effectClrLst/>
+    <dgm:txLinClrLst/>
+    <dgm:txFillClrLst/>
+    <dgm:txEffectClrLst/>
+  </dgm:styleLbl>
+  <dgm:styleLbl name="asst4">
+    <dgm:fillClrLst meth="repeat">
+      <a:schemeClr val="accent1"/>
+    </dgm:fillClrLst>
+    <dgm:linClrLst meth="repeat">
+      <a:schemeClr val="lt1"/>
+    </dgm:linClrLst>
+    <dgm:effectClrLst/>
+    <dgm:txLinClrLst/>
+    <dgm:txFillClrLst/>
+    <dgm:txEffectClrLst/>
+  </dgm:styleLbl>
+  <dgm:styleLbl name="parChTrans2D1">
+    <dgm:fillClrLst meth="repeat">
+      <a:schemeClr val="accent1">
+        <a:tint val="60000"/>
+      </a:schemeClr>
+    </dgm:fillClrLst>
+    <dgm:linClrLst meth="repeat">
+      <a:schemeClr val="accent1">
+        <a:tint val="60000"/>
+      </a:schemeClr>
+    </dgm:linClrLst>
+    <dgm:effectClrLst/>
+    <dgm:txLinClrLst/>
+    <dgm:txFillClrLst meth="repeat">
+      <a:schemeClr val="lt1"/>
+    </dgm:txFillClrLst>
+    <dgm:txEffectClrLst/>
+  </dgm:styleLbl>
+  <dgm:styleLbl name="parChTrans2D2">
+    <dgm:fillClrLst meth="repeat">
+      <a:schemeClr val="accent1"/>
+    </dgm:fillClrLst>
+    <dgm:linClrLst meth="repeat">
+      <a:schemeClr val="accent1"/>
+    </dgm:linClrLst>
+    <dgm:effectClrLst/>
+    <dgm:txLinClrLst/>
+    <dgm:txFillClrLst meth="repeat">
+      <a:schemeClr val="lt1"/>
+    </dgm:txFillClrLst>
+    <dgm:txEffectClrLst/>
+  </dgm:styleLbl>
+  <dgm:styleLbl name="parChTrans2D3">
+    <dgm:fillClrLst meth="repeat">
+      <a:schemeClr val="accent1"/>
+    </dgm:fillClrLst>
+    <dgm:linClrLst meth="repeat">
+      <a:schemeClr val="accent1"/>
+    </dgm:linClrLst>
+    <dgm:effectClrLst/>
+    <dgm:txLinClrLst/>
+    <dgm:txFillClrLst meth="repeat">
+      <a:schemeClr val="lt1"/>
+    </dgm:txFillClrLst>
+    <dgm:txEffectClrLst/>
+  </dgm:styleLbl>
+  <dgm:styleLbl name="parChTrans2D4">
+    <dgm:fillClrLst meth="repeat">
+      <a:schemeClr val="accent1"/>
+    </dgm:fillClrLst>
+    <dgm:linClrLst meth="repeat">
+      <a:schemeClr val="accent1"/>
+    </dgm:linClrLst>
+    <dgm:effectClrLst/>
+    <dgm:txLinClrLst/>
+    <dgm:txFillClrLst meth="repeat">
+      <a:schemeClr val="lt1"/>
+    </dgm:txFillClrLst>
+    <dgm:txEffectClrLst/>
+  </dgm:styleLbl>
+  <dgm:styleLbl name="parChTrans1D1">
+    <dgm:fillClrLst meth="repeat">
+      <a:schemeClr val="accent1"/>
+    </dgm:fillClrLst>
+    <dgm:linClrLst meth="repeat">
+      <a:schemeClr val="accent1">
+        <a:shade val="60000"/>
+      </a:schemeClr>
+    </dgm:linClrLst>
+    <dgm:effectClrLst/>
+    <dgm:txLinClrLst/>
+    <dgm:txFillClrLst meth="repeat">
+      <a:schemeClr val="tx1"/>
+    </dgm:txFillClrLst>
+    <dgm:txEffectClrLst/>
+  </dgm:styleLbl>
+  <dgm:styleLbl name="parChTrans1D2">
+    <dgm:fillClrLst meth="repeat">
+      <a:schemeClr val="accent1"/>
+    </dgm:fillClrLst>
+    <dgm:linClrLst meth="repeat">
+      <a:schemeClr val="accent1">
+        <a:shade val="60000"/>
+      </a:schemeClr>
+    </dgm:linClrLst>
+    <dgm:effectClrLst/>
+    <dgm:txLinClrLst/>
+    <dgm:txFillClrLst meth="repeat">
+      <a:schemeClr val="tx1"/>
+    </dgm:txFillClrLst>
+    <dgm:txEffectClrLst/>
+  </dgm:styleLbl>
+  <dgm:styleLbl name="parChTrans1D3">
+    <dgm:fillClrLst meth="repeat">
+      <a:schemeClr val="accent1"/>
+    </dgm:fillClrLst>
+    <dgm:linClrLst meth="repeat">
+      <a:schemeClr val="accent1">
+        <a:shade val="80000"/>
+      </a:schemeClr>
+    </dgm:linClrLst>
+    <dgm:effectClrLst/>
+    <dgm:txLinClrLst/>
+    <dgm:txFillClrLst meth="repeat">
+      <a:schemeClr val="tx1"/>
+    </dgm:txFillClrLst>
+    <dgm:txEffectClrLst/>
+  </dgm:styleLbl>
+  <dgm:styleLbl name="parChTrans1D4">
+    <dgm:fillClrLst meth="repeat">
+      <a:schemeClr val="accent1"/>
+    </dgm:fillClrLst>
+    <dgm:linClrLst meth="repeat">
+      <a:schemeClr val="accent1">
+        <a:shade val="80000"/>
+      </a:schemeClr>
+    </dgm:linClrLst>
+    <dgm:effectClrLst/>
+    <dgm:txLinClrLst/>
+    <dgm:txFillClrLst meth="repeat">
+      <a:schemeClr val="tx1"/>
+    </dgm:txFillClrLst>
+    <dgm:txEffectClrLst/>
+  </dgm:styleLbl>
+  <dgm:styleLbl name="fgAcc1">
+    <dgm:fillClrLst meth="repeat">
+      <a:schemeClr val="lt1">
+        <a:alpha val="90000"/>
+      </a:schemeClr>
+    </dgm:fillClrLst>
+    <dgm:linClrLst meth="repeat">
+      <a:schemeClr val="accent1"/>
+    </dgm:linClrLst>
+    <dgm:effectClrLst/>
+    <dgm:txLinClrLst/>
+    <dgm:txFillClrLst meth="repeat">
+      <a:schemeClr val="dk1"/>
+    </dgm:txFillClrLst>
+    <dgm:txEffectClrLst/>
+  </dgm:styleLbl>
+  <dgm:styleLbl name="conFgAcc1">
+    <dgm:fillClrLst meth="repeat">
+      <a:schemeClr val="lt1">
+        <a:alpha val="90000"/>
+      </a:schemeClr>
+    </dgm:fillClrLst>
+    <dgm:linClrLst meth="repeat">
+      <a:schemeClr val="accent1"/>
+    </dgm:linClrLst>
+    <dgm:effectClrLst/>
+    <dgm:txLinClrLst/>
+    <dgm:txFillClrLst meth="repeat">
+      <a:schemeClr val="dk1"/>
+    </dgm:txFillClrLst>
+    <dgm:txEffectClrLst/>
+  </dgm:styleLbl>
+  <dgm:styleLbl name="alignAcc1">
+    <dgm:fillClrLst meth="repeat">
+      <a:schemeClr val="lt1">
+        <a:alpha val="90000"/>
+      </a:schemeClr>
+    </dgm:fillClrLst>
+    <dgm:linClrLst meth="repeat">
+      <a:schemeClr val="accent1"/>
+    </dgm:linClrLst>
+    <dgm:effectClrLst/>
+    <dgm:txLinClrLst/>
+    <dgm:txFillClrLst meth="repeat">
+      <a:schemeClr val="dk1"/>
+    </dgm:txFillClrLst>
+    <dgm:txEffectClrLst/>
+  </dgm:styleLbl>
+  <dgm:styleLbl name="trAlignAcc1">
+    <dgm:fillClrLst meth="repeat">
+      <a:schemeClr val="lt1">
+        <a:alpha val="40000"/>
+      </a:schemeClr>
+    </dgm:fillClrLst>
+    <dgm:linClrLst meth="repeat">
+      <a:schemeClr val="accent1"/>
+    </dgm:linClrLst>
+    <dgm:effectClrLst/>
+    <dgm:txLinClrLst/>
+    <dgm:txFillClrLst meth="repeat">
+      <a:schemeClr val="dk1"/>
+    </dgm:txFillClrLst>
+    <dgm:txEffectClrLst/>
+  </dgm:styleLbl>
+  <dgm:styleLbl name="bgAcc1">
+    <dgm:fillClrLst meth="repeat">
+      <a:schemeClr val="lt1">
+        <a:alpha val="90000"/>
+      </a:schemeClr>
+    </dgm:fillClrLst>
+    <dgm:linClrLst meth="repeat">
+      <a:schemeClr val="accent1"/>
+    </dgm:linClrLst>
+    <dgm:effectClrLst/>
+    <dgm:txLinClrLst/>
+    <dgm:txFillClrLst meth="repeat">
+      <a:schemeClr val="dk1"/>
+    </dgm:txFillClrLst>
+    <dgm:txEffectClrLst/>
+  </dgm:styleLbl>
+  <dgm:styleLbl name="solidFgAcc1">
+    <dgm:fillClrLst meth="repeat">
+      <a:schemeClr val="lt1"/>
+    </dgm:fillClrLst>
+    <dgm:linClrLst meth="repeat">
+      <a:schemeClr val="accent1"/>
+    </dgm:linClrLst>
+    <dgm:effectClrLst/>
+    <dgm:txLinClrLst/>
+    <dgm:txFillClrLst meth="repeat">
+      <a:schemeClr val="dk1"/>
+    </dgm:txFillClrLst>
+    <dgm:txEffectClrLst/>
+  </dgm:styleLbl>
+  <dgm:styleLbl name="solidAlignAcc1">
+    <dgm:fillClrLst meth="repeat">
+      <a:schemeClr val="lt1"/>
+    </dgm:fillClrLst>
+    <dgm:linClrLst meth="repeat">
+      <a:schemeClr val="accent1"/>
+    </dgm:linClrLst>
+    <dgm:effectClrLst/>
+    <dgm:txLinClrLst/>
+    <dgm:txFillClrLst meth="repeat">
+      <a:schemeClr val="dk1"/>
+    </dgm:txFillClrLst>
+    <dgm:txEffectClrLst/>
+  </dgm:styleLbl>
+  <dgm:styleLbl name="solidBgAcc1">
+    <dgm:fillClrLst meth="repeat">
+      <a:schemeClr val="lt1"/>
+    </dgm:fillClrLst>
+    <dgm:linClrLst meth="repeat">
+      <a:schemeClr val="accent1"/>
+    </dgm:linClrLst>
+    <dgm:effectClrLst/>
+    <dgm:txLinClrLst/>
+    <dgm:txFillClrLst meth="repeat">
+      <a:schemeClr val="dk1"/>
+    </dgm:txFillClrLst>
+    <dgm:txEffectClrLst/>
+  </dgm:styleLbl>
+  <dgm:styleLbl name="fgAccFollowNode1">
+    <dgm:fillClrLst meth="repeat">
+      <a:schemeClr val="accent1">
+        <a:alpha val="90000"/>
+        <a:tint val="40000"/>
+      </a:schemeClr>
+    </dgm:fillClrLst>
+    <dgm:linClrLst meth="repeat">
+      <a:schemeClr val="accent1">
+        <a:alpha val="90000"/>
+        <a:tint val="40000"/>
+      </a:schemeClr>
+    </dgm:linClrLst>
+    <dgm:effectClrLst/>
+    <dgm:txLinClrLst/>
+    <dgm:txFillClrLst meth="repeat">
+      <a:schemeClr val="dk1"/>
+    </dgm:txFillClrLst>
+    <dgm:txEffectClrLst/>
+  </dgm:styleLbl>
+  <dgm:styleLbl name="alignAccFollowNode1">
+    <dgm:fillClrLst meth="repeat">
+      <a:schemeClr val="accent1">
+        <a:alpha val="90000"/>
+        <a:tint val="40000"/>
+      </a:schemeClr>
+    </dgm:fillClrLst>
+    <dgm:linClrLst meth="repeat">
+      <a:schemeClr val="accent1">
+        <a:alpha val="90000"/>
+        <a:tint val="40000"/>
+      </a:schemeClr>
+    </dgm:linClrLst>
+    <dgm:effectClrLst/>
+    <dgm:txLinClrLst/>
+    <dgm:txFillClrLst meth="repeat">
+      <a:schemeClr val="dk1"/>
+    </dgm:txFillClrLst>
+    <dgm:txEffectClrLst/>
+  </dgm:styleLbl>
+  <dgm:styleLbl name="bgAccFollowNode1">
+    <dgm:fillClrLst meth="repeat">
+      <a:schemeClr val="accent1">
+        <a:alpha val="90000"/>
+        <a:tint val="40000"/>
+      </a:schemeClr>
+    </dgm:fillClrLst>
+    <dgm:linClrLst meth="repeat">
+      <a:schemeClr val="accent1">
+        <a:alpha val="90000"/>
+        <a:tint val="40000"/>
+      </a:schemeClr>
+    </dgm:linClrLst>
+    <dgm:effectClrLst/>
+    <dgm:txLinClrLst/>
+    <dgm:txFillClrLst meth="repeat">
+      <a:schemeClr val="dk1"/>
+    </dgm:txFillClrLst>
+    <dgm:txEffectClrLst/>
+  </dgm:styleLbl>
+  <dgm:styleLbl name="fgAcc0">
+    <dgm:fillClrLst meth="repeat">
+      <a:schemeClr val="lt1">
+        <a:alpha val="90000"/>
+      </a:schemeClr>
+    </dgm:fillClrLst>
+    <dgm:linClrLst meth="repeat">
+      <a:schemeClr val="accent1"/>
+    </dgm:linClrLst>
+    <dgm:effectClrLst/>
+    <dgm:txLinClrLst/>
+    <dgm:txFillClrLst meth="repeat">
+      <a:schemeClr val="dk1"/>
+    </dgm:txFillClrLst>
+    <dgm:txEffectClrLst/>
+  </dgm:styleLbl>
+  <dgm:styleLbl name="fgAcc2">
+    <dgm:fillClrLst meth="repeat">
+      <a:schemeClr val="lt1">
+        <a:alpha val="90000"/>
+      </a:schemeClr>
+    </dgm:fillClrLst>
+    <dgm:linClrLst meth="repeat">
+      <a:schemeClr val="accent1"/>
+    </dgm:linClrLst>
+    <dgm:effectClrLst/>
+    <dgm:txLinClrLst/>
+    <dgm:txFillClrLst meth="repeat">
+      <a:schemeClr val="dk1"/>
+    </dgm:txFillClrLst>
+    <dgm:txEffectClrLst/>
+  </dgm:styleLbl>
+  <dgm:styleLbl name="fgAcc3">
+    <dgm:fillClrLst meth="repeat">
+      <a:schemeClr val="lt1">
+        <a:alpha val="90000"/>
+      </a:schemeClr>
+    </dgm:fillClrLst>
+    <dgm:linClrLst meth="repeat">
+      <a:schemeClr val="accent1"/>
+    </dgm:linClrLst>
+    <dgm:effectClrLst/>
+    <dgm:txLinClrLst/>
+    <dgm:txFillClrLst meth="repeat">
+      <a:schemeClr val="dk1"/>
+    </dgm:txFillClrLst>
+    <dgm:txEffectClrLst/>
+  </dgm:styleLbl>
+  <dgm:styleLbl name="fgAcc4">
+    <dgm:fillClrLst meth="repeat">
+      <a:schemeClr val="lt1">
+        <a:alpha val="90000"/>
+      </a:schemeClr>
+    </dgm:fillClrLst>
+    <dgm:linClrLst meth="repeat">
+      <a:schemeClr val="accent1"/>
+    </dgm:linClrLst>
+    <dgm:effectClrLst/>
+    <dgm:txLinClrLst/>
+    <dgm:txFillClrLst meth="repeat">
+      <a:schemeClr val="dk1"/>
+    </dgm:txFillClrLst>
+    <dgm:txEffectClrLst/>
+  </dgm:styleLbl>
+  <dgm:styleLbl name="bgShp">
+    <dgm:fillClrLst meth="repeat">
+      <a:schemeClr val="accent1">
+        <a:tint val="40000"/>
+      </a:schemeClr>
+    </dgm:fillClrLst>
+    <dgm:linClrLst meth="repeat">
+      <a:schemeClr val="accent1"/>
+    </dgm:linClrLst>
+    <dgm:effectClrLst/>
+    <dgm:txLinClrLst/>
+    <dgm:txFillClrLst meth="repeat">
+      <a:schemeClr val="dk1"/>
+    </dgm:txFillClrLst>
+    <dgm:txEffectClrLst/>
+  </dgm:styleLbl>
+  <dgm:styleLbl name="dkBgShp">
+    <dgm:fillClrLst meth="repeat">
+      <a:schemeClr val="accent1">
+        <a:shade val="80000"/>
+      </a:schemeClr>
+    </dgm:fillClrLst>
+    <dgm:linClrLst meth="repeat">
+      <a:schemeClr val="accent1"/>
+    </dgm:linClrLst>
+    <dgm:effectClrLst/>
+    <dgm:txLinClrLst/>
+    <dgm:txFillClrLst meth="repeat">
+      <a:schemeClr val="lt1"/>
+    </dgm:txFillClrLst>
+    <dgm:txEffectClrLst/>
+  </dgm:styleLbl>
+  <dgm:styleLbl name="trBgShp">
+    <dgm:fillClrLst meth="repeat">
+      <a:schemeClr val="accent1">
+        <a:tint val="50000"/>
+        <a:alpha val="40000"/>
+      </a:schemeClr>
+    </dgm:fillClrLst>
+    <dgm:linClrLst meth="repeat">
+      <a:schemeClr val="accent1"/>
+    </dgm:linClrLst>
+    <dgm:effectClrLst/>
+    <dgm:txLinClrLst/>
+    <dgm:txFillClrLst meth="repeat">
+      <a:schemeClr val="lt1"/>
+    </dgm:txFillClrLst>
+    <dgm:txEffectClrLst/>
+  </dgm:styleLbl>
+  <dgm:styleLbl name="fgShp">
+    <dgm:fillClrLst meth="repeat">
+      <a:schemeClr val="accent1">
+        <a:tint val="60000"/>
+      </a:schemeClr>
+    </dgm:fillClrLst>
+    <dgm:linClrLst meth="repeat">
+      <a:schemeClr val="lt1"/>
+    </dgm:linClrLst>
+    <dgm:effectClrLst/>
+    <dgm:txLinClrLst/>
+    <dgm:txFillClrLst meth="repeat">
+      <a:schemeClr val="dk1"/>
+    </dgm:txFillClrLst>
+    <dgm:txEffectClrLst/>
+  </dgm:styleLbl>
+  <dgm:styleLbl name="revTx">
+    <dgm:fillClrLst meth="repeat">
+      <a:schemeClr val="lt1">
+        <a:alpha val="0"/>
+      </a:schemeClr>
+    </dgm:fillClrLst>
+    <dgm:linClrLst meth="repeat">
+      <a:schemeClr val="dk1">
+        <a:alpha val="0"/>
+      </a:schemeClr>
+    </dgm:linClrLst>
+    <dgm:effectClrLst/>
+    <dgm:txLinClrLst/>
+    <dgm:txFillClrLst meth="repeat">
+      <a:schemeClr val="tx1"/>
+    </dgm:txFillClrLst>
+    <dgm:txEffectClrLst/>
+  </dgm:styleLbl>
+</dgm:colorsDef>
+</file>
+
 <file path=ppt/diagrams/data1.xml><?xml version="1.0" encoding="utf-8"?>
 <dgm:dataModel xmlns:dgm="http://schemas.openxmlformats.org/drawingml/2006/diagram" xmlns:a="http://schemas.openxmlformats.org/drawingml/2006/main">
   <dgm:ptLst>
@@ -923,11 +1674,7 @@
         <a:p>
           <a:r>
             <a:rPr lang="en-GB" dirty="0" smtClean="0"/>
-            <a:t>1. </a:t>
-          </a:r>
-          <a:r>
-            <a:rPr lang="en-GB" dirty="0" smtClean="0"/>
-            <a:t>Team VEL</a:t>
+            <a:t>1. Team VEL</a:t>
           </a:r>
           <a:endParaRPr lang="en-GB" dirty="0"/>
         </a:p>
@@ -964,11 +1711,7 @@
         <a:p>
           <a:r>
             <a:rPr lang="en-GB" dirty="0" smtClean="0"/>
-            <a:t>2. </a:t>
-          </a:r>
-          <a:r>
-            <a:rPr lang="en-GB" dirty="0" smtClean="0"/>
-            <a:t>Product Owner</a:t>
+            <a:t>2. Product Owner</a:t>
           </a:r>
           <a:endParaRPr lang="en-GB" dirty="0"/>
         </a:p>
@@ -1005,11 +1748,7 @@
         <a:p>
           <a:r>
             <a:rPr lang="en-GB" dirty="0" smtClean="0"/>
-            <a:t>3. </a:t>
-          </a:r>
-          <a:r>
-            <a:rPr lang="en-GB" dirty="0" smtClean="0"/>
-            <a:t>Project Goal &amp; Major Capability</a:t>
+            <a:t>3. Project Goal &amp; Major Capability</a:t>
           </a:r>
           <a:endParaRPr lang="en-GB" dirty="0"/>
         </a:p>
@@ -1046,11 +1785,7 @@
         <a:p>
           <a:r>
             <a:rPr lang="en-GB" dirty="0" smtClean="0"/>
-            <a:t>4. </a:t>
-          </a:r>
-          <a:r>
-            <a:rPr lang="en-GB" dirty="0" smtClean="0"/>
-            <a:t>Product Backlog</a:t>
+            <a:t>4. Product Backlog</a:t>
           </a:r>
           <a:endParaRPr lang="en-GB" dirty="0"/>
         </a:p>
@@ -1603,6 +2338,270 @@
 </dgm:dataModel>
 </file>
 
+<file path=ppt/diagrams/data2.xml><?xml version="1.0" encoding="utf-8"?>
+<dgm:dataModel xmlns:dgm="http://schemas.openxmlformats.org/drawingml/2006/diagram" xmlns:a="http://schemas.openxmlformats.org/drawingml/2006/main">
+  <dgm:ptLst>
+    <dgm:pt modelId="{DC651011-D5D9-4DA0-8508-994C94EC55A0}" type="doc">
+      <dgm:prSet loTypeId="urn:microsoft.com/office/officeart/2005/8/layout/process1" loCatId="process" qsTypeId="urn:microsoft.com/office/officeart/2005/8/quickstyle/simple1" qsCatId="simple" csTypeId="urn:microsoft.com/office/officeart/2005/8/colors/accent1_2" csCatId="accent1" phldr="1"/>
+      <dgm:spPr/>
+      <dgm:t>
+        <a:bodyPr/>
+        <a:lstStyle/>
+        <a:p>
+          <a:endParaRPr lang="zh-CN" altLang="en-US"/>
+        </a:p>
+      </dgm:t>
+    </dgm:pt>
+    <dgm:pt modelId="{5840507E-2503-491D-80D0-505D4DE359CD}">
+      <dgm:prSet/>
+      <dgm:spPr/>
+      <dgm:t>
+        <a:bodyPr/>
+        <a:lstStyle/>
+        <a:p>
+          <a:pPr rtl="0"/>
+          <a:r>
+            <a:rPr lang="en-US" dirty="0" smtClean="0"/>
+            <a:t>Device type detection</a:t>
+          </a:r>
+          <a:endParaRPr lang="zh-CN" dirty="0"/>
+        </a:p>
+      </dgm:t>
+    </dgm:pt>
+    <dgm:pt modelId="{9EC5D3B2-0C54-436C-9297-6AD9C28F1EA7}" type="parTrans" cxnId="{8F4384DD-9DD3-4A21-9E87-84E7FBF44289}">
+      <dgm:prSet/>
+      <dgm:spPr/>
+      <dgm:t>
+        <a:bodyPr/>
+        <a:lstStyle/>
+        <a:p>
+          <a:endParaRPr lang="zh-CN" altLang="en-US"/>
+        </a:p>
+      </dgm:t>
+    </dgm:pt>
+    <dgm:pt modelId="{60340B94-6477-4106-B1C6-4B070EF05D6C}" type="sibTrans" cxnId="{8F4384DD-9DD3-4A21-9E87-84E7FBF44289}">
+      <dgm:prSet/>
+      <dgm:spPr/>
+      <dgm:t>
+        <a:bodyPr/>
+        <a:lstStyle/>
+        <a:p>
+          <a:endParaRPr lang="zh-CN" altLang="en-US"/>
+        </a:p>
+      </dgm:t>
+    </dgm:pt>
+    <dgm:pt modelId="{723CCF1E-3F45-47EC-A756-DF6C8A458EC7}">
+      <dgm:prSet/>
+      <dgm:spPr/>
+      <dgm:t>
+        <a:bodyPr/>
+        <a:lstStyle/>
+        <a:p>
+          <a:pPr rtl="0"/>
+          <a:r>
+            <a:rPr lang="en-US" altLang="zh-CN" dirty="0" smtClean="0"/>
+            <a:t>DPI &amp; resolution detection</a:t>
+          </a:r>
+          <a:endParaRPr lang="zh-CN" dirty="0"/>
+        </a:p>
+      </dgm:t>
+    </dgm:pt>
+    <dgm:pt modelId="{FDD68111-5AAE-46DC-857B-7D36EBDF3215}" type="parTrans" cxnId="{10E06F90-2DAD-4C75-A68F-5C3B09650D9E}">
+      <dgm:prSet/>
+      <dgm:spPr/>
+      <dgm:t>
+        <a:bodyPr/>
+        <a:lstStyle/>
+        <a:p>
+          <a:endParaRPr lang="zh-CN" altLang="en-US"/>
+        </a:p>
+      </dgm:t>
+    </dgm:pt>
+    <dgm:pt modelId="{DFD409AB-0076-40B5-BE10-9997A3F5A3A8}" type="sibTrans" cxnId="{10E06F90-2DAD-4C75-A68F-5C3B09650D9E}">
+      <dgm:prSet/>
+      <dgm:spPr/>
+      <dgm:t>
+        <a:bodyPr/>
+        <a:lstStyle/>
+        <a:p>
+          <a:endParaRPr lang="zh-CN" altLang="en-US"/>
+        </a:p>
+      </dgm:t>
+    </dgm:pt>
+    <dgm:pt modelId="{B6048623-EF07-463F-AC47-D167F5B6EA80}">
+      <dgm:prSet/>
+      <dgm:spPr/>
+      <dgm:t>
+        <a:bodyPr/>
+        <a:lstStyle/>
+        <a:p>
+          <a:pPr rtl="0"/>
+          <a:r>
+            <a:rPr lang="en-US" altLang="zh-CN" dirty="0" smtClean="0"/>
+            <a:t>Dynamically changing style</a:t>
+          </a:r>
+          <a:endParaRPr lang="zh-CN" dirty="0"/>
+        </a:p>
+      </dgm:t>
+    </dgm:pt>
+    <dgm:pt modelId="{DF9AEB48-23AC-4D21-94AF-DA713076A312}" type="parTrans" cxnId="{0EAAAE71-3F02-4D90-9CC4-9295F05F74D6}">
+      <dgm:prSet/>
+      <dgm:spPr/>
+      <dgm:t>
+        <a:bodyPr/>
+        <a:lstStyle/>
+        <a:p>
+          <a:endParaRPr lang="zh-CN" altLang="en-US"/>
+        </a:p>
+      </dgm:t>
+    </dgm:pt>
+    <dgm:pt modelId="{714F4F55-9864-4174-AAAF-EFD9FBE0E293}" type="sibTrans" cxnId="{0EAAAE71-3F02-4D90-9CC4-9295F05F74D6}">
+      <dgm:prSet/>
+      <dgm:spPr/>
+      <dgm:t>
+        <a:bodyPr/>
+        <a:lstStyle/>
+        <a:p>
+          <a:endParaRPr lang="zh-CN" altLang="en-US"/>
+        </a:p>
+      </dgm:t>
+    </dgm:pt>
+    <dgm:pt modelId="{2FDC7855-3016-432F-BE3F-EF9CCCFE89E8}" type="pres">
+      <dgm:prSet presAssocID="{DC651011-D5D9-4DA0-8508-994C94EC55A0}" presName="Name0" presStyleCnt="0">
+        <dgm:presLayoutVars>
+          <dgm:dir/>
+          <dgm:resizeHandles val="exact"/>
+        </dgm:presLayoutVars>
+      </dgm:prSet>
+      <dgm:spPr/>
+      <dgm:t>
+        <a:bodyPr/>
+        <a:lstStyle/>
+        <a:p>
+          <a:endParaRPr lang="en-NZ"/>
+        </a:p>
+      </dgm:t>
+    </dgm:pt>
+    <dgm:pt modelId="{5AE500DB-F672-47B9-B9D5-D507282B5D00}" type="pres">
+      <dgm:prSet presAssocID="{5840507E-2503-491D-80D0-505D4DE359CD}" presName="node" presStyleLbl="node1" presStyleIdx="0" presStyleCnt="3">
+        <dgm:presLayoutVars>
+          <dgm:bulletEnabled val="1"/>
+        </dgm:presLayoutVars>
+      </dgm:prSet>
+      <dgm:spPr/>
+      <dgm:t>
+        <a:bodyPr/>
+        <a:lstStyle/>
+        <a:p>
+          <a:endParaRPr lang="en-NZ"/>
+        </a:p>
+      </dgm:t>
+    </dgm:pt>
+    <dgm:pt modelId="{1A72F565-7664-4E2F-B042-9E7DA6CF8ED7}" type="pres">
+      <dgm:prSet presAssocID="{60340B94-6477-4106-B1C6-4B070EF05D6C}" presName="sibTrans" presStyleLbl="sibTrans2D1" presStyleIdx="0" presStyleCnt="2"/>
+      <dgm:spPr/>
+      <dgm:t>
+        <a:bodyPr/>
+        <a:lstStyle/>
+        <a:p>
+          <a:endParaRPr lang="en-NZ"/>
+        </a:p>
+      </dgm:t>
+    </dgm:pt>
+    <dgm:pt modelId="{9CC705DE-B26C-4698-835D-E18F95DABCFF}" type="pres">
+      <dgm:prSet presAssocID="{60340B94-6477-4106-B1C6-4B070EF05D6C}" presName="connectorText" presStyleLbl="sibTrans2D1" presStyleIdx="0" presStyleCnt="2"/>
+      <dgm:spPr/>
+      <dgm:t>
+        <a:bodyPr/>
+        <a:lstStyle/>
+        <a:p>
+          <a:endParaRPr lang="en-NZ"/>
+        </a:p>
+      </dgm:t>
+    </dgm:pt>
+    <dgm:pt modelId="{DE286EC6-C7D0-431D-AE27-D262CD647F2E}" type="pres">
+      <dgm:prSet presAssocID="{723CCF1E-3F45-47EC-A756-DF6C8A458EC7}" presName="node" presStyleLbl="node1" presStyleIdx="1" presStyleCnt="3">
+        <dgm:presLayoutVars>
+          <dgm:bulletEnabled val="1"/>
+        </dgm:presLayoutVars>
+      </dgm:prSet>
+      <dgm:spPr/>
+      <dgm:t>
+        <a:bodyPr/>
+        <a:lstStyle/>
+        <a:p>
+          <a:endParaRPr lang="en-NZ"/>
+        </a:p>
+      </dgm:t>
+    </dgm:pt>
+    <dgm:pt modelId="{4F830FBE-354D-4BE3-AA4B-4477670A6011}" type="pres">
+      <dgm:prSet presAssocID="{DFD409AB-0076-40B5-BE10-9997A3F5A3A8}" presName="sibTrans" presStyleLbl="sibTrans2D1" presStyleIdx="1" presStyleCnt="2"/>
+      <dgm:spPr/>
+      <dgm:t>
+        <a:bodyPr/>
+        <a:lstStyle/>
+        <a:p>
+          <a:endParaRPr lang="en-NZ"/>
+        </a:p>
+      </dgm:t>
+    </dgm:pt>
+    <dgm:pt modelId="{116DCE42-87F1-4005-9371-5F41DBA9275B}" type="pres">
+      <dgm:prSet presAssocID="{DFD409AB-0076-40B5-BE10-9997A3F5A3A8}" presName="connectorText" presStyleLbl="sibTrans2D1" presStyleIdx="1" presStyleCnt="2"/>
+      <dgm:spPr/>
+      <dgm:t>
+        <a:bodyPr/>
+        <a:lstStyle/>
+        <a:p>
+          <a:endParaRPr lang="en-NZ"/>
+        </a:p>
+      </dgm:t>
+    </dgm:pt>
+    <dgm:pt modelId="{C95394A6-09AB-44F5-8B9F-2B62703F6D37}" type="pres">
+      <dgm:prSet presAssocID="{B6048623-EF07-463F-AC47-D167F5B6EA80}" presName="node" presStyleLbl="node1" presStyleIdx="2" presStyleCnt="3">
+        <dgm:presLayoutVars>
+          <dgm:bulletEnabled val="1"/>
+        </dgm:presLayoutVars>
+      </dgm:prSet>
+      <dgm:spPr/>
+      <dgm:t>
+        <a:bodyPr/>
+        <a:lstStyle/>
+        <a:p>
+          <a:endParaRPr lang="zh-CN" altLang="en-US"/>
+        </a:p>
+      </dgm:t>
+    </dgm:pt>
+  </dgm:ptLst>
+  <dgm:cxnLst>
+    <dgm:cxn modelId="{0EAAAE71-3F02-4D90-9CC4-9295F05F74D6}" srcId="{DC651011-D5D9-4DA0-8508-994C94EC55A0}" destId="{B6048623-EF07-463F-AC47-D167F5B6EA80}" srcOrd="2" destOrd="0" parTransId="{DF9AEB48-23AC-4D21-94AF-DA713076A312}" sibTransId="{714F4F55-9864-4174-AAAF-EFD9FBE0E293}"/>
+    <dgm:cxn modelId="{D3C94337-5C9C-4B7A-9959-9D4609114B70}" type="presOf" srcId="{DC651011-D5D9-4DA0-8508-994C94EC55A0}" destId="{2FDC7855-3016-432F-BE3F-EF9CCCFE89E8}" srcOrd="0" destOrd="0" presId="urn:microsoft.com/office/officeart/2005/8/layout/process1"/>
+    <dgm:cxn modelId="{893F0507-6CBA-4CB2-AAD2-25CDDA7B0B71}" type="presOf" srcId="{B6048623-EF07-463F-AC47-D167F5B6EA80}" destId="{C95394A6-09AB-44F5-8B9F-2B62703F6D37}" srcOrd="0" destOrd="0" presId="urn:microsoft.com/office/officeart/2005/8/layout/process1"/>
+    <dgm:cxn modelId="{A5FB0538-674A-4345-9EB7-8D73750EB9B5}" type="presOf" srcId="{5840507E-2503-491D-80D0-505D4DE359CD}" destId="{5AE500DB-F672-47B9-B9D5-D507282B5D00}" srcOrd="0" destOrd="0" presId="urn:microsoft.com/office/officeart/2005/8/layout/process1"/>
+    <dgm:cxn modelId="{8F4384DD-9DD3-4A21-9E87-84E7FBF44289}" srcId="{DC651011-D5D9-4DA0-8508-994C94EC55A0}" destId="{5840507E-2503-491D-80D0-505D4DE359CD}" srcOrd="0" destOrd="0" parTransId="{9EC5D3B2-0C54-436C-9297-6AD9C28F1EA7}" sibTransId="{60340B94-6477-4106-B1C6-4B070EF05D6C}"/>
+    <dgm:cxn modelId="{E29A9671-C635-4935-97CB-24D9A1076AFB}" type="presOf" srcId="{60340B94-6477-4106-B1C6-4B070EF05D6C}" destId="{1A72F565-7664-4E2F-B042-9E7DA6CF8ED7}" srcOrd="0" destOrd="0" presId="urn:microsoft.com/office/officeart/2005/8/layout/process1"/>
+    <dgm:cxn modelId="{FE32091B-1E54-441B-BAC8-B489DC6F598F}" type="presOf" srcId="{60340B94-6477-4106-B1C6-4B070EF05D6C}" destId="{9CC705DE-B26C-4698-835D-E18F95DABCFF}" srcOrd="1" destOrd="0" presId="urn:microsoft.com/office/officeart/2005/8/layout/process1"/>
+    <dgm:cxn modelId="{C35CD963-157D-44E2-AF02-767215A2A802}" type="presOf" srcId="{DFD409AB-0076-40B5-BE10-9997A3F5A3A8}" destId="{4F830FBE-354D-4BE3-AA4B-4477670A6011}" srcOrd="0" destOrd="0" presId="urn:microsoft.com/office/officeart/2005/8/layout/process1"/>
+    <dgm:cxn modelId="{90C45477-8C4C-4111-B8F3-AE5C2B6253EE}" type="presOf" srcId="{DFD409AB-0076-40B5-BE10-9997A3F5A3A8}" destId="{116DCE42-87F1-4005-9371-5F41DBA9275B}" srcOrd="1" destOrd="0" presId="urn:microsoft.com/office/officeart/2005/8/layout/process1"/>
+    <dgm:cxn modelId="{B1403966-4550-4BB0-BC4A-0586737C329C}" type="presOf" srcId="{723CCF1E-3F45-47EC-A756-DF6C8A458EC7}" destId="{DE286EC6-C7D0-431D-AE27-D262CD647F2E}" srcOrd="0" destOrd="0" presId="urn:microsoft.com/office/officeart/2005/8/layout/process1"/>
+    <dgm:cxn modelId="{10E06F90-2DAD-4C75-A68F-5C3B09650D9E}" srcId="{DC651011-D5D9-4DA0-8508-994C94EC55A0}" destId="{723CCF1E-3F45-47EC-A756-DF6C8A458EC7}" srcOrd="1" destOrd="0" parTransId="{FDD68111-5AAE-46DC-857B-7D36EBDF3215}" sibTransId="{DFD409AB-0076-40B5-BE10-9997A3F5A3A8}"/>
+    <dgm:cxn modelId="{C426389C-7EAD-4F13-8132-D22D64D6E14F}" type="presParOf" srcId="{2FDC7855-3016-432F-BE3F-EF9CCCFE89E8}" destId="{5AE500DB-F672-47B9-B9D5-D507282B5D00}" srcOrd="0" destOrd="0" presId="urn:microsoft.com/office/officeart/2005/8/layout/process1"/>
+    <dgm:cxn modelId="{0DE7CF2C-462A-4BDC-80BD-27F94EE6BA96}" type="presParOf" srcId="{2FDC7855-3016-432F-BE3F-EF9CCCFE89E8}" destId="{1A72F565-7664-4E2F-B042-9E7DA6CF8ED7}" srcOrd="1" destOrd="0" presId="urn:microsoft.com/office/officeart/2005/8/layout/process1"/>
+    <dgm:cxn modelId="{5431641D-D1BF-4CC3-8C77-476B86B95995}" type="presParOf" srcId="{1A72F565-7664-4E2F-B042-9E7DA6CF8ED7}" destId="{9CC705DE-B26C-4698-835D-E18F95DABCFF}" srcOrd="0" destOrd="0" presId="urn:microsoft.com/office/officeart/2005/8/layout/process1"/>
+    <dgm:cxn modelId="{CC6224EA-B01F-452B-8D16-D0C57CFD1FC7}" type="presParOf" srcId="{2FDC7855-3016-432F-BE3F-EF9CCCFE89E8}" destId="{DE286EC6-C7D0-431D-AE27-D262CD647F2E}" srcOrd="2" destOrd="0" presId="urn:microsoft.com/office/officeart/2005/8/layout/process1"/>
+    <dgm:cxn modelId="{00C44043-AAED-40D3-8501-0916C0357AEF}" type="presParOf" srcId="{2FDC7855-3016-432F-BE3F-EF9CCCFE89E8}" destId="{4F830FBE-354D-4BE3-AA4B-4477670A6011}" srcOrd="3" destOrd="0" presId="urn:microsoft.com/office/officeart/2005/8/layout/process1"/>
+    <dgm:cxn modelId="{FA3CB5D6-BC53-4B53-822C-4A24B5443575}" type="presParOf" srcId="{4F830FBE-354D-4BE3-AA4B-4477670A6011}" destId="{116DCE42-87F1-4005-9371-5F41DBA9275B}" srcOrd="0" destOrd="0" presId="urn:microsoft.com/office/officeart/2005/8/layout/process1"/>
+    <dgm:cxn modelId="{25014091-CA69-4EF6-9F47-F6D44DFBDAEC}" type="presParOf" srcId="{2FDC7855-3016-432F-BE3F-EF9CCCFE89E8}" destId="{C95394A6-09AB-44F5-8B9F-2B62703F6D37}" srcOrd="4" destOrd="0" presId="urn:microsoft.com/office/officeart/2005/8/layout/process1"/>
+  </dgm:cxnLst>
+  <dgm:bg/>
+  <dgm:whole/>
+  <dgm:extLst>
+    <a:ext uri="http://schemas.microsoft.com/office/drawing/2008/diagram">
+      <dsp:dataModelExt xmlns:dsp="http://schemas.microsoft.com/office/drawing/2008/diagram" relId="rId6" minVer="http://schemas.openxmlformats.org/drawingml/2006/diagram"/>
+    </a:ext>
+  </dgm:extLst>
+</dgm:dataModel>
+</file>
+
 <file path=ppt/diagrams/drawing1.xml><?xml version="1.0" encoding="utf-8"?>
 <dsp:drawing xmlns:dgm="http://schemas.openxmlformats.org/drawingml/2006/diagram" xmlns:dsp="http://schemas.microsoft.com/office/drawing/2008/diagram" xmlns:a="http://schemas.openxmlformats.org/drawingml/2006/main">
   <dsp:spTree>
@@ -1795,11 +2794,7 @@
           </a:pPr>
           <a:r>
             <a:rPr lang="en-GB" sz="2200" kern="1200" dirty="0" smtClean="0"/>
-            <a:t>1. </a:t>
-          </a:r>
-          <a:r>
-            <a:rPr lang="en-GB" sz="2200" kern="1200" dirty="0" smtClean="0"/>
-            <a:t>Team VEL</a:t>
+            <a:t>1. Team VEL</a:t>
           </a:r>
           <a:endParaRPr lang="en-GB" sz="2200" kern="1200" dirty="0"/>
         </a:p>
@@ -1907,11 +2902,7 @@
           </a:pPr>
           <a:r>
             <a:rPr lang="en-GB" sz="2200" kern="1200" dirty="0" smtClean="0"/>
-            <a:t>2. </a:t>
-          </a:r>
-          <a:r>
-            <a:rPr lang="en-GB" sz="2200" kern="1200" dirty="0" smtClean="0"/>
-            <a:t>Product Owner</a:t>
+            <a:t>2. Product Owner</a:t>
           </a:r>
           <a:endParaRPr lang="en-GB" sz="2200" kern="1200" dirty="0"/>
         </a:p>
@@ -2019,11 +3010,7 @@
           </a:pPr>
           <a:r>
             <a:rPr lang="en-GB" sz="2200" kern="1200" dirty="0" smtClean="0"/>
-            <a:t>3. </a:t>
-          </a:r>
-          <a:r>
-            <a:rPr lang="en-GB" sz="2200" kern="1200" dirty="0" smtClean="0"/>
-            <a:t>Project Goal &amp; Major Capability</a:t>
+            <a:t>3. Project Goal &amp; Major Capability</a:t>
           </a:r>
           <a:endParaRPr lang="en-GB" sz="2200" kern="1200" dirty="0"/>
         </a:p>
@@ -2131,11 +3118,7 @@
           </a:pPr>
           <a:r>
             <a:rPr lang="en-GB" sz="2200" kern="1200" dirty="0" smtClean="0"/>
-            <a:t>4. </a:t>
-          </a:r>
-          <a:r>
-            <a:rPr lang="en-GB" sz="2200" kern="1200" dirty="0" smtClean="0"/>
-            <a:t>Product Backlog</a:t>
+            <a:t>4. Product Backlog</a:t>
           </a:r>
           <a:endParaRPr lang="en-GB" sz="2200" kern="1200" dirty="0"/>
         </a:p>
@@ -2629,6 +3612,393 @@
 </dsp:drawing>
 </file>
 
+<file path=ppt/diagrams/drawing2.xml><?xml version="1.0" encoding="utf-8"?>
+<dsp:drawing xmlns:dgm="http://schemas.openxmlformats.org/drawingml/2006/diagram" xmlns:dsp="http://schemas.microsoft.com/office/drawing/2008/diagram" xmlns:a="http://schemas.openxmlformats.org/drawingml/2006/main">
+  <dsp:spTree>
+    <dsp:nvGrpSpPr>
+      <dsp:cNvPr id="0" name=""/>
+      <dsp:cNvGrpSpPr/>
+    </dsp:nvGrpSpPr>
+    <dsp:grpSpPr/>
+    <dsp:sp modelId="{5AE500DB-F672-47B9-B9D5-D507282B5D00}">
+      <dsp:nvSpPr>
+        <dsp:cNvPr id="0" name=""/>
+        <dsp:cNvSpPr/>
+      </dsp:nvSpPr>
+      <dsp:spPr>
+        <a:xfrm>
+          <a:off x="6746" y="161372"/>
+          <a:ext cx="2016399" cy="1209839"/>
+        </a:xfrm>
+        <a:prstGeom prst="roundRect">
+          <a:avLst>
+            <a:gd name="adj" fmla="val 10000"/>
+          </a:avLst>
+        </a:prstGeom>
+        <a:solidFill>
+          <a:schemeClr val="accent1">
+            <a:hueOff val="0"/>
+            <a:satOff val="0"/>
+            <a:lumOff val="0"/>
+            <a:alphaOff val="0"/>
+          </a:schemeClr>
+        </a:solidFill>
+        <a:ln w="25400" cap="flat" cmpd="sng" algn="ctr">
+          <a:solidFill>
+            <a:schemeClr val="lt1">
+              <a:hueOff val="0"/>
+              <a:satOff val="0"/>
+              <a:lumOff val="0"/>
+              <a:alphaOff val="0"/>
+            </a:schemeClr>
+          </a:solidFill>
+          <a:prstDash val="solid"/>
+        </a:ln>
+        <a:effectLst/>
+      </dsp:spPr>
+      <dsp:style>
+        <a:lnRef idx="2">
+          <a:scrgbClr r="0" g="0" b="0"/>
+        </a:lnRef>
+        <a:fillRef idx="1">
+          <a:scrgbClr r="0" g="0" b="0"/>
+        </a:fillRef>
+        <a:effectRef idx="0">
+          <a:scrgbClr r="0" g="0" b="0"/>
+        </a:effectRef>
+        <a:fontRef idx="minor">
+          <a:schemeClr val="lt1"/>
+        </a:fontRef>
+      </dsp:style>
+      <dsp:txBody>
+        <a:bodyPr spcFirstLastPara="0" vert="horz" wrap="square" lIns="87630" tIns="87630" rIns="87630" bIns="87630" numCol="1" spcCol="1270" anchor="ctr" anchorCtr="0">
+          <a:noAutofit/>
+        </a:bodyPr>
+        <a:lstStyle/>
+        <a:p>
+          <a:pPr lvl="0" algn="ctr" defTabSz="1022350" rtl="0">
+            <a:lnSpc>
+              <a:spcPct val="90000"/>
+            </a:lnSpc>
+            <a:spcBef>
+              <a:spcPct val="0"/>
+            </a:spcBef>
+            <a:spcAft>
+              <a:spcPct val="35000"/>
+            </a:spcAft>
+          </a:pPr>
+          <a:r>
+            <a:rPr lang="en-US" sz="2300" kern="1200" dirty="0" smtClean="0"/>
+            <a:t>Device type detection</a:t>
+          </a:r>
+          <a:endParaRPr lang="zh-CN" sz="2300" kern="1200" dirty="0"/>
+        </a:p>
+      </dsp:txBody>
+      <dsp:txXfrm>
+        <a:off x="42181" y="196807"/>
+        <a:ext cx="1945529" cy="1138969"/>
+      </dsp:txXfrm>
+    </dsp:sp>
+    <dsp:sp modelId="{1A72F565-7664-4E2F-B042-9E7DA6CF8ED7}">
+      <dsp:nvSpPr>
+        <dsp:cNvPr id="0" name=""/>
+        <dsp:cNvSpPr/>
+      </dsp:nvSpPr>
+      <dsp:spPr>
+        <a:xfrm>
+          <a:off x="2224785" y="516259"/>
+          <a:ext cx="427476" cy="500066"/>
+        </a:xfrm>
+        <a:prstGeom prst="rightArrow">
+          <a:avLst>
+            <a:gd name="adj1" fmla="val 60000"/>
+            <a:gd name="adj2" fmla="val 50000"/>
+          </a:avLst>
+        </a:prstGeom>
+        <a:solidFill>
+          <a:schemeClr val="accent1">
+            <a:tint val="60000"/>
+            <a:hueOff val="0"/>
+            <a:satOff val="0"/>
+            <a:lumOff val="0"/>
+            <a:alphaOff val="0"/>
+          </a:schemeClr>
+        </a:solidFill>
+        <a:ln>
+          <a:noFill/>
+        </a:ln>
+        <a:effectLst/>
+      </dsp:spPr>
+      <dsp:style>
+        <a:lnRef idx="0">
+          <a:scrgbClr r="0" g="0" b="0"/>
+        </a:lnRef>
+        <a:fillRef idx="1">
+          <a:scrgbClr r="0" g="0" b="0"/>
+        </a:fillRef>
+        <a:effectRef idx="0">
+          <a:scrgbClr r="0" g="0" b="0"/>
+        </a:effectRef>
+        <a:fontRef idx="minor">
+          <a:schemeClr val="lt1"/>
+        </a:fontRef>
+      </dsp:style>
+      <dsp:txBody>
+        <a:bodyPr spcFirstLastPara="0" vert="horz" wrap="square" lIns="0" tIns="0" rIns="0" bIns="0" numCol="1" spcCol="1270" anchor="ctr" anchorCtr="0">
+          <a:noAutofit/>
+        </a:bodyPr>
+        <a:lstStyle/>
+        <a:p>
+          <a:pPr lvl="0" algn="ctr" defTabSz="844550">
+            <a:lnSpc>
+              <a:spcPct val="90000"/>
+            </a:lnSpc>
+            <a:spcBef>
+              <a:spcPct val="0"/>
+            </a:spcBef>
+            <a:spcAft>
+              <a:spcPct val="35000"/>
+            </a:spcAft>
+          </a:pPr>
+          <a:endParaRPr lang="zh-CN" altLang="en-US" sz="1900" kern="1200"/>
+        </a:p>
+      </dsp:txBody>
+      <dsp:txXfrm>
+        <a:off x="2224785" y="616272"/>
+        <a:ext cx="299233" cy="300040"/>
+      </dsp:txXfrm>
+    </dsp:sp>
+    <dsp:sp modelId="{DE286EC6-C7D0-431D-AE27-D262CD647F2E}">
+      <dsp:nvSpPr>
+        <dsp:cNvPr id="0" name=""/>
+        <dsp:cNvSpPr/>
+      </dsp:nvSpPr>
+      <dsp:spPr>
+        <a:xfrm>
+          <a:off x="2829704" y="161372"/>
+          <a:ext cx="2016399" cy="1209839"/>
+        </a:xfrm>
+        <a:prstGeom prst="roundRect">
+          <a:avLst>
+            <a:gd name="adj" fmla="val 10000"/>
+          </a:avLst>
+        </a:prstGeom>
+        <a:solidFill>
+          <a:schemeClr val="accent1">
+            <a:hueOff val="0"/>
+            <a:satOff val="0"/>
+            <a:lumOff val="0"/>
+            <a:alphaOff val="0"/>
+          </a:schemeClr>
+        </a:solidFill>
+        <a:ln w="25400" cap="flat" cmpd="sng" algn="ctr">
+          <a:solidFill>
+            <a:schemeClr val="lt1">
+              <a:hueOff val="0"/>
+              <a:satOff val="0"/>
+              <a:lumOff val="0"/>
+              <a:alphaOff val="0"/>
+            </a:schemeClr>
+          </a:solidFill>
+          <a:prstDash val="solid"/>
+        </a:ln>
+        <a:effectLst/>
+      </dsp:spPr>
+      <dsp:style>
+        <a:lnRef idx="2">
+          <a:scrgbClr r="0" g="0" b="0"/>
+        </a:lnRef>
+        <a:fillRef idx="1">
+          <a:scrgbClr r="0" g="0" b="0"/>
+        </a:fillRef>
+        <a:effectRef idx="0">
+          <a:scrgbClr r="0" g="0" b="0"/>
+        </a:effectRef>
+        <a:fontRef idx="minor">
+          <a:schemeClr val="lt1"/>
+        </a:fontRef>
+      </dsp:style>
+      <dsp:txBody>
+        <a:bodyPr spcFirstLastPara="0" vert="horz" wrap="square" lIns="87630" tIns="87630" rIns="87630" bIns="87630" numCol="1" spcCol="1270" anchor="ctr" anchorCtr="0">
+          <a:noAutofit/>
+        </a:bodyPr>
+        <a:lstStyle/>
+        <a:p>
+          <a:pPr lvl="0" algn="ctr" defTabSz="1022350" rtl="0">
+            <a:lnSpc>
+              <a:spcPct val="90000"/>
+            </a:lnSpc>
+            <a:spcBef>
+              <a:spcPct val="0"/>
+            </a:spcBef>
+            <a:spcAft>
+              <a:spcPct val="35000"/>
+            </a:spcAft>
+          </a:pPr>
+          <a:r>
+            <a:rPr lang="en-US" altLang="zh-CN" sz="2300" kern="1200" dirty="0" smtClean="0"/>
+            <a:t>DPI &amp; resolution detection</a:t>
+          </a:r>
+          <a:endParaRPr lang="zh-CN" sz="2300" kern="1200" dirty="0"/>
+        </a:p>
+      </dsp:txBody>
+      <dsp:txXfrm>
+        <a:off x="2865139" y="196807"/>
+        <a:ext cx="1945529" cy="1138969"/>
+      </dsp:txXfrm>
+    </dsp:sp>
+    <dsp:sp modelId="{4F830FBE-354D-4BE3-AA4B-4477670A6011}">
+      <dsp:nvSpPr>
+        <dsp:cNvPr id="0" name=""/>
+        <dsp:cNvSpPr/>
+      </dsp:nvSpPr>
+      <dsp:spPr>
+        <a:xfrm>
+          <a:off x="5047743" y="516259"/>
+          <a:ext cx="427476" cy="500066"/>
+        </a:xfrm>
+        <a:prstGeom prst="rightArrow">
+          <a:avLst>
+            <a:gd name="adj1" fmla="val 60000"/>
+            <a:gd name="adj2" fmla="val 50000"/>
+          </a:avLst>
+        </a:prstGeom>
+        <a:solidFill>
+          <a:schemeClr val="accent1">
+            <a:tint val="60000"/>
+            <a:hueOff val="0"/>
+            <a:satOff val="0"/>
+            <a:lumOff val="0"/>
+            <a:alphaOff val="0"/>
+          </a:schemeClr>
+        </a:solidFill>
+        <a:ln>
+          <a:noFill/>
+        </a:ln>
+        <a:effectLst/>
+      </dsp:spPr>
+      <dsp:style>
+        <a:lnRef idx="0">
+          <a:scrgbClr r="0" g="0" b="0"/>
+        </a:lnRef>
+        <a:fillRef idx="1">
+          <a:scrgbClr r="0" g="0" b="0"/>
+        </a:fillRef>
+        <a:effectRef idx="0">
+          <a:scrgbClr r="0" g="0" b="0"/>
+        </a:effectRef>
+        <a:fontRef idx="minor">
+          <a:schemeClr val="lt1"/>
+        </a:fontRef>
+      </dsp:style>
+      <dsp:txBody>
+        <a:bodyPr spcFirstLastPara="0" vert="horz" wrap="square" lIns="0" tIns="0" rIns="0" bIns="0" numCol="1" spcCol="1270" anchor="ctr" anchorCtr="0">
+          <a:noAutofit/>
+        </a:bodyPr>
+        <a:lstStyle/>
+        <a:p>
+          <a:pPr lvl="0" algn="ctr" defTabSz="844550">
+            <a:lnSpc>
+              <a:spcPct val="90000"/>
+            </a:lnSpc>
+            <a:spcBef>
+              <a:spcPct val="0"/>
+            </a:spcBef>
+            <a:spcAft>
+              <a:spcPct val="35000"/>
+            </a:spcAft>
+          </a:pPr>
+          <a:endParaRPr lang="zh-CN" altLang="en-US" sz="1900" kern="1200"/>
+        </a:p>
+      </dsp:txBody>
+      <dsp:txXfrm>
+        <a:off x="5047743" y="616272"/>
+        <a:ext cx="299233" cy="300040"/>
+      </dsp:txXfrm>
+    </dsp:sp>
+    <dsp:sp modelId="{C95394A6-09AB-44F5-8B9F-2B62703F6D37}">
+      <dsp:nvSpPr>
+        <dsp:cNvPr id="0" name=""/>
+        <dsp:cNvSpPr/>
+      </dsp:nvSpPr>
+      <dsp:spPr>
+        <a:xfrm>
+          <a:off x="5652663" y="161372"/>
+          <a:ext cx="2016399" cy="1209839"/>
+        </a:xfrm>
+        <a:prstGeom prst="roundRect">
+          <a:avLst>
+            <a:gd name="adj" fmla="val 10000"/>
+          </a:avLst>
+        </a:prstGeom>
+        <a:solidFill>
+          <a:schemeClr val="accent1">
+            <a:hueOff val="0"/>
+            <a:satOff val="0"/>
+            <a:lumOff val="0"/>
+            <a:alphaOff val="0"/>
+          </a:schemeClr>
+        </a:solidFill>
+        <a:ln w="25400" cap="flat" cmpd="sng" algn="ctr">
+          <a:solidFill>
+            <a:schemeClr val="lt1">
+              <a:hueOff val="0"/>
+              <a:satOff val="0"/>
+              <a:lumOff val="0"/>
+              <a:alphaOff val="0"/>
+            </a:schemeClr>
+          </a:solidFill>
+          <a:prstDash val="solid"/>
+        </a:ln>
+        <a:effectLst/>
+      </dsp:spPr>
+      <dsp:style>
+        <a:lnRef idx="2">
+          <a:scrgbClr r="0" g="0" b="0"/>
+        </a:lnRef>
+        <a:fillRef idx="1">
+          <a:scrgbClr r="0" g="0" b="0"/>
+        </a:fillRef>
+        <a:effectRef idx="0">
+          <a:scrgbClr r="0" g="0" b="0"/>
+        </a:effectRef>
+        <a:fontRef idx="minor">
+          <a:schemeClr val="lt1"/>
+        </a:fontRef>
+      </dsp:style>
+      <dsp:txBody>
+        <a:bodyPr spcFirstLastPara="0" vert="horz" wrap="square" lIns="87630" tIns="87630" rIns="87630" bIns="87630" numCol="1" spcCol="1270" anchor="ctr" anchorCtr="0">
+          <a:noAutofit/>
+        </a:bodyPr>
+        <a:lstStyle/>
+        <a:p>
+          <a:pPr lvl="0" algn="ctr" defTabSz="1022350" rtl="0">
+            <a:lnSpc>
+              <a:spcPct val="90000"/>
+            </a:lnSpc>
+            <a:spcBef>
+              <a:spcPct val="0"/>
+            </a:spcBef>
+            <a:spcAft>
+              <a:spcPct val="35000"/>
+            </a:spcAft>
+          </a:pPr>
+          <a:r>
+            <a:rPr lang="en-US" altLang="zh-CN" sz="2300" kern="1200" dirty="0" smtClean="0"/>
+            <a:t>Dynamically changing style</a:t>
+          </a:r>
+          <a:endParaRPr lang="zh-CN" sz="2300" kern="1200" dirty="0"/>
+        </a:p>
+      </dsp:txBody>
+      <dsp:txXfrm>
+        <a:off x="5688098" y="196807"/>
+        <a:ext cx="1945529" cy="1138969"/>
+      </dsp:txXfrm>
+    </dsp:sp>
+  </dsp:spTree>
+</dsp:drawing>
+</file>
+
 <file path=ppt/diagrams/layout1.xml><?xml version="1.0" encoding="utf-8"?>
 <dgm:layoutDef xmlns:dgm="http://schemas.openxmlformats.org/drawingml/2006/diagram" xmlns:a="http://schemas.openxmlformats.org/drawingml/2006/main" uniqueId="urn:microsoft.com/office/officeart/2008/layout/LinedList">
   <dgm:title val=""/>
@@ -3095,6 +4465,152 @@
 </dgm:layoutDef>
 </file>
 
+<file path=ppt/diagrams/layout2.xml><?xml version="1.0" encoding="utf-8"?>
+<dgm:layoutDef xmlns:dgm="http://schemas.openxmlformats.org/drawingml/2006/diagram" xmlns:a="http://schemas.openxmlformats.org/drawingml/2006/main" uniqueId="urn:microsoft.com/office/officeart/2005/8/layout/process1">
+  <dgm:title val=""/>
+  <dgm:desc val=""/>
+  <dgm:catLst>
+    <dgm:cat type="process" pri="1000"/>
+    <dgm:cat type="convert" pri="15000"/>
+  </dgm:catLst>
+  <dgm:sampData useDef="1">
+    <dgm:dataModel>
+      <dgm:ptLst/>
+      <dgm:bg/>
+      <dgm:whole/>
+    </dgm:dataModel>
+  </dgm:sampData>
+  <dgm:styleData>
+    <dgm:dataModel>
+      <dgm:ptLst>
+        <dgm:pt modelId="0" type="doc"/>
+        <dgm:pt modelId="1"/>
+        <dgm:pt modelId="2"/>
+      </dgm:ptLst>
+      <dgm:cxnLst>
+        <dgm:cxn modelId="3" srcId="0" destId="1" srcOrd="0" destOrd="0"/>
+        <dgm:cxn modelId="4" srcId="0" destId="2" srcOrd="1" destOrd="0"/>
+      </dgm:cxnLst>
+      <dgm:bg/>
+      <dgm:whole/>
+    </dgm:dataModel>
+  </dgm:styleData>
+  <dgm:clrData>
+    <dgm:dataModel>
+      <dgm:ptLst>
+        <dgm:pt modelId="0" type="doc"/>
+        <dgm:pt modelId="1"/>
+        <dgm:pt modelId="2"/>
+        <dgm:pt modelId="3"/>
+        <dgm:pt modelId="4"/>
+      </dgm:ptLst>
+      <dgm:cxnLst>
+        <dgm:cxn modelId="5" srcId="0" destId="1" srcOrd="0" destOrd="0"/>
+        <dgm:cxn modelId="6" srcId="0" destId="2" srcOrd="1" destOrd="0"/>
+        <dgm:cxn modelId="7" srcId="0" destId="3" srcOrd="2" destOrd="0"/>
+        <dgm:cxn modelId="8" srcId="0" destId="4" srcOrd="3" destOrd="0"/>
+      </dgm:cxnLst>
+      <dgm:bg/>
+      <dgm:whole/>
+    </dgm:dataModel>
+  </dgm:clrData>
+  <dgm:layoutNode name="Name0">
+    <dgm:varLst>
+      <dgm:dir/>
+      <dgm:resizeHandles val="exact"/>
+    </dgm:varLst>
+    <dgm:choose name="Name1">
+      <dgm:if name="Name2" func="var" arg="dir" op="equ" val="norm">
+        <dgm:alg type="lin"/>
+      </dgm:if>
+      <dgm:else name="Name3">
+        <dgm:alg type="lin">
+          <dgm:param type="linDir" val="fromR"/>
+        </dgm:alg>
+      </dgm:else>
+    </dgm:choose>
+    <dgm:shape xmlns:r="http://schemas.openxmlformats.org/officeDocument/2006/relationships" r:blip="">
+      <dgm:adjLst/>
+    </dgm:shape>
+    <dgm:presOf/>
+    <dgm:constrLst>
+      <dgm:constr type="w" for="ch" ptType="node" refType="w"/>
+      <dgm:constr type="h" for="ch" ptType="node" op="equ"/>
+      <dgm:constr type="primFontSz" for="ch" ptType="node" op="equ" val="65"/>
+      <dgm:constr type="w" for="ch" ptType="sibTrans" refType="w" refFor="ch" refPtType="node" op="equ" fact="0.4"/>
+      <dgm:constr type="h" for="ch" ptType="sibTrans" op="equ"/>
+      <dgm:constr type="primFontSz" for="des" forName="connectorText" op="equ" val="55"/>
+      <dgm:constr type="primFontSz" for="des" forName="connectorText" refType="primFontSz" refFor="ch" refPtType="node" op="lte" fact="0.8"/>
+    </dgm:constrLst>
+    <dgm:ruleLst/>
+    <dgm:forEach name="nodesForEach" axis="ch" ptType="node">
+      <dgm:layoutNode name="node">
+        <dgm:varLst>
+          <dgm:bulletEnabled val="1"/>
+        </dgm:varLst>
+        <dgm:alg type="tx"/>
+        <dgm:shape xmlns:r="http://schemas.openxmlformats.org/officeDocument/2006/relationships" type="roundRect" r:blip="">
+          <dgm:adjLst>
+            <dgm:adj idx="1" val="0.1"/>
+          </dgm:adjLst>
+        </dgm:shape>
+        <dgm:presOf axis="desOrSelf" ptType="node"/>
+        <dgm:constrLst>
+          <dgm:constr type="h" refType="w" fact="0.6"/>
+          <dgm:constr type="tMarg" refType="primFontSz" fact="0.3"/>
+          <dgm:constr type="bMarg" refType="primFontSz" fact="0.3"/>
+          <dgm:constr type="lMarg" refType="primFontSz" fact="0.3"/>
+          <dgm:constr type="rMarg" refType="primFontSz" fact="0.3"/>
+        </dgm:constrLst>
+        <dgm:ruleLst>
+          <dgm:rule type="primFontSz" val="18" fact="NaN" max="NaN"/>
+          <dgm:rule type="h" val="NaN" fact="1.5" max="NaN"/>
+          <dgm:rule type="primFontSz" val="5" fact="NaN" max="NaN"/>
+          <dgm:rule type="h" val="INF" fact="NaN" max="NaN"/>
+        </dgm:ruleLst>
+      </dgm:layoutNode>
+      <dgm:forEach name="sibTransForEach" axis="followSib" ptType="sibTrans" cnt="1">
+        <dgm:layoutNode name="sibTrans">
+          <dgm:alg type="conn">
+            <dgm:param type="begPts" val="auto"/>
+            <dgm:param type="endPts" val="auto"/>
+          </dgm:alg>
+          <dgm:shape xmlns:r="http://schemas.openxmlformats.org/officeDocument/2006/relationships" type="conn" r:blip="">
+            <dgm:adjLst/>
+          </dgm:shape>
+          <dgm:presOf axis="self"/>
+          <dgm:constrLst>
+            <dgm:constr type="h" refType="w" fact="0.62"/>
+            <dgm:constr type="connDist"/>
+            <dgm:constr type="begPad" refType="connDist" fact="0.25"/>
+            <dgm:constr type="endPad" refType="connDist" fact="0.22"/>
+          </dgm:constrLst>
+          <dgm:ruleLst/>
+          <dgm:layoutNode name="connectorText">
+            <dgm:alg type="tx">
+              <dgm:param type="autoTxRot" val="grav"/>
+            </dgm:alg>
+            <dgm:shape xmlns:r="http://schemas.openxmlformats.org/officeDocument/2006/relationships" type="conn" r:blip="" hideGeom="1">
+              <dgm:adjLst/>
+            </dgm:shape>
+            <dgm:presOf axis="self"/>
+            <dgm:constrLst>
+              <dgm:constr type="lMarg"/>
+              <dgm:constr type="rMarg"/>
+              <dgm:constr type="tMarg"/>
+              <dgm:constr type="bMarg"/>
+            </dgm:constrLst>
+            <dgm:ruleLst>
+              <dgm:rule type="primFontSz" val="5" fact="NaN" max="NaN"/>
+            </dgm:ruleLst>
+          </dgm:layoutNode>
+        </dgm:layoutNode>
+      </dgm:forEach>
+    </dgm:forEach>
+  </dgm:layoutNode>
+</dgm:layoutDef>
+</file>
+
 <file path=ppt/diagrams/quickStyle1.xml><?xml version="1.0" encoding="utf-8"?>
 <dgm:styleDef xmlns:dgm="http://schemas.openxmlformats.org/drawingml/2006/diagram" xmlns:a="http://schemas.openxmlformats.org/drawingml/2006/main" uniqueId="urn:microsoft.com/office/officeart/2005/8/quickstyle/simple4">
   <dgm:title val=""/>
@@ -4101,6 +5617,1040 @@
         <a:scrgbClr r="0" g="0" b="0"/>
       </a:fillRef>
       <a:effectRef idx="2">
+        <a:scrgbClr r="0" g="0" b="0"/>
+      </a:effectRef>
+      <a:fontRef idx="minor"/>
+    </dgm:style>
+  </dgm:styleLbl>
+  <dgm:styleLbl name="revTx">
+    <dgm:scene3d>
+      <a:camera prst="orthographicFront"/>
+      <a:lightRig rig="threePt" dir="t"/>
+    </dgm:scene3d>
+    <dgm:sp3d/>
+    <dgm:txPr/>
+    <dgm:style>
+      <a:lnRef idx="0">
+        <a:scrgbClr r="0" g="0" b="0"/>
+      </a:lnRef>
+      <a:fillRef idx="0">
+        <a:scrgbClr r="0" g="0" b="0"/>
+      </a:fillRef>
+      <a:effectRef idx="0">
+        <a:scrgbClr r="0" g="0" b="0"/>
+      </a:effectRef>
+      <a:fontRef idx="minor"/>
+    </dgm:style>
+  </dgm:styleLbl>
+</dgm:styleDef>
+</file>
+
+<file path=ppt/diagrams/quickStyle2.xml><?xml version="1.0" encoding="utf-8"?>
+<dgm:styleDef xmlns:dgm="http://schemas.openxmlformats.org/drawingml/2006/diagram" xmlns:a="http://schemas.openxmlformats.org/drawingml/2006/main" uniqueId="urn:microsoft.com/office/officeart/2005/8/quickstyle/simple1">
+  <dgm:title val=""/>
+  <dgm:desc val=""/>
+  <dgm:catLst>
+    <dgm:cat type="simple" pri="10100"/>
+  </dgm:catLst>
+  <dgm:scene3d>
+    <a:camera prst="orthographicFront"/>
+    <a:lightRig rig="threePt" dir="t"/>
+  </dgm:scene3d>
+  <dgm:styleLbl name="node0">
+    <dgm:scene3d>
+      <a:camera prst="orthographicFront"/>
+      <a:lightRig rig="threePt" dir="t"/>
+    </dgm:scene3d>
+    <dgm:sp3d/>
+    <dgm:txPr/>
+    <dgm:style>
+      <a:lnRef idx="2">
+        <a:scrgbClr r="0" g="0" b="0"/>
+      </a:lnRef>
+      <a:fillRef idx="1">
+        <a:scrgbClr r="0" g="0" b="0"/>
+      </a:fillRef>
+      <a:effectRef idx="0">
+        <a:scrgbClr r="0" g="0" b="0"/>
+      </a:effectRef>
+      <a:fontRef idx="minor">
+        <a:schemeClr val="lt1"/>
+      </a:fontRef>
+    </dgm:style>
+  </dgm:styleLbl>
+  <dgm:styleLbl name="lnNode1">
+    <dgm:scene3d>
+      <a:camera prst="orthographicFront"/>
+      <a:lightRig rig="threePt" dir="t"/>
+    </dgm:scene3d>
+    <dgm:sp3d/>
+    <dgm:txPr/>
+    <dgm:style>
+      <a:lnRef idx="2">
+        <a:scrgbClr r="0" g="0" b="0"/>
+      </a:lnRef>
+      <a:fillRef idx="1">
+        <a:scrgbClr r="0" g="0" b="0"/>
+      </a:fillRef>
+      <a:effectRef idx="0">
+        <a:scrgbClr r="0" g="0" b="0"/>
+      </a:effectRef>
+      <a:fontRef idx="minor">
+        <a:schemeClr val="lt1"/>
+      </a:fontRef>
+    </dgm:style>
+  </dgm:styleLbl>
+  <dgm:styleLbl name="vennNode1">
+    <dgm:scene3d>
+      <a:camera prst="orthographicFront"/>
+      <a:lightRig rig="threePt" dir="t"/>
+    </dgm:scene3d>
+    <dgm:sp3d/>
+    <dgm:txPr/>
+    <dgm:style>
+      <a:lnRef idx="2">
+        <a:scrgbClr r="0" g="0" b="0"/>
+      </a:lnRef>
+      <a:fillRef idx="1">
+        <a:scrgbClr r="0" g="0" b="0"/>
+      </a:fillRef>
+      <a:effectRef idx="0">
+        <a:scrgbClr r="0" g="0" b="0"/>
+      </a:effectRef>
+      <a:fontRef idx="minor">
+        <a:schemeClr val="tx1"/>
+      </a:fontRef>
+    </dgm:style>
+  </dgm:styleLbl>
+  <dgm:styleLbl name="alignNode1">
+    <dgm:scene3d>
+      <a:camera prst="orthographicFront"/>
+      <a:lightRig rig="threePt" dir="t"/>
+    </dgm:scene3d>
+    <dgm:sp3d/>
+    <dgm:txPr/>
+    <dgm:style>
+      <a:lnRef idx="2">
+        <a:scrgbClr r="0" g="0" b="0"/>
+      </a:lnRef>
+      <a:fillRef idx="1">
+        <a:scrgbClr r="0" g="0" b="0"/>
+      </a:fillRef>
+      <a:effectRef idx="0">
+        <a:scrgbClr r="0" g="0" b="0"/>
+      </a:effectRef>
+      <a:fontRef idx="minor">
+        <a:schemeClr val="lt1"/>
+      </a:fontRef>
+    </dgm:style>
+  </dgm:styleLbl>
+  <dgm:styleLbl name="node1">
+    <dgm:scene3d>
+      <a:camera prst="orthographicFront"/>
+      <a:lightRig rig="threePt" dir="t"/>
+    </dgm:scene3d>
+    <dgm:sp3d/>
+    <dgm:txPr/>
+    <dgm:style>
+      <a:lnRef idx="2">
+        <a:scrgbClr r="0" g="0" b="0"/>
+      </a:lnRef>
+      <a:fillRef idx="1">
+        <a:scrgbClr r="0" g="0" b="0"/>
+      </a:fillRef>
+      <a:effectRef idx="0">
+        <a:scrgbClr r="0" g="0" b="0"/>
+      </a:effectRef>
+      <a:fontRef idx="minor">
+        <a:schemeClr val="lt1"/>
+      </a:fontRef>
+    </dgm:style>
+  </dgm:styleLbl>
+  <dgm:styleLbl name="node2">
+    <dgm:scene3d>
+      <a:camera prst="orthographicFront"/>
+      <a:lightRig rig="threePt" dir="t"/>
+    </dgm:scene3d>
+    <dgm:sp3d/>
+    <dgm:txPr/>
+    <dgm:style>
+      <a:lnRef idx="2">
+        <a:scrgbClr r="0" g="0" b="0"/>
+      </a:lnRef>
+      <a:fillRef idx="1">
+        <a:scrgbClr r="0" g="0" b="0"/>
+      </a:fillRef>
+      <a:effectRef idx="0">
+        <a:scrgbClr r="0" g="0" b="0"/>
+      </a:effectRef>
+      <a:fontRef idx="minor">
+        <a:schemeClr val="lt1"/>
+      </a:fontRef>
+    </dgm:style>
+  </dgm:styleLbl>
+  <dgm:styleLbl name="node3">
+    <dgm:scene3d>
+      <a:camera prst="orthographicFront"/>
+      <a:lightRig rig="threePt" dir="t"/>
+    </dgm:scene3d>
+    <dgm:sp3d/>
+    <dgm:txPr/>
+    <dgm:style>
+      <a:lnRef idx="2">
+        <a:scrgbClr r="0" g="0" b="0"/>
+      </a:lnRef>
+      <a:fillRef idx="1">
+        <a:scrgbClr r="0" g="0" b="0"/>
+      </a:fillRef>
+      <a:effectRef idx="0">
+        <a:scrgbClr r="0" g="0" b="0"/>
+      </a:effectRef>
+      <a:fontRef idx="minor">
+        <a:schemeClr val="lt1"/>
+      </a:fontRef>
+    </dgm:style>
+  </dgm:styleLbl>
+  <dgm:styleLbl name="node4">
+    <dgm:scene3d>
+      <a:camera prst="orthographicFront"/>
+      <a:lightRig rig="threePt" dir="t"/>
+    </dgm:scene3d>
+    <dgm:sp3d/>
+    <dgm:txPr/>
+    <dgm:style>
+      <a:lnRef idx="2">
+        <a:scrgbClr r="0" g="0" b="0"/>
+      </a:lnRef>
+      <a:fillRef idx="1">
+        <a:scrgbClr r="0" g="0" b="0"/>
+      </a:fillRef>
+      <a:effectRef idx="0">
+        <a:scrgbClr r="0" g="0" b="0"/>
+      </a:effectRef>
+      <a:fontRef idx="minor">
+        <a:schemeClr val="lt1"/>
+      </a:fontRef>
+    </dgm:style>
+  </dgm:styleLbl>
+  <dgm:styleLbl name="fgImgPlace1">
+    <dgm:scene3d>
+      <a:camera prst="orthographicFront"/>
+      <a:lightRig rig="threePt" dir="t"/>
+    </dgm:scene3d>
+    <dgm:sp3d/>
+    <dgm:txPr/>
+    <dgm:style>
+      <a:lnRef idx="2">
+        <a:scrgbClr r="0" g="0" b="0"/>
+      </a:lnRef>
+      <a:fillRef idx="1">
+        <a:scrgbClr r="0" g="0" b="0"/>
+      </a:fillRef>
+      <a:effectRef idx="0">
+        <a:scrgbClr r="0" g="0" b="0"/>
+      </a:effectRef>
+      <a:fontRef idx="minor"/>
+    </dgm:style>
+  </dgm:styleLbl>
+  <dgm:styleLbl name="alignImgPlace1">
+    <dgm:scene3d>
+      <a:camera prst="orthographicFront"/>
+      <a:lightRig rig="threePt" dir="t"/>
+    </dgm:scene3d>
+    <dgm:sp3d/>
+    <dgm:txPr/>
+    <dgm:style>
+      <a:lnRef idx="2">
+        <a:scrgbClr r="0" g="0" b="0"/>
+      </a:lnRef>
+      <a:fillRef idx="1">
+        <a:scrgbClr r="0" g="0" b="0"/>
+      </a:fillRef>
+      <a:effectRef idx="0">
+        <a:scrgbClr r="0" g="0" b="0"/>
+      </a:effectRef>
+      <a:fontRef idx="minor"/>
+    </dgm:style>
+  </dgm:styleLbl>
+  <dgm:styleLbl name="bgImgPlace1">
+    <dgm:scene3d>
+      <a:camera prst="orthographicFront"/>
+      <a:lightRig rig="threePt" dir="t"/>
+    </dgm:scene3d>
+    <dgm:sp3d/>
+    <dgm:txPr/>
+    <dgm:style>
+      <a:lnRef idx="2">
+        <a:scrgbClr r="0" g="0" b="0"/>
+      </a:lnRef>
+      <a:fillRef idx="1">
+        <a:scrgbClr r="0" g="0" b="0"/>
+      </a:fillRef>
+      <a:effectRef idx="0">
+        <a:scrgbClr r="0" g="0" b="0"/>
+      </a:effectRef>
+      <a:fontRef idx="minor"/>
+    </dgm:style>
+  </dgm:styleLbl>
+  <dgm:styleLbl name="sibTrans2D1">
+    <dgm:scene3d>
+      <a:camera prst="orthographicFront"/>
+      <a:lightRig rig="threePt" dir="t"/>
+    </dgm:scene3d>
+    <dgm:sp3d/>
+    <dgm:txPr/>
+    <dgm:style>
+      <a:lnRef idx="0">
+        <a:scrgbClr r="0" g="0" b="0"/>
+      </a:lnRef>
+      <a:fillRef idx="1">
+        <a:scrgbClr r="0" g="0" b="0"/>
+      </a:fillRef>
+      <a:effectRef idx="0">
+        <a:scrgbClr r="0" g="0" b="0"/>
+      </a:effectRef>
+      <a:fontRef idx="minor">
+        <a:schemeClr val="lt1"/>
+      </a:fontRef>
+    </dgm:style>
+  </dgm:styleLbl>
+  <dgm:styleLbl name="fgSibTrans2D1">
+    <dgm:scene3d>
+      <a:camera prst="orthographicFront"/>
+      <a:lightRig rig="threePt" dir="t"/>
+    </dgm:scene3d>
+    <dgm:sp3d/>
+    <dgm:txPr/>
+    <dgm:style>
+      <a:lnRef idx="0">
+        <a:scrgbClr r="0" g="0" b="0"/>
+      </a:lnRef>
+      <a:fillRef idx="1">
+        <a:scrgbClr r="0" g="0" b="0"/>
+      </a:fillRef>
+      <a:effectRef idx="0">
+        <a:scrgbClr r="0" g="0" b="0"/>
+      </a:effectRef>
+      <a:fontRef idx="minor">
+        <a:schemeClr val="lt1"/>
+      </a:fontRef>
+    </dgm:style>
+  </dgm:styleLbl>
+  <dgm:styleLbl name="bgSibTrans2D1">
+    <dgm:scene3d>
+      <a:camera prst="orthographicFront"/>
+      <a:lightRig rig="threePt" dir="t"/>
+    </dgm:scene3d>
+    <dgm:sp3d/>
+    <dgm:txPr/>
+    <dgm:style>
+      <a:lnRef idx="0">
+        <a:scrgbClr r="0" g="0" b="0"/>
+      </a:lnRef>
+      <a:fillRef idx="1">
+        <a:scrgbClr r="0" g="0" b="0"/>
+      </a:fillRef>
+      <a:effectRef idx="0">
+        <a:scrgbClr r="0" g="0" b="0"/>
+      </a:effectRef>
+      <a:fontRef idx="minor">
+        <a:schemeClr val="lt1"/>
+      </a:fontRef>
+    </dgm:style>
+  </dgm:styleLbl>
+  <dgm:styleLbl name="sibTrans1D1">
+    <dgm:scene3d>
+      <a:camera prst="orthographicFront"/>
+      <a:lightRig rig="threePt" dir="t"/>
+    </dgm:scene3d>
+    <dgm:sp3d/>
+    <dgm:txPr/>
+    <dgm:style>
+      <a:lnRef idx="1">
+        <a:scrgbClr r="0" g="0" b="0"/>
+      </a:lnRef>
+      <a:fillRef idx="0">
+        <a:scrgbClr r="0" g="0" b="0"/>
+      </a:fillRef>
+      <a:effectRef idx="0">
+        <a:scrgbClr r="0" g="0" b="0"/>
+      </a:effectRef>
+      <a:fontRef idx="minor"/>
+    </dgm:style>
+  </dgm:styleLbl>
+  <dgm:styleLbl name="callout">
+    <dgm:scene3d>
+      <a:camera prst="orthographicFront"/>
+      <a:lightRig rig="threePt" dir="t"/>
+    </dgm:scene3d>
+    <dgm:sp3d/>
+    <dgm:txPr/>
+    <dgm:style>
+      <a:lnRef idx="2">
+        <a:scrgbClr r="0" g="0" b="0"/>
+      </a:lnRef>
+      <a:fillRef idx="1">
+        <a:scrgbClr r="0" g="0" b="0"/>
+      </a:fillRef>
+      <a:effectRef idx="0">
+        <a:scrgbClr r="0" g="0" b="0"/>
+      </a:effectRef>
+      <a:fontRef idx="minor"/>
+    </dgm:style>
+  </dgm:styleLbl>
+  <dgm:styleLbl name="asst0">
+    <dgm:scene3d>
+      <a:camera prst="orthographicFront"/>
+      <a:lightRig rig="threePt" dir="t"/>
+    </dgm:scene3d>
+    <dgm:sp3d/>
+    <dgm:txPr/>
+    <dgm:style>
+      <a:lnRef idx="2">
+        <a:scrgbClr r="0" g="0" b="0"/>
+      </a:lnRef>
+      <a:fillRef idx="1">
+        <a:scrgbClr r="0" g="0" b="0"/>
+      </a:fillRef>
+      <a:effectRef idx="0">
+        <a:scrgbClr r="0" g="0" b="0"/>
+      </a:effectRef>
+      <a:fontRef idx="minor">
+        <a:schemeClr val="lt1"/>
+      </a:fontRef>
+    </dgm:style>
+  </dgm:styleLbl>
+  <dgm:styleLbl name="asst1">
+    <dgm:scene3d>
+      <a:camera prst="orthographicFront"/>
+      <a:lightRig rig="threePt" dir="t"/>
+    </dgm:scene3d>
+    <dgm:sp3d/>
+    <dgm:txPr/>
+    <dgm:style>
+      <a:lnRef idx="2">
+        <a:scrgbClr r="0" g="0" b="0"/>
+      </a:lnRef>
+      <a:fillRef idx="1">
+        <a:scrgbClr r="0" g="0" b="0"/>
+      </a:fillRef>
+      <a:effectRef idx="0">
+        <a:scrgbClr r="0" g="0" b="0"/>
+      </a:effectRef>
+      <a:fontRef idx="minor">
+        <a:schemeClr val="lt1"/>
+      </a:fontRef>
+    </dgm:style>
+  </dgm:styleLbl>
+  <dgm:styleLbl name="asst2">
+    <dgm:scene3d>
+      <a:camera prst="orthographicFront"/>
+      <a:lightRig rig="threePt" dir="t"/>
+    </dgm:scene3d>
+    <dgm:sp3d/>
+    <dgm:txPr/>
+    <dgm:style>
+      <a:lnRef idx="2">
+        <a:scrgbClr r="0" g="0" b="0"/>
+      </a:lnRef>
+      <a:fillRef idx="1">
+        <a:scrgbClr r="0" g="0" b="0"/>
+      </a:fillRef>
+      <a:effectRef idx="0">
+        <a:scrgbClr r="0" g="0" b="0"/>
+      </a:effectRef>
+      <a:fontRef idx="minor">
+        <a:schemeClr val="lt1"/>
+      </a:fontRef>
+    </dgm:style>
+  </dgm:styleLbl>
+  <dgm:styleLbl name="asst3">
+    <dgm:scene3d>
+      <a:camera prst="orthographicFront"/>
+      <a:lightRig rig="threePt" dir="t"/>
+    </dgm:scene3d>
+    <dgm:sp3d/>
+    <dgm:txPr/>
+    <dgm:style>
+      <a:lnRef idx="2">
+        <a:scrgbClr r="0" g="0" b="0"/>
+      </a:lnRef>
+      <a:fillRef idx="1">
+        <a:scrgbClr r="0" g="0" b="0"/>
+      </a:fillRef>
+      <a:effectRef idx="0">
+        <a:scrgbClr r="0" g="0" b="0"/>
+      </a:effectRef>
+      <a:fontRef idx="minor">
+        <a:schemeClr val="lt1"/>
+      </a:fontRef>
+    </dgm:style>
+  </dgm:styleLbl>
+  <dgm:styleLbl name="asst4">
+    <dgm:scene3d>
+      <a:camera prst="orthographicFront"/>
+      <a:lightRig rig="threePt" dir="t"/>
+    </dgm:scene3d>
+    <dgm:sp3d/>
+    <dgm:txPr/>
+    <dgm:style>
+      <a:lnRef idx="2">
+        <a:scrgbClr r="0" g="0" b="0"/>
+      </a:lnRef>
+      <a:fillRef idx="1">
+        <a:scrgbClr r="0" g="0" b="0"/>
+      </a:fillRef>
+      <a:effectRef idx="0">
+        <a:scrgbClr r="0" g="0" b="0"/>
+      </a:effectRef>
+      <a:fontRef idx="minor">
+        <a:schemeClr val="lt1"/>
+      </a:fontRef>
+    </dgm:style>
+  </dgm:styleLbl>
+  <dgm:styleLbl name="parChTrans2D1">
+    <dgm:scene3d>
+      <a:camera prst="orthographicFront"/>
+      <a:lightRig rig="threePt" dir="t"/>
+    </dgm:scene3d>
+    <dgm:sp3d/>
+    <dgm:txPr/>
+    <dgm:style>
+      <a:lnRef idx="2">
+        <a:scrgbClr r="0" g="0" b="0"/>
+      </a:lnRef>
+      <a:fillRef idx="1">
+        <a:scrgbClr r="0" g="0" b="0"/>
+      </a:fillRef>
+      <a:effectRef idx="0">
+        <a:scrgbClr r="0" g="0" b="0"/>
+      </a:effectRef>
+      <a:fontRef idx="minor">
+        <a:schemeClr val="lt1"/>
+      </a:fontRef>
+    </dgm:style>
+  </dgm:styleLbl>
+  <dgm:styleLbl name="parChTrans2D2">
+    <dgm:scene3d>
+      <a:camera prst="orthographicFront"/>
+      <a:lightRig rig="threePt" dir="t"/>
+    </dgm:scene3d>
+    <dgm:sp3d/>
+    <dgm:txPr/>
+    <dgm:style>
+      <a:lnRef idx="2">
+        <a:scrgbClr r="0" g="0" b="0"/>
+      </a:lnRef>
+      <a:fillRef idx="1">
+        <a:scrgbClr r="0" g="0" b="0"/>
+      </a:fillRef>
+      <a:effectRef idx="0">
+        <a:scrgbClr r="0" g="0" b="0"/>
+      </a:effectRef>
+      <a:fontRef idx="minor">
+        <a:schemeClr val="lt1"/>
+      </a:fontRef>
+    </dgm:style>
+  </dgm:styleLbl>
+  <dgm:styleLbl name="parChTrans2D3">
+    <dgm:scene3d>
+      <a:camera prst="orthographicFront"/>
+      <a:lightRig rig="threePt" dir="t"/>
+    </dgm:scene3d>
+    <dgm:sp3d/>
+    <dgm:txPr/>
+    <dgm:style>
+      <a:lnRef idx="2">
+        <a:scrgbClr r="0" g="0" b="0"/>
+      </a:lnRef>
+      <a:fillRef idx="1">
+        <a:scrgbClr r="0" g="0" b="0"/>
+      </a:fillRef>
+      <a:effectRef idx="0">
+        <a:scrgbClr r="0" g="0" b="0"/>
+      </a:effectRef>
+      <a:fontRef idx="minor">
+        <a:schemeClr val="lt1"/>
+      </a:fontRef>
+    </dgm:style>
+  </dgm:styleLbl>
+  <dgm:styleLbl name="parChTrans2D4">
+    <dgm:scene3d>
+      <a:camera prst="orthographicFront"/>
+      <a:lightRig rig="threePt" dir="t"/>
+    </dgm:scene3d>
+    <dgm:sp3d/>
+    <dgm:txPr/>
+    <dgm:style>
+      <a:lnRef idx="2">
+        <a:scrgbClr r="0" g="0" b="0"/>
+      </a:lnRef>
+      <a:fillRef idx="1">
+        <a:scrgbClr r="0" g="0" b="0"/>
+      </a:fillRef>
+      <a:effectRef idx="0">
+        <a:scrgbClr r="0" g="0" b="0"/>
+      </a:effectRef>
+      <a:fontRef idx="minor">
+        <a:schemeClr val="lt1"/>
+      </a:fontRef>
+    </dgm:style>
+  </dgm:styleLbl>
+  <dgm:styleLbl name="parChTrans1D1">
+    <dgm:scene3d>
+      <a:camera prst="orthographicFront"/>
+      <a:lightRig rig="threePt" dir="t"/>
+    </dgm:scene3d>
+    <dgm:sp3d/>
+    <dgm:txPr/>
+    <dgm:style>
+      <a:lnRef idx="2">
+        <a:scrgbClr r="0" g="0" b="0"/>
+      </a:lnRef>
+      <a:fillRef idx="0">
+        <a:scrgbClr r="0" g="0" b="0"/>
+      </a:fillRef>
+      <a:effectRef idx="0">
+        <a:scrgbClr r="0" g="0" b="0"/>
+      </a:effectRef>
+      <a:fontRef idx="minor"/>
+    </dgm:style>
+  </dgm:styleLbl>
+  <dgm:styleLbl name="parChTrans1D2">
+    <dgm:scene3d>
+      <a:camera prst="orthographicFront"/>
+      <a:lightRig rig="threePt" dir="t"/>
+    </dgm:scene3d>
+    <dgm:sp3d/>
+    <dgm:txPr/>
+    <dgm:style>
+      <a:lnRef idx="2">
+        <a:scrgbClr r="0" g="0" b="0"/>
+      </a:lnRef>
+      <a:fillRef idx="0">
+        <a:scrgbClr r="0" g="0" b="0"/>
+      </a:fillRef>
+      <a:effectRef idx="0">
+        <a:scrgbClr r="0" g="0" b="0"/>
+      </a:effectRef>
+      <a:fontRef idx="minor"/>
+    </dgm:style>
+  </dgm:styleLbl>
+  <dgm:styleLbl name="parChTrans1D3">
+    <dgm:scene3d>
+      <a:camera prst="orthographicFront"/>
+      <a:lightRig rig="threePt" dir="t"/>
+    </dgm:scene3d>
+    <dgm:sp3d/>
+    <dgm:txPr/>
+    <dgm:style>
+      <a:lnRef idx="2">
+        <a:scrgbClr r="0" g="0" b="0"/>
+      </a:lnRef>
+      <a:fillRef idx="0">
+        <a:scrgbClr r="0" g="0" b="0"/>
+      </a:fillRef>
+      <a:effectRef idx="0">
+        <a:scrgbClr r="0" g="0" b="0"/>
+      </a:effectRef>
+      <a:fontRef idx="minor"/>
+    </dgm:style>
+  </dgm:styleLbl>
+  <dgm:styleLbl name="parChTrans1D4">
+    <dgm:scene3d>
+      <a:camera prst="orthographicFront"/>
+      <a:lightRig rig="threePt" dir="t"/>
+    </dgm:scene3d>
+    <dgm:sp3d/>
+    <dgm:txPr/>
+    <dgm:style>
+      <a:lnRef idx="2">
+        <a:scrgbClr r="0" g="0" b="0"/>
+      </a:lnRef>
+      <a:fillRef idx="0">
+        <a:scrgbClr r="0" g="0" b="0"/>
+      </a:fillRef>
+      <a:effectRef idx="0">
+        <a:scrgbClr r="0" g="0" b="0"/>
+      </a:effectRef>
+      <a:fontRef idx="minor"/>
+    </dgm:style>
+  </dgm:styleLbl>
+  <dgm:styleLbl name="fgAcc1">
+    <dgm:scene3d>
+      <a:camera prst="orthographicFront"/>
+      <a:lightRig rig="threePt" dir="t"/>
+    </dgm:scene3d>
+    <dgm:sp3d/>
+    <dgm:txPr/>
+    <dgm:style>
+      <a:lnRef idx="2">
+        <a:scrgbClr r="0" g="0" b="0"/>
+      </a:lnRef>
+      <a:fillRef idx="1">
+        <a:scrgbClr r="0" g="0" b="0"/>
+      </a:fillRef>
+      <a:effectRef idx="0">
+        <a:scrgbClr r="0" g="0" b="0"/>
+      </a:effectRef>
+      <a:fontRef idx="minor"/>
+    </dgm:style>
+  </dgm:styleLbl>
+  <dgm:styleLbl name="conFgAcc1">
+    <dgm:scene3d>
+      <a:camera prst="orthographicFront"/>
+      <a:lightRig rig="threePt" dir="t"/>
+    </dgm:scene3d>
+    <dgm:sp3d/>
+    <dgm:txPr/>
+    <dgm:style>
+      <a:lnRef idx="2">
+        <a:scrgbClr r="0" g="0" b="0"/>
+      </a:lnRef>
+      <a:fillRef idx="1">
+        <a:scrgbClr r="0" g="0" b="0"/>
+      </a:fillRef>
+      <a:effectRef idx="0">
+        <a:scrgbClr r="0" g="0" b="0"/>
+      </a:effectRef>
+      <a:fontRef idx="minor"/>
+    </dgm:style>
+  </dgm:styleLbl>
+  <dgm:styleLbl name="alignAcc1">
+    <dgm:scene3d>
+      <a:camera prst="orthographicFront"/>
+      <a:lightRig rig="threePt" dir="t"/>
+    </dgm:scene3d>
+    <dgm:sp3d/>
+    <dgm:txPr/>
+    <dgm:style>
+      <a:lnRef idx="2">
+        <a:scrgbClr r="0" g="0" b="0"/>
+      </a:lnRef>
+      <a:fillRef idx="1">
+        <a:scrgbClr r="0" g="0" b="0"/>
+      </a:fillRef>
+      <a:effectRef idx="0">
+        <a:scrgbClr r="0" g="0" b="0"/>
+      </a:effectRef>
+      <a:fontRef idx="minor"/>
+    </dgm:style>
+  </dgm:styleLbl>
+  <dgm:styleLbl name="trAlignAcc1">
+    <dgm:scene3d>
+      <a:camera prst="orthographicFront"/>
+      <a:lightRig rig="threePt" dir="t"/>
+    </dgm:scene3d>
+    <dgm:sp3d/>
+    <dgm:txPr/>
+    <dgm:style>
+      <a:lnRef idx="1">
+        <a:scrgbClr r="0" g="0" b="0"/>
+      </a:lnRef>
+      <a:fillRef idx="1">
+        <a:scrgbClr r="0" g="0" b="0"/>
+      </a:fillRef>
+      <a:effectRef idx="0">
+        <a:scrgbClr r="0" g="0" b="0"/>
+      </a:effectRef>
+      <a:fontRef idx="minor"/>
+    </dgm:style>
+  </dgm:styleLbl>
+  <dgm:styleLbl name="bgAcc1">
+    <dgm:scene3d>
+      <a:camera prst="orthographicFront"/>
+      <a:lightRig rig="threePt" dir="t"/>
+    </dgm:scene3d>
+    <dgm:sp3d/>
+    <dgm:txPr/>
+    <dgm:style>
+      <a:lnRef idx="2">
+        <a:scrgbClr r="0" g="0" b="0"/>
+      </a:lnRef>
+      <a:fillRef idx="1">
+        <a:scrgbClr r="0" g="0" b="0"/>
+      </a:fillRef>
+      <a:effectRef idx="0">
+        <a:scrgbClr r="0" g="0" b="0"/>
+      </a:effectRef>
+      <a:fontRef idx="minor"/>
+    </dgm:style>
+  </dgm:styleLbl>
+  <dgm:styleLbl name="solidFgAcc1">
+    <dgm:scene3d>
+      <a:camera prst="orthographicFront"/>
+      <a:lightRig rig="threePt" dir="t"/>
+    </dgm:scene3d>
+    <dgm:sp3d/>
+    <dgm:txPr/>
+    <dgm:style>
+      <a:lnRef idx="2">
+        <a:scrgbClr r="0" g="0" b="0"/>
+      </a:lnRef>
+      <a:fillRef idx="1">
+        <a:scrgbClr r="0" g="0" b="0"/>
+      </a:fillRef>
+      <a:effectRef idx="0">
+        <a:scrgbClr r="0" g="0" b="0"/>
+      </a:effectRef>
+      <a:fontRef idx="minor"/>
+    </dgm:style>
+  </dgm:styleLbl>
+  <dgm:styleLbl name="solidAlignAcc1">
+    <dgm:scene3d>
+      <a:camera prst="orthographicFront"/>
+      <a:lightRig rig="threePt" dir="t"/>
+    </dgm:scene3d>
+    <dgm:sp3d/>
+    <dgm:txPr/>
+    <dgm:style>
+      <a:lnRef idx="2">
+        <a:scrgbClr r="0" g="0" b="0"/>
+      </a:lnRef>
+      <a:fillRef idx="1">
+        <a:scrgbClr r="0" g="0" b="0"/>
+      </a:fillRef>
+      <a:effectRef idx="0">
+        <a:scrgbClr r="0" g="0" b="0"/>
+      </a:effectRef>
+      <a:fontRef idx="minor"/>
+    </dgm:style>
+  </dgm:styleLbl>
+  <dgm:styleLbl name="solidBgAcc1">
+    <dgm:scene3d>
+      <a:camera prst="orthographicFront"/>
+      <a:lightRig rig="threePt" dir="t"/>
+    </dgm:scene3d>
+    <dgm:sp3d/>
+    <dgm:txPr/>
+    <dgm:style>
+      <a:lnRef idx="2">
+        <a:scrgbClr r="0" g="0" b="0"/>
+      </a:lnRef>
+      <a:fillRef idx="1">
+        <a:scrgbClr r="0" g="0" b="0"/>
+      </a:fillRef>
+      <a:effectRef idx="0">
+        <a:scrgbClr r="0" g="0" b="0"/>
+      </a:effectRef>
+      <a:fontRef idx="minor"/>
+    </dgm:style>
+  </dgm:styleLbl>
+  <dgm:styleLbl name="fgAccFollowNode1">
+    <dgm:scene3d>
+      <a:camera prst="orthographicFront"/>
+      <a:lightRig rig="threePt" dir="t"/>
+    </dgm:scene3d>
+    <dgm:sp3d/>
+    <dgm:txPr/>
+    <dgm:style>
+      <a:lnRef idx="2">
+        <a:scrgbClr r="0" g="0" b="0"/>
+      </a:lnRef>
+      <a:fillRef idx="1">
+        <a:scrgbClr r="0" g="0" b="0"/>
+      </a:fillRef>
+      <a:effectRef idx="0">
+        <a:scrgbClr r="0" g="0" b="0"/>
+      </a:effectRef>
+      <a:fontRef idx="minor"/>
+    </dgm:style>
+  </dgm:styleLbl>
+  <dgm:styleLbl name="alignAccFollowNode1">
+    <dgm:scene3d>
+      <a:camera prst="orthographicFront"/>
+      <a:lightRig rig="threePt" dir="t"/>
+    </dgm:scene3d>
+    <dgm:sp3d/>
+    <dgm:txPr/>
+    <dgm:style>
+      <a:lnRef idx="2">
+        <a:scrgbClr r="0" g="0" b="0"/>
+      </a:lnRef>
+      <a:fillRef idx="1">
+        <a:scrgbClr r="0" g="0" b="0"/>
+      </a:fillRef>
+      <a:effectRef idx="0">
+        <a:scrgbClr r="0" g="0" b="0"/>
+      </a:effectRef>
+      <a:fontRef idx="minor"/>
+    </dgm:style>
+  </dgm:styleLbl>
+  <dgm:styleLbl name="bgAccFollowNode1">
+    <dgm:scene3d>
+      <a:camera prst="orthographicFront"/>
+      <a:lightRig rig="threePt" dir="t"/>
+    </dgm:scene3d>
+    <dgm:sp3d/>
+    <dgm:txPr/>
+    <dgm:style>
+      <a:lnRef idx="2">
+        <a:scrgbClr r="0" g="0" b="0"/>
+      </a:lnRef>
+      <a:fillRef idx="1">
+        <a:scrgbClr r="0" g="0" b="0"/>
+      </a:fillRef>
+      <a:effectRef idx="0">
+        <a:scrgbClr r="0" g="0" b="0"/>
+      </a:effectRef>
+      <a:fontRef idx="minor"/>
+    </dgm:style>
+  </dgm:styleLbl>
+  <dgm:styleLbl name="fgAcc0">
+    <dgm:scene3d>
+      <a:camera prst="orthographicFront"/>
+      <a:lightRig rig="threePt" dir="t"/>
+    </dgm:scene3d>
+    <dgm:sp3d/>
+    <dgm:txPr/>
+    <dgm:style>
+      <a:lnRef idx="2">
+        <a:scrgbClr r="0" g="0" b="0"/>
+      </a:lnRef>
+      <a:fillRef idx="1">
+        <a:scrgbClr r="0" g="0" b="0"/>
+      </a:fillRef>
+      <a:effectRef idx="0">
+        <a:scrgbClr r="0" g="0" b="0"/>
+      </a:effectRef>
+      <a:fontRef idx="minor"/>
+    </dgm:style>
+  </dgm:styleLbl>
+  <dgm:styleLbl name="fgAcc2">
+    <dgm:scene3d>
+      <a:camera prst="orthographicFront"/>
+      <a:lightRig rig="threePt" dir="t"/>
+    </dgm:scene3d>
+    <dgm:sp3d/>
+    <dgm:txPr/>
+    <dgm:style>
+      <a:lnRef idx="2">
+        <a:scrgbClr r="0" g="0" b="0"/>
+      </a:lnRef>
+      <a:fillRef idx="1">
+        <a:scrgbClr r="0" g="0" b="0"/>
+      </a:fillRef>
+      <a:effectRef idx="0">
+        <a:scrgbClr r="0" g="0" b="0"/>
+      </a:effectRef>
+      <a:fontRef idx="minor"/>
+    </dgm:style>
+  </dgm:styleLbl>
+  <dgm:styleLbl name="fgAcc3">
+    <dgm:scene3d>
+      <a:camera prst="orthographicFront"/>
+      <a:lightRig rig="threePt" dir="t"/>
+    </dgm:scene3d>
+    <dgm:sp3d/>
+    <dgm:txPr/>
+    <dgm:style>
+      <a:lnRef idx="2">
+        <a:scrgbClr r="0" g="0" b="0"/>
+      </a:lnRef>
+      <a:fillRef idx="1">
+        <a:scrgbClr r="0" g="0" b="0"/>
+      </a:fillRef>
+      <a:effectRef idx="0">
+        <a:scrgbClr r="0" g="0" b="0"/>
+      </a:effectRef>
+      <a:fontRef idx="minor"/>
+    </dgm:style>
+  </dgm:styleLbl>
+  <dgm:styleLbl name="fgAcc4">
+    <dgm:scene3d>
+      <a:camera prst="orthographicFront"/>
+      <a:lightRig rig="threePt" dir="t"/>
+    </dgm:scene3d>
+    <dgm:sp3d/>
+    <dgm:txPr/>
+    <dgm:style>
+      <a:lnRef idx="2">
+        <a:scrgbClr r="0" g="0" b="0"/>
+      </a:lnRef>
+      <a:fillRef idx="1">
+        <a:scrgbClr r="0" g="0" b="0"/>
+      </a:fillRef>
+      <a:effectRef idx="0">
+        <a:scrgbClr r="0" g="0" b="0"/>
+      </a:effectRef>
+      <a:fontRef idx="minor"/>
+    </dgm:style>
+  </dgm:styleLbl>
+  <dgm:styleLbl name="bgShp">
+    <dgm:scene3d>
+      <a:camera prst="orthographicFront"/>
+      <a:lightRig rig="threePt" dir="t"/>
+    </dgm:scene3d>
+    <dgm:sp3d/>
+    <dgm:txPr/>
+    <dgm:style>
+      <a:lnRef idx="0">
+        <a:scrgbClr r="0" g="0" b="0"/>
+      </a:lnRef>
+      <a:fillRef idx="1">
+        <a:scrgbClr r="0" g="0" b="0"/>
+      </a:fillRef>
+      <a:effectRef idx="0">
+        <a:scrgbClr r="0" g="0" b="0"/>
+      </a:effectRef>
+      <a:fontRef idx="minor"/>
+    </dgm:style>
+  </dgm:styleLbl>
+  <dgm:styleLbl name="dkBgShp">
+    <dgm:scene3d>
+      <a:camera prst="orthographicFront"/>
+      <a:lightRig rig="threePt" dir="t"/>
+    </dgm:scene3d>
+    <dgm:sp3d/>
+    <dgm:txPr/>
+    <dgm:style>
+      <a:lnRef idx="0">
+        <a:scrgbClr r="0" g="0" b="0"/>
+      </a:lnRef>
+      <a:fillRef idx="1">
+        <a:scrgbClr r="0" g="0" b="0"/>
+      </a:fillRef>
+      <a:effectRef idx="0">
+        <a:scrgbClr r="0" g="0" b="0"/>
+      </a:effectRef>
+      <a:fontRef idx="minor"/>
+    </dgm:style>
+  </dgm:styleLbl>
+  <dgm:styleLbl name="trBgShp">
+    <dgm:scene3d>
+      <a:camera prst="orthographicFront"/>
+      <a:lightRig rig="threePt" dir="t"/>
+    </dgm:scene3d>
+    <dgm:sp3d/>
+    <dgm:txPr/>
+    <dgm:style>
+      <a:lnRef idx="0">
+        <a:scrgbClr r="0" g="0" b="0"/>
+      </a:lnRef>
+      <a:fillRef idx="1">
+        <a:scrgbClr r="0" g="0" b="0"/>
+      </a:fillRef>
+      <a:effectRef idx="0">
+        <a:scrgbClr r="0" g="0" b="0"/>
+      </a:effectRef>
+      <a:fontRef idx="minor"/>
+    </dgm:style>
+  </dgm:styleLbl>
+  <dgm:styleLbl name="fgShp">
+    <dgm:scene3d>
+      <a:camera prst="orthographicFront"/>
+      <a:lightRig rig="threePt" dir="t"/>
+    </dgm:scene3d>
+    <dgm:sp3d/>
+    <dgm:txPr/>
+    <dgm:style>
+      <a:lnRef idx="2">
+        <a:scrgbClr r="0" g="0" b="0"/>
+      </a:lnRef>
+      <a:fillRef idx="1">
+        <a:scrgbClr r="0" g="0" b="0"/>
+      </a:fillRef>
+      <a:effectRef idx="0">
         <a:scrgbClr r="0" g="0" b="0"/>
       </a:effectRef>
       <a:fontRef idx="minor"/>
@@ -4163,7 +6713,7 @@
           <a:p>
             <a:fld id="{4251665B-C24A-4702-B522-6A4334602E03}" type="datetimeFigureOut">
               <a:rPr lang="en-US" smtClean="0"/>
-              <a:t>13/08/15</a:t>
+              <a:t>8/13/2015</a:t>
             </a:fld>
             <a:endParaRPr lang="en-US"/>
           </a:p>
@@ -4920,7 +7470,7 @@
           <a:p>
             <a:fld id="{4251665B-C24A-4702-B522-6A4334602E03}" type="datetimeFigureOut">
               <a:rPr lang="en-US" smtClean="0"/>
-              <a:t>13/08/15</a:t>
+              <a:t>8/13/2015</a:t>
             </a:fld>
             <a:endParaRPr lang="en-US"/>
           </a:p>
@@ -5544,7 +8094,7 @@
           <a:p>
             <a:fld id="{4251665B-C24A-4702-B522-6A4334602E03}" type="datetimeFigureOut">
               <a:rPr lang="en-US" smtClean="0"/>
-              <a:t>13/08/15</a:t>
+              <a:t>8/13/2015</a:t>
             </a:fld>
             <a:endParaRPr lang="en-US"/>
           </a:p>
@@ -5967,7 +8517,7 @@
           <a:p>
             <a:fld id="{4251665B-C24A-4702-B522-6A4334602E03}" type="datetimeFigureOut">
               <a:rPr lang="en-US" smtClean="0"/>
-              <a:t>13/08/15</a:t>
+              <a:t>8/13/2015</a:t>
             </a:fld>
             <a:endParaRPr lang="en-US"/>
           </a:p>
@@ -6144,7 +8694,7 @@
           <a:p>
             <a:fld id="{4251665B-C24A-4702-B522-6A4334602E03}" type="datetimeFigureOut">
               <a:rPr lang="en-US" smtClean="0"/>
-              <a:t>13/08/15</a:t>
+              <a:t>8/13/2015</a:t>
             </a:fld>
             <a:endParaRPr lang="en-US"/>
           </a:p>
@@ -6961,7 +9511,7 @@
           <a:p>
             <a:fld id="{4251665B-C24A-4702-B522-6A4334602E03}" type="datetimeFigureOut">
               <a:rPr lang="en-US" smtClean="0"/>
-              <a:t>13/08/15</a:t>
+              <a:t>8/13/2015</a:t>
             </a:fld>
             <a:endParaRPr lang="en-US"/>
           </a:p>
@@ -7472,7 +10022,7 @@
           <a:p>
             <a:fld id="{4251665B-C24A-4702-B522-6A4334602E03}" type="datetimeFigureOut">
               <a:rPr lang="en-US" smtClean="0"/>
-              <a:t>13/08/15</a:t>
+              <a:t>8/13/2015</a:t>
             </a:fld>
             <a:endParaRPr lang="en-US"/>
           </a:p>
@@ -7705,7 +10255,7 @@
           <a:p>
             <a:fld id="{4251665B-C24A-4702-B522-6A4334602E03}" type="datetimeFigureOut">
               <a:rPr lang="en-US" smtClean="0"/>
-              <a:t>13/08/15</a:t>
+              <a:t>8/13/2015</a:t>
             </a:fld>
             <a:endParaRPr lang="en-US"/>
           </a:p>
@@ -8230,7 +10780,7 @@
           <a:p>
             <a:fld id="{4251665B-C24A-4702-B522-6A4334602E03}" type="datetimeFigureOut">
               <a:rPr lang="en-US" smtClean="0"/>
-              <a:t>13/08/15</a:t>
+              <a:t>8/13/2015</a:t>
             </a:fld>
             <a:endParaRPr lang="en-US"/>
           </a:p>
@@ -8365,7 +10915,7 @@
           <a:p>
             <a:fld id="{4251665B-C24A-4702-B522-6A4334602E03}" type="datetimeFigureOut">
               <a:rPr lang="en-US" smtClean="0"/>
-              <a:t>13/08/15</a:t>
+              <a:t>8/13/2015</a:t>
             </a:fld>
             <a:endParaRPr lang="en-US"/>
           </a:p>
@@ -9263,7 +11813,7 @@
           <a:p>
             <a:fld id="{4251665B-C24A-4702-B522-6A4334602E03}" type="datetimeFigureOut">
               <a:rPr lang="en-US" smtClean="0"/>
-              <a:t>13/08/15</a:t>
+              <a:t>8/13/2015</a:t>
             </a:fld>
             <a:endParaRPr lang="en-US"/>
           </a:p>
@@ -9386,7 +11936,7 @@
           <a:p>
             <a:fld id="{4251665B-C24A-4702-B522-6A4334602E03}" type="datetimeFigureOut">
               <a:rPr lang="en-US" smtClean="0"/>
-              <a:t>13/08/15</a:t>
+              <a:t>8/13/2015</a:t>
             </a:fld>
             <a:endParaRPr lang="en-US"/>
           </a:p>
@@ -10270,7 +12820,7 @@
           <a:p>
             <a:fld id="{4251665B-C24A-4702-B522-6A4334602E03}" type="datetimeFigureOut">
               <a:rPr lang="en-US" smtClean="0"/>
-              <a:t>13/08/15</a:t>
+              <a:t>8/13/2015</a:t>
             </a:fld>
             <a:endParaRPr lang="en-US"/>
           </a:p>
@@ -10918,7 +13468,7 @@
           <a:p>
             <a:fld id="{4251665B-C24A-4702-B522-6A4334602E03}" type="datetimeFigureOut">
               <a:rPr lang="en-US" smtClean="0"/>
-              <a:t>13/08/15</a:t>
+              <a:t>8/13/2015</a:t>
             </a:fld>
             <a:endParaRPr lang="en-US"/>
           </a:p>
@@ -11234,7 +13784,7 @@
           <a:p>
             <a:fld id="{4251665B-C24A-4702-B522-6A4334602E03}" type="datetimeFigureOut">
               <a:rPr lang="en-US" smtClean="0"/>
-              <a:t>13/08/15</a:t>
+              <a:t>8/13/2015</a:t>
             </a:fld>
             <a:endParaRPr lang="en-US"/>
           </a:p>
@@ -11324,7 +13874,7 @@
           <a:p>
             <a:fld id="{4251665B-C24A-4702-B522-6A4334602E03}" type="datetimeFigureOut">
               <a:rPr lang="en-US" smtClean="0"/>
-              <a:t>13/08/15</a:t>
+              <a:t>8/13/2015</a:t>
             </a:fld>
             <a:endParaRPr lang="en-US"/>
           </a:p>
@@ -11652,7 +14202,7 @@
           <a:p>
             <a:fld id="{4251665B-C24A-4702-B522-6A4334602E03}" type="datetimeFigureOut">
               <a:rPr lang="en-US" smtClean="0"/>
-              <a:t>13/08/15</a:t>
+              <a:t>8/13/2015</a:t>
             </a:fld>
             <a:endParaRPr lang="en-US"/>
           </a:p>
@@ -12189,7 +14739,6 @@
               <a:rPr lang="en-GB" sz="3200" dirty="0" smtClean="0"/>
               <a:t>Project Plan</a:t>
             </a:r>
-            <a:endParaRPr lang="en-GB" sz="3200" dirty="0" smtClean="0"/>
           </a:p>
           <a:p>
             <a:pPr algn="r"/>
@@ -12202,15 +14751,7 @@
             <a:pPr algn="r"/>
             <a:r>
               <a:rPr lang="en-GB" dirty="0" smtClean="0"/>
-              <a:t>14</a:t>
-            </a:r>
-            <a:r>
-              <a:rPr lang="en-GB" dirty="0" smtClean="0"/>
-              <a:t> </a:t>
-            </a:r>
-            <a:r>
-              <a:rPr lang="en-GB" dirty="0" smtClean="0"/>
-              <a:t>Aug. 2015</a:t>
+              <a:t>14 Aug. 2015</a:t>
             </a:r>
             <a:endParaRPr lang="en-GB" dirty="0"/>
           </a:p>
@@ -12264,15 +14805,805 @@
             <a:pPr algn="l"/>
             <a:r>
               <a:rPr lang="en-GB" dirty="0" smtClean="0"/>
-              <a:t>8</a:t>
+              <a:t>6. Scrum PM Tool (3)</a:t>
+            </a:r>
+            <a:endParaRPr lang="en-GB" dirty="0"/>
+          </a:p>
+        </p:txBody>
+      </p:sp>
+      <p:sp>
+        <p:nvSpPr>
+          <p:cNvPr id="3" name="TextBox 2"/>
+          <p:cNvSpPr txBox="1"/>
+          <p:nvPr/>
+        </p:nvSpPr>
+        <p:spPr>
+          <a:xfrm>
+            <a:off x="284163" y="1717960"/>
+            <a:ext cx="8574087" cy="1015663"/>
+          </a:xfrm>
+          <a:prstGeom prst="rect">
+            <a:avLst/>
+          </a:prstGeom>
+          <a:noFill/>
+        </p:spPr>
+        <p:txBody>
+          <a:bodyPr wrap="square" rtlCol="0">
+            <a:spAutoFit/>
+          </a:bodyPr>
+          <a:lstStyle/>
+          <a:p>
+            <a:r>
+              <a:rPr lang="en-NZ" sz="2400" b="1" dirty="0" smtClean="0"/>
+              <a:t>SeeNowDo</a:t>
+            </a:r>
+          </a:p>
+          <a:p>
+            <a:pPr marL="742950" lvl="1" indent="-285750">
+              <a:buFont typeface="Wingdings" pitchFamily="2" charset="2"/>
+              <a:buChar char="v"/>
+            </a:pPr>
+            <a:endParaRPr lang="en-NZ" b="1" dirty="0" smtClean="0"/>
+          </a:p>
+          <a:p>
+            <a:pPr marL="742950" lvl="1" indent="-285750">
+              <a:buFont typeface="Wingdings" pitchFamily="2" charset="2"/>
+              <a:buChar char="v"/>
+            </a:pPr>
+            <a:r>
+              <a:rPr lang="en-NZ" dirty="0" smtClean="0"/>
+              <a:t>Image of Burn-Down Chart</a:t>
+            </a:r>
+          </a:p>
+        </p:txBody>
+      </p:sp>
+      <p:pic>
+        <p:nvPicPr>
+          <p:cNvPr id="3077" name="Picture 5"/>
+          <p:cNvPicPr>
+            <a:picLocks noChangeAspect="1" noChangeArrowheads="1"/>
+          </p:cNvPicPr>
+          <p:nvPr/>
+        </p:nvPicPr>
+        <p:blipFill>
+          <a:blip r:embed="rId2" cstate="email">
+            <a:extLst>
+              <a:ext uri="{28A0092B-C50C-407E-A947-70E740481C1C}">
+                <a14:useLocalDpi xmlns:a14="http://schemas.microsoft.com/office/drawing/2010/main" val="0"/>
+              </a:ext>
+            </a:extLst>
+          </a:blip>
+          <a:srcRect/>
+          <a:stretch>
+            <a:fillRect/>
+          </a:stretch>
+        </p:blipFill>
+        <p:spPr bwMode="auto">
+          <a:xfrm>
+            <a:off x="1131310" y="2733624"/>
+            <a:ext cx="5477308" cy="4000282"/>
+          </a:xfrm>
+          <a:prstGeom prst="rect">
+            <a:avLst/>
+          </a:prstGeom>
+          <a:noFill/>
+          <a:ln>
+            <a:noFill/>
+          </a:ln>
+          <a:effectLst/>
+          <a:extLst>
+            <a:ext uri="{909E8E84-426E-40DD-AFC4-6F175D3DCCD1}">
+              <a14:hiddenFill xmlns:a14="http://schemas.microsoft.com/office/drawing/2010/main">
+                <a:solidFill>
+                  <a:schemeClr val="accent1"/>
+                </a:solidFill>
+              </a14:hiddenFill>
+            </a:ext>
+            <a:ext uri="{91240B29-F687-4F45-9708-019B960494DF}">
+              <a14:hiddenLine xmlns:a14="http://schemas.microsoft.com/office/drawing/2010/main" w="9525">
+                <a:solidFill>
+                  <a:schemeClr val="tx1"/>
+                </a:solidFill>
+                <a:miter lim="800000"/>
+                <a:headEnd/>
+                <a:tailEnd/>
+              </a14:hiddenLine>
+            </a:ext>
+            <a:ext uri="{AF507438-7753-43E0-B8FC-AC1667EBCBE1}">
+              <a14:hiddenEffects xmlns:a14="http://schemas.microsoft.com/office/drawing/2010/main">
+                <a:effectLst>
+                  <a:outerShdw dist="35921" dir="2700000" algn="ctr" rotWithShape="0">
+                    <a:schemeClr val="bg2"/>
+                  </a:outerShdw>
+                </a:effectLst>
+              </a14:hiddenEffects>
+            </a:ext>
+          </a:extLst>
+        </p:spPr>
+      </p:pic>
+    </p:spTree>
+    <p:extLst>
+      <p:ext uri="{BB962C8B-B14F-4D97-AF65-F5344CB8AC3E}">
+        <p14:creationId xmlns:p14="http://schemas.microsoft.com/office/powerpoint/2010/main" val="2767928531"/>
+      </p:ext>
+    </p:extLst>
+  </p:cSld>
+  <p:clrMapOvr>
+    <a:masterClrMapping/>
+  </p:clrMapOvr>
+</p:sld>
+</file>
+
+<file path=ppt/slides/slide11.xml><?xml version="1.0" encoding="utf-8"?>
+<p:sld xmlns:a="http://schemas.openxmlformats.org/drawingml/2006/main" xmlns:r="http://schemas.openxmlformats.org/officeDocument/2006/relationships" xmlns:p="http://schemas.openxmlformats.org/presentationml/2006/main">
+  <p:cSld>
+    <p:spTree>
+      <p:nvGrpSpPr>
+        <p:cNvPr id="1" name=""/>
+        <p:cNvGrpSpPr/>
+        <p:nvPr/>
+      </p:nvGrpSpPr>
+      <p:grpSpPr>
+        <a:xfrm>
+          <a:off x="0" y="0"/>
+          <a:ext cx="0" cy="0"/>
+          <a:chOff x="0" y="0"/>
+          <a:chExt cx="0" cy="0"/>
+        </a:xfrm>
+      </p:grpSpPr>
+      <p:sp>
+        <p:nvSpPr>
+          <p:cNvPr id="2" name="标题 1"/>
+          <p:cNvSpPr>
+            <a:spLocks noGrp="1"/>
+          </p:cNvSpPr>
+          <p:nvPr>
+            <p:ph type="title"/>
+          </p:nvPr>
+        </p:nvSpPr>
+        <p:spPr/>
+        <p:txBody>
+          <a:bodyPr/>
+          <a:lstStyle/>
+          <a:p>
+            <a:pPr algn="l"/>
+            <a:r>
+              <a:rPr lang="en-GB" dirty="0"/>
+              <a:t>7</a:t>
             </a:r>
             <a:r>
               <a:rPr lang="en-GB" dirty="0" smtClean="0"/>
-              <a:t>. Risk </a:t>
+              <a:t>. One User </a:t>
             </a:r>
             <a:r>
               <a:rPr lang="en-GB" dirty="0" smtClean="0"/>
-              <a:t>Management</a:t>
+              <a:t>Story (1)</a:t>
+            </a:r>
+            <a:endParaRPr lang="en-GB" dirty="0"/>
+          </a:p>
+        </p:txBody>
+      </p:sp>
+      <p:sp>
+        <p:nvSpPr>
+          <p:cNvPr id="3" name="圆角矩形 2"/>
+          <p:cNvSpPr/>
+          <p:nvPr/>
+        </p:nvSpPr>
+        <p:spPr>
+          <a:xfrm>
+            <a:off x="566671" y="2331076"/>
+            <a:ext cx="7675809" cy="2434108"/>
+          </a:xfrm>
+          <a:prstGeom prst="roundRect">
+            <a:avLst/>
+          </a:prstGeom>
+          <a:solidFill>
+            <a:schemeClr val="tx1">
+              <a:lumMod val="65000"/>
+              <a:lumOff val="35000"/>
+            </a:schemeClr>
+          </a:solidFill>
+        </p:spPr>
+        <p:style>
+          <a:lnRef idx="1">
+            <a:schemeClr val="accent1"/>
+          </a:lnRef>
+          <a:fillRef idx="3">
+            <a:schemeClr val="accent1"/>
+          </a:fillRef>
+          <a:effectRef idx="2">
+            <a:schemeClr val="accent1"/>
+          </a:effectRef>
+          <a:fontRef idx="minor">
+            <a:schemeClr val="lt1"/>
+          </a:fontRef>
+        </p:style>
+        <p:txBody>
+          <a:bodyPr rtlCol="0" anchor="ctr"/>
+          <a:lstStyle/>
+          <a:p>
+            <a:r>
+              <a:rPr lang="en-US" altLang="zh-CN" sz="2800" dirty="0" smtClean="0"/>
+              <a:t>User story #1</a:t>
+            </a:r>
+          </a:p>
+          <a:p>
+            <a:endParaRPr lang="en-US" altLang="zh-CN" dirty="0"/>
+          </a:p>
+          <a:p>
+            <a:r>
+              <a:rPr lang="en-US" altLang="zh-CN" dirty="0" smtClean="0"/>
+              <a:t>As </a:t>
+            </a:r>
+            <a:r>
+              <a:rPr lang="en-US" altLang="zh-CN" dirty="0"/>
+              <a:t>visitor, </a:t>
+            </a:r>
+            <a:r>
+              <a:rPr lang="en-US" altLang="zh-CN" dirty="0" smtClean="0"/>
+              <a:t>when </a:t>
+            </a:r>
+            <a:r>
+              <a:rPr lang="en-US" altLang="zh-CN" dirty="0"/>
+              <a:t>I use </a:t>
+            </a:r>
+            <a:r>
+              <a:rPr lang="en-US" altLang="zh-CN" dirty="0" smtClean="0"/>
+              <a:t>mobile devices (phones and pads) to access the website, </a:t>
+            </a:r>
+            <a:r>
+              <a:rPr lang="en-US" altLang="zh-CN" dirty="0"/>
+              <a:t>I want </a:t>
+            </a:r>
+            <a:r>
+              <a:rPr lang="en-US" altLang="zh-CN" dirty="0" smtClean="0"/>
+              <a:t>to see </a:t>
+            </a:r>
+            <a:r>
+              <a:rPr lang="en-US" altLang="zh-CN" dirty="0"/>
+              <a:t>that </a:t>
+            </a:r>
+            <a:r>
+              <a:rPr lang="en-US" altLang="zh-CN" dirty="0" smtClean="0"/>
+              <a:t>the </a:t>
+            </a:r>
+            <a:r>
+              <a:rPr lang="en-US" altLang="zh-CN" dirty="0"/>
+              <a:t>framework </a:t>
+            </a:r>
+            <a:r>
+              <a:rPr lang="en-US" altLang="zh-CN" dirty="0" smtClean="0"/>
+              <a:t>(</a:t>
+            </a:r>
+            <a:r>
+              <a:rPr lang="en-US" altLang="zh-CN" dirty="0"/>
+              <a:t>the header, </a:t>
+            </a:r>
+            <a:r>
+              <a:rPr lang="en-US" altLang="zh-CN" dirty="0" smtClean="0"/>
+              <a:t>footer </a:t>
+            </a:r>
+            <a:r>
+              <a:rPr lang="en-US" altLang="zh-CN" dirty="0"/>
+              <a:t>and </a:t>
+            </a:r>
+            <a:r>
+              <a:rPr lang="en-US" altLang="zh-CN" dirty="0" smtClean="0"/>
+              <a:t>buttons</a:t>
+            </a:r>
+            <a:r>
+              <a:rPr lang="en-US" altLang="zh-CN" dirty="0"/>
+              <a:t>) of this </a:t>
+            </a:r>
+            <a:r>
+              <a:rPr lang="en-US" altLang="zh-CN" dirty="0" smtClean="0"/>
+              <a:t>website </a:t>
+            </a:r>
+            <a:r>
+              <a:rPr lang="en-US" altLang="zh-CN" dirty="0"/>
+              <a:t>is </a:t>
+            </a:r>
+            <a:r>
+              <a:rPr lang="en-US" altLang="zh-CN" dirty="0" smtClean="0"/>
+              <a:t>suitable </a:t>
+            </a:r>
+            <a:r>
+              <a:rPr lang="en-US" altLang="zh-CN" dirty="0"/>
+              <a:t>for </a:t>
+            </a:r>
+            <a:r>
+              <a:rPr lang="en-US" altLang="zh-CN" dirty="0" smtClean="0"/>
+              <a:t>my using behavior on mobile devices</a:t>
+            </a:r>
+          </a:p>
+          <a:p>
+            <a:r>
+              <a:rPr lang="en-US" altLang="zh-CN" dirty="0" smtClean="0"/>
+              <a:t>So that I </a:t>
+            </a:r>
+            <a:r>
+              <a:rPr lang="en-US" altLang="zh-CN" dirty="0"/>
+              <a:t>can </a:t>
+            </a:r>
+            <a:r>
+              <a:rPr lang="en-US" altLang="zh-CN" dirty="0" smtClean="0"/>
+              <a:t>use this website on </a:t>
+            </a:r>
+            <a:r>
+              <a:rPr lang="en-US" altLang="zh-CN" dirty="0"/>
+              <a:t>mobile </a:t>
+            </a:r>
+            <a:r>
+              <a:rPr lang="en-US" altLang="zh-CN" dirty="0" smtClean="0"/>
+              <a:t>devices </a:t>
+            </a:r>
+            <a:r>
+              <a:rPr lang="en-US" altLang="zh-CN" dirty="0"/>
+              <a:t>as convenient </a:t>
+            </a:r>
+            <a:r>
+              <a:rPr lang="en-US" altLang="zh-CN" dirty="0" smtClean="0"/>
+              <a:t>as on PCs</a:t>
+            </a:r>
+            <a:r>
+              <a:rPr lang="en-US" altLang="zh-CN" dirty="0"/>
+              <a:t>.</a:t>
+            </a:r>
+            <a:endParaRPr lang="zh-CN" altLang="en-US" dirty="0"/>
+          </a:p>
+        </p:txBody>
+      </p:sp>
+    </p:spTree>
+    <p:extLst>
+      <p:ext uri="{BB962C8B-B14F-4D97-AF65-F5344CB8AC3E}">
+        <p14:creationId xmlns:p14="http://schemas.microsoft.com/office/powerpoint/2010/main" val="3078991235"/>
+      </p:ext>
+    </p:extLst>
+  </p:cSld>
+  <p:clrMapOvr>
+    <a:masterClrMapping/>
+  </p:clrMapOvr>
+</p:sld>
+</file>
+
+<file path=ppt/slides/slide12.xml><?xml version="1.0" encoding="utf-8"?>
+<p:sld xmlns:a="http://schemas.openxmlformats.org/drawingml/2006/main" xmlns:r="http://schemas.openxmlformats.org/officeDocument/2006/relationships" xmlns:p="http://schemas.openxmlformats.org/presentationml/2006/main">
+  <p:cSld>
+    <p:spTree>
+      <p:nvGrpSpPr>
+        <p:cNvPr id="1" name=""/>
+        <p:cNvGrpSpPr/>
+        <p:nvPr/>
+      </p:nvGrpSpPr>
+      <p:grpSpPr>
+        <a:xfrm>
+          <a:off x="0" y="0"/>
+          <a:ext cx="0" cy="0"/>
+          <a:chOff x="0" y="0"/>
+          <a:chExt cx="0" cy="0"/>
+        </a:xfrm>
+      </p:grpSpPr>
+      <p:sp>
+        <p:nvSpPr>
+          <p:cNvPr id="2" name="标题 1"/>
+          <p:cNvSpPr>
+            <a:spLocks noGrp="1"/>
+          </p:cNvSpPr>
+          <p:nvPr>
+            <p:ph type="title"/>
+          </p:nvPr>
+        </p:nvSpPr>
+        <p:spPr/>
+        <p:txBody>
+          <a:bodyPr/>
+          <a:lstStyle/>
+          <a:p>
+            <a:pPr algn="l"/>
+            <a:r>
+              <a:rPr lang="en-GB" altLang="zh-CN" dirty="0"/>
+              <a:t>7. One User </a:t>
+            </a:r>
+            <a:r>
+              <a:rPr lang="en-GB" altLang="zh-CN" dirty="0" smtClean="0"/>
+              <a:t>Story (2)</a:t>
+            </a:r>
+            <a:endParaRPr lang="zh-CN" altLang="en-US" dirty="0"/>
+          </a:p>
+        </p:txBody>
+      </p:sp>
+      <p:sp>
+        <p:nvSpPr>
+          <p:cNvPr id="5" name="文本框 4"/>
+          <p:cNvSpPr txBox="1"/>
+          <p:nvPr/>
+        </p:nvSpPr>
+        <p:spPr>
+          <a:xfrm>
+            <a:off x="284163" y="5312226"/>
+            <a:ext cx="5807544" cy="646331"/>
+          </a:xfrm>
+          <a:prstGeom prst="rect">
+            <a:avLst/>
+          </a:prstGeom>
+          <a:noFill/>
+        </p:spPr>
+        <p:txBody>
+          <a:bodyPr wrap="square" rtlCol="0">
+            <a:spAutoFit/>
+          </a:bodyPr>
+          <a:lstStyle/>
+          <a:p>
+            <a:r>
+              <a:rPr lang="en-US" altLang="zh-CN" dirty="0" smtClean="0"/>
+              <a:t>The menu, button, picture and layout may change from PC to phones.</a:t>
+            </a:r>
+            <a:endParaRPr lang="zh-CN" altLang="en-US" dirty="0"/>
+          </a:p>
+        </p:txBody>
+      </p:sp>
+      <p:pic>
+        <p:nvPicPr>
+          <p:cNvPr id="7" name="图片 6"/>
+          <p:cNvPicPr>
+            <a:picLocks noChangeAspect="1"/>
+          </p:cNvPicPr>
+          <p:nvPr/>
+        </p:nvPicPr>
+        <p:blipFill>
+          <a:blip r:embed="rId2" cstate="email">
+            <a:extLst>
+              <a:ext uri="{28A0092B-C50C-407E-A947-70E740481C1C}">
+                <a14:useLocalDpi xmlns:a14="http://schemas.microsoft.com/office/drawing/2010/main" val="0"/>
+              </a:ext>
+            </a:extLst>
+          </a:blip>
+          <a:stretch>
+            <a:fillRect/>
+          </a:stretch>
+        </p:blipFill>
+        <p:spPr>
+          <a:xfrm>
+            <a:off x="284163" y="1895468"/>
+            <a:ext cx="5807544" cy="3119512"/>
+          </a:xfrm>
+          <a:prstGeom prst="rect">
+            <a:avLst/>
+          </a:prstGeom>
+        </p:spPr>
+      </p:pic>
+      <p:pic>
+        <p:nvPicPr>
+          <p:cNvPr id="8" name="图片 7"/>
+          <p:cNvPicPr>
+            <a:picLocks noChangeAspect="1"/>
+          </p:cNvPicPr>
+          <p:nvPr/>
+        </p:nvPicPr>
+        <p:blipFill>
+          <a:blip r:embed="rId3" cstate="email">
+            <a:extLst>
+              <a:ext uri="{28A0092B-C50C-407E-A947-70E740481C1C}">
+                <a14:useLocalDpi xmlns:a14="http://schemas.microsoft.com/office/drawing/2010/main" val="0"/>
+              </a:ext>
+            </a:extLst>
+          </a:blip>
+          <a:stretch>
+            <a:fillRect/>
+          </a:stretch>
+        </p:blipFill>
+        <p:spPr>
+          <a:xfrm>
+            <a:off x="6264767" y="1895468"/>
+            <a:ext cx="2593483" cy="4610637"/>
+          </a:xfrm>
+          <a:prstGeom prst="rect">
+            <a:avLst/>
+          </a:prstGeom>
+        </p:spPr>
+      </p:pic>
+    </p:spTree>
+    <p:extLst>
+      <p:ext uri="{BB962C8B-B14F-4D97-AF65-F5344CB8AC3E}">
+        <p14:creationId xmlns:p14="http://schemas.microsoft.com/office/powerpoint/2010/main" val="3176465026"/>
+      </p:ext>
+    </p:extLst>
+  </p:cSld>
+  <p:clrMapOvr>
+    <a:masterClrMapping/>
+  </p:clrMapOvr>
+</p:sld>
+</file>
+
+<file path=ppt/slides/slide13.xml><?xml version="1.0" encoding="utf-8"?>
+<p:sld xmlns:a="http://schemas.openxmlformats.org/drawingml/2006/main" xmlns:r="http://schemas.openxmlformats.org/officeDocument/2006/relationships" xmlns:p="http://schemas.openxmlformats.org/presentationml/2006/main">
+  <p:cSld>
+    <p:spTree>
+      <p:nvGrpSpPr>
+        <p:cNvPr id="1" name=""/>
+        <p:cNvGrpSpPr/>
+        <p:nvPr/>
+      </p:nvGrpSpPr>
+      <p:grpSpPr>
+        <a:xfrm>
+          <a:off x="0" y="0"/>
+          <a:ext cx="0" cy="0"/>
+          <a:chOff x="0" y="0"/>
+          <a:chExt cx="0" cy="0"/>
+        </a:xfrm>
+      </p:grpSpPr>
+      <p:sp>
+        <p:nvSpPr>
+          <p:cNvPr id="2" name="标题 1"/>
+          <p:cNvSpPr>
+            <a:spLocks noGrp="1"/>
+          </p:cNvSpPr>
+          <p:nvPr>
+            <p:ph type="title"/>
+          </p:nvPr>
+        </p:nvSpPr>
+        <p:spPr/>
+        <p:txBody>
+          <a:bodyPr/>
+          <a:lstStyle/>
+          <a:p>
+            <a:pPr algn="l"/>
+            <a:r>
+              <a:rPr lang="en-GB" dirty="0"/>
+              <a:t>7</a:t>
+            </a:r>
+            <a:r>
+              <a:rPr lang="en-GB" dirty="0" smtClean="0"/>
+              <a:t>. One User </a:t>
+            </a:r>
+            <a:r>
+              <a:rPr lang="en-GB" dirty="0" smtClean="0"/>
+              <a:t>Story (3)</a:t>
+            </a:r>
+            <a:endParaRPr lang="en-GB" dirty="0"/>
+          </a:p>
+        </p:txBody>
+      </p:sp>
+      <p:sp>
+        <p:nvSpPr>
+          <p:cNvPr id="3" name="圆角矩形 2"/>
+          <p:cNvSpPr/>
+          <p:nvPr/>
+        </p:nvSpPr>
+        <p:spPr>
+          <a:xfrm>
+            <a:off x="566671" y="2331076"/>
+            <a:ext cx="7675809" cy="2434108"/>
+          </a:xfrm>
+          <a:prstGeom prst="roundRect">
+            <a:avLst/>
+          </a:prstGeom>
+          <a:solidFill>
+            <a:schemeClr val="tx1">
+              <a:lumMod val="65000"/>
+              <a:lumOff val="35000"/>
+            </a:schemeClr>
+          </a:solidFill>
+        </p:spPr>
+        <p:style>
+          <a:lnRef idx="1">
+            <a:schemeClr val="accent1"/>
+          </a:lnRef>
+          <a:fillRef idx="3">
+            <a:schemeClr val="accent1"/>
+          </a:fillRef>
+          <a:effectRef idx="2">
+            <a:schemeClr val="accent1"/>
+          </a:effectRef>
+          <a:fontRef idx="minor">
+            <a:schemeClr val="lt1"/>
+          </a:fontRef>
+        </p:style>
+        <p:txBody>
+          <a:bodyPr rtlCol="0" anchor="ctr"/>
+          <a:lstStyle/>
+          <a:p>
+            <a:r>
+              <a:rPr lang="en-US" altLang="zh-CN" sz="2800" dirty="0" smtClean="0"/>
+              <a:t>User story #1</a:t>
+            </a:r>
+          </a:p>
+          <a:p>
+            <a:endParaRPr lang="en-US" altLang="zh-CN" dirty="0"/>
+          </a:p>
+          <a:p>
+            <a:r>
+              <a:rPr lang="en-US" altLang="zh-CN" dirty="0" smtClean="0"/>
+              <a:t>As </a:t>
+            </a:r>
+            <a:r>
+              <a:rPr lang="en-US" altLang="zh-CN" dirty="0"/>
+              <a:t>visitor, </a:t>
+            </a:r>
+            <a:r>
+              <a:rPr lang="en-US" altLang="zh-CN" dirty="0" smtClean="0"/>
+              <a:t>when </a:t>
+            </a:r>
+            <a:r>
+              <a:rPr lang="en-US" altLang="zh-CN" dirty="0"/>
+              <a:t>I use </a:t>
+            </a:r>
+            <a:r>
+              <a:rPr lang="en-US" altLang="zh-CN" dirty="0" smtClean="0"/>
+              <a:t>mobile devices (phones and pads) to access the website, </a:t>
+            </a:r>
+            <a:r>
+              <a:rPr lang="en-US" altLang="zh-CN" dirty="0"/>
+              <a:t>I want </a:t>
+            </a:r>
+            <a:r>
+              <a:rPr lang="en-US" altLang="zh-CN" dirty="0" smtClean="0"/>
+              <a:t>to see </a:t>
+            </a:r>
+            <a:r>
+              <a:rPr lang="en-US" altLang="zh-CN" dirty="0"/>
+              <a:t>that </a:t>
+            </a:r>
+            <a:r>
+              <a:rPr lang="en-US" altLang="zh-CN" dirty="0" smtClean="0"/>
+              <a:t>the </a:t>
+            </a:r>
+            <a:r>
+              <a:rPr lang="en-US" altLang="zh-CN" dirty="0"/>
+              <a:t>framework </a:t>
+            </a:r>
+            <a:r>
+              <a:rPr lang="en-US" altLang="zh-CN" dirty="0" smtClean="0"/>
+              <a:t>(</a:t>
+            </a:r>
+            <a:r>
+              <a:rPr lang="en-US" altLang="zh-CN" dirty="0"/>
+              <a:t>the header, </a:t>
+            </a:r>
+            <a:r>
+              <a:rPr lang="en-US" altLang="zh-CN" dirty="0" smtClean="0"/>
+              <a:t>footer </a:t>
+            </a:r>
+            <a:r>
+              <a:rPr lang="en-US" altLang="zh-CN" dirty="0"/>
+              <a:t>and </a:t>
+            </a:r>
+            <a:r>
+              <a:rPr lang="en-US" altLang="zh-CN" dirty="0" smtClean="0"/>
+              <a:t>buttons</a:t>
+            </a:r>
+            <a:r>
+              <a:rPr lang="en-US" altLang="zh-CN" dirty="0"/>
+              <a:t>) of this </a:t>
+            </a:r>
+            <a:r>
+              <a:rPr lang="en-US" altLang="zh-CN" dirty="0" smtClean="0"/>
+              <a:t>website </a:t>
+            </a:r>
+            <a:r>
+              <a:rPr lang="en-US" altLang="zh-CN" dirty="0"/>
+              <a:t>is </a:t>
+            </a:r>
+            <a:r>
+              <a:rPr lang="en-US" altLang="zh-CN" dirty="0" smtClean="0"/>
+              <a:t>suitable </a:t>
+            </a:r>
+            <a:r>
+              <a:rPr lang="en-US" altLang="zh-CN" dirty="0"/>
+              <a:t>for </a:t>
+            </a:r>
+            <a:r>
+              <a:rPr lang="en-US" altLang="zh-CN" dirty="0" smtClean="0"/>
+              <a:t>my using behavior on mobile devices</a:t>
+            </a:r>
+          </a:p>
+          <a:p>
+            <a:r>
+              <a:rPr lang="en-US" altLang="zh-CN" dirty="0" smtClean="0"/>
+              <a:t>So that I </a:t>
+            </a:r>
+            <a:r>
+              <a:rPr lang="en-US" altLang="zh-CN" dirty="0"/>
+              <a:t>can </a:t>
+            </a:r>
+            <a:r>
+              <a:rPr lang="en-US" altLang="zh-CN" dirty="0" smtClean="0"/>
+              <a:t>use this website on </a:t>
+            </a:r>
+            <a:r>
+              <a:rPr lang="en-US" altLang="zh-CN" dirty="0"/>
+              <a:t>mobile </a:t>
+            </a:r>
+            <a:r>
+              <a:rPr lang="en-US" altLang="zh-CN" dirty="0" smtClean="0"/>
+              <a:t>devices </a:t>
+            </a:r>
+            <a:r>
+              <a:rPr lang="en-US" altLang="zh-CN" dirty="0"/>
+              <a:t>as convenient </a:t>
+            </a:r>
+            <a:r>
+              <a:rPr lang="en-US" altLang="zh-CN" dirty="0" smtClean="0"/>
+              <a:t>as on PCs</a:t>
+            </a:r>
+            <a:r>
+              <a:rPr lang="en-US" altLang="zh-CN" dirty="0"/>
+              <a:t>.</a:t>
+            </a:r>
+            <a:endParaRPr lang="zh-CN" altLang="en-US" dirty="0"/>
+          </a:p>
+        </p:txBody>
+      </p:sp>
+      <p:graphicFrame>
+        <p:nvGraphicFramePr>
+          <p:cNvPr id="7" name="图示 6"/>
+          <p:cNvGraphicFramePr/>
+          <p:nvPr>
+            <p:extLst>
+              <p:ext uri="{D42A27DB-BD31-4B8C-83A1-F6EECF244321}">
+                <p14:modId xmlns:p14="http://schemas.microsoft.com/office/powerpoint/2010/main" val="527731126"/>
+              </p:ext>
+            </p:extLst>
+          </p:nvPr>
+        </p:nvGraphicFramePr>
+        <p:xfrm>
+          <a:off x="566671" y="4919730"/>
+          <a:ext cx="7675809" cy="1532585"/>
+        </p:xfrm>
+        <a:graphic>
+          <a:graphicData uri="http://schemas.openxmlformats.org/drawingml/2006/diagram">
+            <dgm:relIds xmlns:dgm="http://schemas.openxmlformats.org/drawingml/2006/diagram" xmlns:r="http://schemas.openxmlformats.org/officeDocument/2006/relationships" r:dm="rId2" r:lo="rId3" r:qs="rId4" r:cs="rId5"/>
+          </a:graphicData>
+        </a:graphic>
+      </p:graphicFrame>
+    </p:spTree>
+    <p:extLst>
+      <p:ext uri="{BB962C8B-B14F-4D97-AF65-F5344CB8AC3E}">
+        <p14:creationId xmlns:p14="http://schemas.microsoft.com/office/powerpoint/2010/main" val="1069557348"/>
+      </p:ext>
+    </p:extLst>
+  </p:cSld>
+  <p:clrMapOvr>
+    <a:masterClrMapping/>
+  </p:clrMapOvr>
+</p:sld>
+</file>
+
+<file path=ppt/slides/slide14.xml><?xml version="1.0" encoding="utf-8"?>
+<p:sld xmlns:a="http://schemas.openxmlformats.org/drawingml/2006/main" xmlns:r="http://schemas.openxmlformats.org/officeDocument/2006/relationships" xmlns:p="http://schemas.openxmlformats.org/presentationml/2006/main">
+  <p:cSld>
+    <p:spTree>
+      <p:nvGrpSpPr>
+        <p:cNvPr id="1" name=""/>
+        <p:cNvGrpSpPr/>
+        <p:nvPr/>
+      </p:nvGrpSpPr>
+      <p:grpSpPr>
+        <a:xfrm>
+          <a:off x="0" y="0"/>
+          <a:ext cx="0" cy="0"/>
+          <a:chOff x="0" y="0"/>
+          <a:chExt cx="0" cy="0"/>
+        </a:xfrm>
+      </p:grpSpPr>
+      <p:sp>
+        <p:nvSpPr>
+          <p:cNvPr id="2" name="标题 1"/>
+          <p:cNvSpPr>
+            <a:spLocks noGrp="1"/>
+          </p:cNvSpPr>
+          <p:nvPr>
+            <p:ph type="title"/>
+          </p:nvPr>
+        </p:nvSpPr>
+        <p:spPr/>
+        <p:txBody>
+          <a:bodyPr/>
+          <a:lstStyle/>
+          <a:p>
+            <a:pPr algn="l"/>
+            <a:r>
+              <a:rPr lang="en-GB" dirty="0" smtClean="0"/>
+              <a:t>8. Risk Management</a:t>
             </a:r>
             <a:endParaRPr lang="en-GB" dirty="0"/>
           </a:p>
@@ -12367,7 +15698,7 @@
   <p:timing>
     <p:tnLst>
       <p:par>
-        <p:cTn xmlns:p14="http://schemas.microsoft.com/office/powerpoint/2010/main" id="1" dur="indefinite" restart="never" nodeType="tmRoot"/>
+        <p:cTn id="1" dur="indefinite" restart="never" nodeType="tmRoot"/>
       </p:par>
     </p:tnLst>
   </p:timing>
@@ -12471,15 +15802,7 @@
             <a:pPr algn="l"/>
             <a:r>
               <a:rPr lang="en-GB" dirty="0" smtClean="0"/>
-              <a:t>2. </a:t>
-            </a:r>
-            <a:r>
-              <a:rPr lang="en-GB" dirty="0" smtClean="0"/>
-              <a:t>Produc</a:t>
-            </a:r>
-            <a:r>
-              <a:rPr lang="en-GB" dirty="0" smtClean="0"/>
-              <a:t>t Owner</a:t>
+              <a:t>2. Product Owner</a:t>
             </a:r>
             <a:endParaRPr lang="en-GB" dirty="0"/>
           </a:p>
@@ -12537,11 +15860,7 @@
             </a:r>
             <a:r>
               <a:rPr lang="en-GB" dirty="0" smtClean="0"/>
-              <a:t>. Project </a:t>
-            </a:r>
-            <a:r>
-              <a:rPr lang="en-GB" dirty="0" smtClean="0"/>
-              <a:t>Goal and Major Capability</a:t>
+              <a:t>. Project Goal and Major Capability</a:t>
             </a:r>
             <a:endParaRPr lang="en-GB" dirty="0"/>
           </a:p>
@@ -12560,7 +15879,7 @@
   <p:timing>
     <p:tnLst>
       <p:par>
-        <p:cTn xmlns:p14="http://schemas.microsoft.com/office/powerpoint/2010/main" id="1" dur="indefinite" restart="never" nodeType="tmRoot"/>
+        <p:cTn id="1" dur="indefinite" restart="never" nodeType="tmRoot"/>
       </p:par>
     </p:tnLst>
   </p:timing>
@@ -12602,11 +15921,7 @@
             <a:pPr algn="l"/>
             <a:r>
               <a:rPr lang="en-GB" dirty="0" smtClean="0"/>
-              <a:t>4. </a:t>
-            </a:r>
-            <a:r>
-              <a:rPr lang="en-GB" dirty="0" smtClean="0"/>
-              <a:t>Product Backlog</a:t>
+              <a:t>4. Product Backlog</a:t>
             </a:r>
             <a:endParaRPr lang="en-GB" dirty="0"/>
           </a:p>
@@ -12664,19 +15979,7 @@
             </a:r>
             <a:r>
               <a:rPr lang="en-GB" dirty="0" smtClean="0"/>
-              <a:t>. </a:t>
-            </a:r>
-            <a:r>
-              <a:rPr lang="en-GB" dirty="0" smtClean="0"/>
-              <a:t>Development</a:t>
-            </a:r>
-            <a:r>
-              <a:rPr lang="en-GB" dirty="0" smtClean="0"/>
-              <a:t> </a:t>
-            </a:r>
-            <a:r>
-              <a:rPr lang="en-GB" dirty="0" smtClean="0"/>
-              <a:t>Plan</a:t>
+              <a:t>. Development Plan</a:t>
             </a:r>
             <a:endParaRPr lang="en-GB" dirty="0"/>
           </a:p>
@@ -12730,16 +16033,169 @@
             <a:pPr algn="l"/>
             <a:r>
               <a:rPr lang="en-GB" dirty="0" smtClean="0"/>
-              <a:t>6</a:t>
-            </a:r>
-            <a:r>
-              <a:rPr lang="en-GB" dirty="0" smtClean="0"/>
-              <a:t>. Scrum PM Tool</a:t>
+              <a:t>6. Scrum PM Tool (1)</a:t>
             </a:r>
             <a:endParaRPr lang="en-GB" dirty="0"/>
           </a:p>
         </p:txBody>
       </p:sp>
+      <p:sp>
+        <p:nvSpPr>
+          <p:cNvPr id="3" name="TextBox 2"/>
+          <p:cNvSpPr txBox="1"/>
+          <p:nvPr/>
+        </p:nvSpPr>
+        <p:spPr>
+          <a:xfrm>
+            <a:off x="284163" y="1717960"/>
+            <a:ext cx="8574087" cy="1569660"/>
+          </a:xfrm>
+          <a:prstGeom prst="rect">
+            <a:avLst/>
+          </a:prstGeom>
+          <a:noFill/>
+        </p:spPr>
+        <p:txBody>
+          <a:bodyPr wrap="square" rtlCol="0">
+            <a:spAutoFit/>
+          </a:bodyPr>
+          <a:lstStyle/>
+          <a:p>
+            <a:r>
+              <a:rPr lang="en-NZ" sz="2400" b="1" dirty="0" smtClean="0"/>
+              <a:t>SeeNowDo</a:t>
+            </a:r>
+          </a:p>
+          <a:p>
+            <a:pPr marL="742950" lvl="1" indent="-285750">
+              <a:buFont typeface="Wingdings" pitchFamily="2" charset="2"/>
+              <a:buChar char="v"/>
+            </a:pPr>
+            <a:r>
+              <a:rPr lang="en-NZ" dirty="0"/>
+              <a:t>URL</a:t>
+            </a:r>
+            <a:r>
+              <a:rPr lang="en-NZ" dirty="0" smtClean="0"/>
+              <a:t>:  	       </a:t>
+            </a:r>
+            <a:r>
+              <a:rPr lang="en-NZ" dirty="0" smtClean="0">
+                <a:hlinkClick r:id="rId2"/>
+              </a:rPr>
+              <a:t>https</a:t>
+            </a:r>
+            <a:r>
+              <a:rPr lang="en-NZ" dirty="0">
+                <a:hlinkClick r:id="rId2"/>
+              </a:rPr>
+              <a:t>://</a:t>
+            </a:r>
+            <a:r>
+              <a:rPr lang="en-NZ" dirty="0" smtClean="0">
+                <a:hlinkClick r:id="rId2"/>
+              </a:rPr>
+              <a:t>www.seenowdo.com/pages/login/index.html</a:t>
+            </a:r>
+            <a:endParaRPr lang="en-NZ" dirty="0" smtClean="0"/>
+          </a:p>
+          <a:p>
+            <a:pPr marL="742950" lvl="1" indent="-285750">
+              <a:buFont typeface="Wingdings" pitchFamily="2" charset="2"/>
+              <a:buChar char="v"/>
+            </a:pPr>
+            <a:r>
+              <a:rPr lang="en-NZ" dirty="0" smtClean="0"/>
+              <a:t>Project Name:  </a:t>
+            </a:r>
+            <a:r>
+              <a:rPr lang="en-NZ" b="1" dirty="0" smtClean="0"/>
+              <a:t>OEE(Android)</a:t>
+            </a:r>
+          </a:p>
+          <a:p>
+            <a:pPr marL="742950" lvl="1" indent="-285750">
+              <a:buFont typeface="Wingdings" pitchFamily="2" charset="2"/>
+              <a:buChar char="v"/>
+            </a:pPr>
+            <a:endParaRPr lang="en-NZ" b="1" dirty="0" smtClean="0"/>
+          </a:p>
+          <a:p>
+            <a:pPr marL="742950" lvl="1" indent="-285750">
+              <a:buFont typeface="Wingdings" pitchFamily="2" charset="2"/>
+              <a:buChar char="v"/>
+            </a:pPr>
+            <a:r>
+              <a:rPr lang="en-NZ" dirty="0" smtClean="0"/>
+              <a:t>Image of project list &amp; iteration list</a:t>
+            </a:r>
+          </a:p>
+        </p:txBody>
+      </p:sp>
+      <p:pic>
+        <p:nvPicPr>
+          <p:cNvPr id="1027" name="Picture 3"/>
+          <p:cNvPicPr>
+            <a:picLocks noChangeAspect="1" noChangeArrowheads="1"/>
+          </p:cNvPicPr>
+          <p:nvPr/>
+        </p:nvPicPr>
+        <p:blipFill>
+          <a:blip r:embed="rId3" cstate="email">
+            <a:extLst>
+              <a:ext uri="{28A0092B-C50C-407E-A947-70E740481C1C}">
+                <a14:useLocalDpi xmlns:a14="http://schemas.microsoft.com/office/drawing/2010/main" val="0"/>
+              </a:ext>
+            </a:extLst>
+          </a:blip>
+          <a:srcRect/>
+          <a:stretch>
+            <a:fillRect/>
+          </a:stretch>
+        </p:blipFill>
+        <p:spPr bwMode="auto">
+          <a:xfrm>
+            <a:off x="1128280" y="3258737"/>
+            <a:ext cx="6311611" cy="3363728"/>
+          </a:xfrm>
+          <a:prstGeom prst="rect">
+            <a:avLst/>
+          </a:prstGeom>
+          <a:noFill/>
+          <a:ln>
+            <a:noFill/>
+          </a:ln>
+          <a:effectLst/>
+          <a:extLst>
+            <a:ext uri="{909E8E84-426E-40DD-AFC4-6F175D3DCCD1}">
+              <a14:hiddenFill xmlns:a14="http://schemas.microsoft.com/office/drawing/2010/main">
+                <a:solidFill>
+                  <a:schemeClr val="accent1"/>
+                </a:solidFill>
+              </a14:hiddenFill>
+            </a:ext>
+            <a:ext uri="{91240B29-F687-4F45-9708-019B960494DF}">
+              <a14:hiddenLine xmlns:a14="http://schemas.microsoft.com/office/drawing/2010/main" w="9525">
+                <a:solidFill>
+                  <a:schemeClr val="tx1"/>
+                </a:solidFill>
+                <a:miter lim="800000"/>
+                <a:headEnd/>
+                <a:tailEnd/>
+              </a14:hiddenLine>
+            </a:ext>
+            <a:ext uri="{AF507438-7753-43E0-B8FC-AC1667EBCBE1}">
+              <a14:hiddenEffects xmlns:a14="http://schemas.microsoft.com/office/drawing/2010/main">
+                <a:effectLst>
+                  <a:outerShdw dist="35921" dir="2700000" algn="ctr" rotWithShape="0">
+                    <a:schemeClr val="bg2"/>
+                  </a:outerShdw>
+                </a:effectLst>
+              </a14:hiddenEffects>
+            </a:ext>
+          </a:extLst>
+        </p:spPr>
+      </p:pic>
     </p:spTree>
     <p:extLst>
       <p:ext uri="{BB962C8B-B14F-4D97-AF65-F5344CB8AC3E}">
@@ -12787,21 +16243,135 @@
           <a:p>
             <a:pPr algn="l"/>
             <a:r>
-              <a:rPr lang="en-GB" dirty="0"/>
-              <a:t>7</a:t>
-            </a:r>
-            <a:r>
               <a:rPr lang="en-GB" dirty="0" smtClean="0"/>
-              <a:t>. One User Story</a:t>
+              <a:t>6. Scrum PM Tool (2)</a:t>
             </a:r>
             <a:endParaRPr lang="en-GB" dirty="0"/>
           </a:p>
         </p:txBody>
       </p:sp>
+      <p:sp>
+        <p:nvSpPr>
+          <p:cNvPr id="3" name="TextBox 2"/>
+          <p:cNvSpPr txBox="1"/>
+          <p:nvPr/>
+        </p:nvSpPr>
+        <p:spPr>
+          <a:xfrm>
+            <a:off x="284163" y="1717960"/>
+            <a:ext cx="8574087" cy="1015663"/>
+          </a:xfrm>
+          <a:prstGeom prst="rect">
+            <a:avLst/>
+          </a:prstGeom>
+          <a:noFill/>
+        </p:spPr>
+        <p:txBody>
+          <a:bodyPr wrap="square" rtlCol="0">
+            <a:spAutoFit/>
+          </a:bodyPr>
+          <a:lstStyle/>
+          <a:p>
+            <a:r>
+              <a:rPr lang="en-NZ" sz="2400" b="1" dirty="0" smtClean="0"/>
+              <a:t>SeeNowDo</a:t>
+            </a:r>
+          </a:p>
+          <a:p>
+            <a:pPr marL="742950" lvl="1" indent="-285750">
+              <a:buFont typeface="Wingdings" pitchFamily="2" charset="2"/>
+              <a:buChar char="v"/>
+            </a:pPr>
+            <a:endParaRPr lang="en-NZ" b="1" dirty="0" smtClean="0"/>
+          </a:p>
+          <a:p>
+            <a:pPr marL="742950" lvl="1" indent="-285750">
+              <a:buFont typeface="Wingdings" pitchFamily="2" charset="2"/>
+              <a:buChar char="v"/>
+            </a:pPr>
+            <a:r>
+              <a:rPr lang="en-NZ" dirty="0" smtClean="0"/>
+              <a:t>Image of User </a:t>
+            </a:r>
+            <a:r>
+              <a:rPr lang="en-NZ" dirty="0"/>
+              <a:t>S</a:t>
+            </a:r>
+            <a:r>
+              <a:rPr lang="en-NZ" dirty="0" smtClean="0"/>
+              <a:t>tories and Tasks List of one sprint</a:t>
+            </a:r>
+          </a:p>
+        </p:txBody>
+      </p:sp>
+      <p:pic>
+        <p:nvPicPr>
+          <p:cNvPr id="2050" name="Picture 2"/>
+          <p:cNvPicPr>
+            <a:picLocks noChangeAspect="1" noChangeArrowheads="1"/>
+          </p:cNvPicPr>
+          <p:nvPr/>
+        </p:nvPicPr>
+        <p:blipFill>
+          <a:blip r:embed="rId2" cstate="email">
+            <a:extLst>
+              <a:ext uri="{28A0092B-C50C-407E-A947-70E740481C1C}">
+                <a14:useLocalDpi xmlns:a14="http://schemas.microsoft.com/office/drawing/2010/main" val="0"/>
+              </a:ext>
+            </a:extLst>
+          </a:blip>
+          <a:srcRect/>
+          <a:stretch>
+            <a:fillRect/>
+          </a:stretch>
+        </p:blipFill>
+        <p:spPr bwMode="auto">
+          <a:xfrm>
+            <a:off x="1122219" y="2733623"/>
+            <a:ext cx="7265966" cy="3872345"/>
+          </a:xfrm>
+          <a:prstGeom prst="rect">
+            <a:avLst/>
+          </a:prstGeom>
+          <a:noFill/>
+          <a:ln>
+            <a:noFill/>
+          </a:ln>
+          <a:effectLst/>
+          <a:extLst>
+            <a:ext uri="{909E8E84-426E-40DD-AFC4-6F175D3DCCD1}">
+              <a14:hiddenFill xmlns:a14="http://schemas.microsoft.com/office/drawing/2010/main">
+                <a:solidFill>
+                  <a:schemeClr val="accent1"/>
+                </a:solidFill>
+              </a14:hiddenFill>
+            </a:ext>
+            <a:ext uri="{91240B29-F687-4F45-9708-019B960494DF}">
+              <a14:hiddenLine xmlns:a14="http://schemas.microsoft.com/office/drawing/2010/main" w="9525">
+                <a:solidFill>
+                  <a:schemeClr val="tx1"/>
+                </a:solidFill>
+                <a:miter lim="800000"/>
+                <a:headEnd/>
+                <a:tailEnd/>
+              </a14:hiddenLine>
+            </a:ext>
+            <a:ext uri="{AF507438-7753-43E0-B8FC-AC1667EBCBE1}">
+              <a14:hiddenEffects xmlns:a14="http://schemas.microsoft.com/office/drawing/2010/main">
+                <a:effectLst>
+                  <a:outerShdw dist="35921" dir="2700000" algn="ctr" rotWithShape="0">
+                    <a:schemeClr val="bg2"/>
+                  </a:outerShdw>
+                </a:effectLst>
+              </a14:hiddenEffects>
+            </a:ext>
+          </a:extLst>
+        </p:spPr>
+      </p:pic>
     </p:spTree>
     <p:extLst>
       <p:ext uri="{BB962C8B-B14F-4D97-AF65-F5344CB8AC3E}">
-        <p14:creationId xmlns:p14="http://schemas.microsoft.com/office/powerpoint/2010/main" val="712012120"/>
+        <p14:creationId xmlns:p14="http://schemas.microsoft.com/office/powerpoint/2010/main" val="1755179611"/>
       </p:ext>
     </p:extLst>
   </p:cSld>

</xml_diff>

<commit_message>
Merge the powerpoint file
</commit_message>
<xml_diff>
--- a/PCB/02 Plans & Actuals/2.1_Project Plan/Project Plan_(presentation)v0.1.pptx
+++ b/PCB/02 Plans & Actuals/2.1_Project Plan/Project Plan_(presentation)v0.1.pptx
@@ -4,21 +4,25 @@
   <p:sldMasterIdLst>
     <p:sldMasterId id="2147483660" r:id="rId1"/>
   </p:sldMasterIdLst>
+  <p:notesMasterIdLst>
+    <p:notesMasterId r:id="rId17"/>
+  </p:notesMasterIdLst>
   <p:sldIdLst>
     <p:sldId id="256" r:id="rId2"/>
     <p:sldId id="257" r:id="rId3"/>
     <p:sldId id="259" r:id="rId4"/>
-    <p:sldId id="260" r:id="rId5"/>
-    <p:sldId id="258" r:id="rId6"/>
-    <p:sldId id="261" r:id="rId7"/>
-    <p:sldId id="262" r:id="rId8"/>
-    <p:sldId id="263" r:id="rId9"/>
-    <p:sldId id="266" r:id="rId10"/>
-    <p:sldId id="267" r:id="rId11"/>
-    <p:sldId id="268" r:id="rId12"/>
-    <p:sldId id="269" r:id="rId13"/>
-    <p:sldId id="270" r:id="rId14"/>
-    <p:sldId id="265" r:id="rId15"/>
+    <p:sldId id="271" r:id="rId5"/>
+    <p:sldId id="272" r:id="rId6"/>
+    <p:sldId id="273" r:id="rId7"/>
+    <p:sldId id="261" r:id="rId8"/>
+    <p:sldId id="262" r:id="rId9"/>
+    <p:sldId id="263" r:id="rId10"/>
+    <p:sldId id="266" r:id="rId11"/>
+    <p:sldId id="267" r:id="rId12"/>
+    <p:sldId id="268" r:id="rId13"/>
+    <p:sldId id="269" r:id="rId14"/>
+    <p:sldId id="270" r:id="rId15"/>
+    <p:sldId id="274" r:id="rId16"/>
   </p:sldIdLst>
   <p:sldSz cx="9144000" cy="6858000" type="screen4x3"/>
   <p:notesSz cx="6858000" cy="9144000"/>
@@ -2573,17 +2577,17 @@
     </dgm:pt>
   </dgm:ptLst>
   <dgm:cxnLst>
+    <dgm:cxn modelId="{10E06F90-2DAD-4C75-A68F-5C3B09650D9E}" srcId="{DC651011-D5D9-4DA0-8508-994C94EC55A0}" destId="{723CCF1E-3F45-47EC-A756-DF6C8A458EC7}" srcOrd="1" destOrd="0" parTransId="{FDD68111-5AAE-46DC-857B-7D36EBDF3215}" sibTransId="{DFD409AB-0076-40B5-BE10-9997A3F5A3A8}"/>
+    <dgm:cxn modelId="{893F0507-6CBA-4CB2-AAD2-25CDDA7B0B71}" type="presOf" srcId="{B6048623-EF07-463F-AC47-D167F5B6EA80}" destId="{C95394A6-09AB-44F5-8B9F-2B62703F6D37}" srcOrd="0" destOrd="0" presId="urn:microsoft.com/office/officeart/2005/8/layout/process1"/>
+    <dgm:cxn modelId="{90C45477-8C4C-4111-B8F3-AE5C2B6253EE}" type="presOf" srcId="{DFD409AB-0076-40B5-BE10-9997A3F5A3A8}" destId="{116DCE42-87F1-4005-9371-5F41DBA9275B}" srcOrd="1" destOrd="0" presId="urn:microsoft.com/office/officeart/2005/8/layout/process1"/>
+    <dgm:cxn modelId="{C35CD963-157D-44E2-AF02-767215A2A802}" type="presOf" srcId="{DFD409AB-0076-40B5-BE10-9997A3F5A3A8}" destId="{4F830FBE-354D-4BE3-AA4B-4477670A6011}" srcOrd="0" destOrd="0" presId="urn:microsoft.com/office/officeart/2005/8/layout/process1"/>
+    <dgm:cxn modelId="{D3C94337-5C9C-4B7A-9959-9D4609114B70}" type="presOf" srcId="{DC651011-D5D9-4DA0-8508-994C94EC55A0}" destId="{2FDC7855-3016-432F-BE3F-EF9CCCFE89E8}" srcOrd="0" destOrd="0" presId="urn:microsoft.com/office/officeart/2005/8/layout/process1"/>
+    <dgm:cxn modelId="{FE32091B-1E54-441B-BAC8-B489DC6F598F}" type="presOf" srcId="{60340B94-6477-4106-B1C6-4B070EF05D6C}" destId="{9CC705DE-B26C-4698-835D-E18F95DABCFF}" srcOrd="1" destOrd="0" presId="urn:microsoft.com/office/officeart/2005/8/layout/process1"/>
+    <dgm:cxn modelId="{8F4384DD-9DD3-4A21-9E87-84E7FBF44289}" srcId="{DC651011-D5D9-4DA0-8508-994C94EC55A0}" destId="{5840507E-2503-491D-80D0-505D4DE359CD}" srcOrd="0" destOrd="0" parTransId="{9EC5D3B2-0C54-436C-9297-6AD9C28F1EA7}" sibTransId="{60340B94-6477-4106-B1C6-4B070EF05D6C}"/>
+    <dgm:cxn modelId="{A5FB0538-674A-4345-9EB7-8D73750EB9B5}" type="presOf" srcId="{5840507E-2503-491D-80D0-505D4DE359CD}" destId="{5AE500DB-F672-47B9-B9D5-D507282B5D00}" srcOrd="0" destOrd="0" presId="urn:microsoft.com/office/officeart/2005/8/layout/process1"/>
     <dgm:cxn modelId="{0EAAAE71-3F02-4D90-9CC4-9295F05F74D6}" srcId="{DC651011-D5D9-4DA0-8508-994C94EC55A0}" destId="{B6048623-EF07-463F-AC47-D167F5B6EA80}" srcOrd="2" destOrd="0" parTransId="{DF9AEB48-23AC-4D21-94AF-DA713076A312}" sibTransId="{714F4F55-9864-4174-AAAF-EFD9FBE0E293}"/>
-    <dgm:cxn modelId="{D3C94337-5C9C-4B7A-9959-9D4609114B70}" type="presOf" srcId="{DC651011-D5D9-4DA0-8508-994C94EC55A0}" destId="{2FDC7855-3016-432F-BE3F-EF9CCCFE89E8}" srcOrd="0" destOrd="0" presId="urn:microsoft.com/office/officeart/2005/8/layout/process1"/>
-    <dgm:cxn modelId="{893F0507-6CBA-4CB2-AAD2-25CDDA7B0B71}" type="presOf" srcId="{B6048623-EF07-463F-AC47-D167F5B6EA80}" destId="{C95394A6-09AB-44F5-8B9F-2B62703F6D37}" srcOrd="0" destOrd="0" presId="urn:microsoft.com/office/officeart/2005/8/layout/process1"/>
-    <dgm:cxn modelId="{A5FB0538-674A-4345-9EB7-8D73750EB9B5}" type="presOf" srcId="{5840507E-2503-491D-80D0-505D4DE359CD}" destId="{5AE500DB-F672-47B9-B9D5-D507282B5D00}" srcOrd="0" destOrd="0" presId="urn:microsoft.com/office/officeart/2005/8/layout/process1"/>
-    <dgm:cxn modelId="{8F4384DD-9DD3-4A21-9E87-84E7FBF44289}" srcId="{DC651011-D5D9-4DA0-8508-994C94EC55A0}" destId="{5840507E-2503-491D-80D0-505D4DE359CD}" srcOrd="0" destOrd="0" parTransId="{9EC5D3B2-0C54-436C-9297-6AD9C28F1EA7}" sibTransId="{60340B94-6477-4106-B1C6-4B070EF05D6C}"/>
+    <dgm:cxn modelId="{B1403966-4550-4BB0-BC4A-0586737C329C}" type="presOf" srcId="{723CCF1E-3F45-47EC-A756-DF6C8A458EC7}" destId="{DE286EC6-C7D0-431D-AE27-D262CD647F2E}" srcOrd="0" destOrd="0" presId="urn:microsoft.com/office/officeart/2005/8/layout/process1"/>
     <dgm:cxn modelId="{E29A9671-C635-4935-97CB-24D9A1076AFB}" type="presOf" srcId="{60340B94-6477-4106-B1C6-4B070EF05D6C}" destId="{1A72F565-7664-4E2F-B042-9E7DA6CF8ED7}" srcOrd="0" destOrd="0" presId="urn:microsoft.com/office/officeart/2005/8/layout/process1"/>
-    <dgm:cxn modelId="{FE32091B-1E54-441B-BAC8-B489DC6F598F}" type="presOf" srcId="{60340B94-6477-4106-B1C6-4B070EF05D6C}" destId="{9CC705DE-B26C-4698-835D-E18F95DABCFF}" srcOrd="1" destOrd="0" presId="urn:microsoft.com/office/officeart/2005/8/layout/process1"/>
-    <dgm:cxn modelId="{C35CD963-157D-44E2-AF02-767215A2A802}" type="presOf" srcId="{DFD409AB-0076-40B5-BE10-9997A3F5A3A8}" destId="{4F830FBE-354D-4BE3-AA4B-4477670A6011}" srcOrd="0" destOrd="0" presId="urn:microsoft.com/office/officeart/2005/8/layout/process1"/>
-    <dgm:cxn modelId="{90C45477-8C4C-4111-B8F3-AE5C2B6253EE}" type="presOf" srcId="{DFD409AB-0076-40B5-BE10-9997A3F5A3A8}" destId="{116DCE42-87F1-4005-9371-5F41DBA9275B}" srcOrd="1" destOrd="0" presId="urn:microsoft.com/office/officeart/2005/8/layout/process1"/>
-    <dgm:cxn modelId="{B1403966-4550-4BB0-BC4A-0586737C329C}" type="presOf" srcId="{723CCF1E-3F45-47EC-A756-DF6C8A458EC7}" destId="{DE286EC6-C7D0-431D-AE27-D262CD647F2E}" srcOrd="0" destOrd="0" presId="urn:microsoft.com/office/officeart/2005/8/layout/process1"/>
-    <dgm:cxn modelId="{10E06F90-2DAD-4C75-A68F-5C3B09650D9E}" srcId="{DC651011-D5D9-4DA0-8508-994C94EC55A0}" destId="{723CCF1E-3F45-47EC-A756-DF6C8A458EC7}" srcOrd="1" destOrd="0" parTransId="{FDD68111-5AAE-46DC-857B-7D36EBDF3215}" sibTransId="{DFD409AB-0076-40B5-BE10-9997A3F5A3A8}"/>
     <dgm:cxn modelId="{C426389C-7EAD-4F13-8132-D22D64D6E14F}" type="presParOf" srcId="{2FDC7855-3016-432F-BE3F-EF9CCCFE89E8}" destId="{5AE500DB-F672-47B9-B9D5-D507282B5D00}" srcOrd="0" destOrd="0" presId="urn:microsoft.com/office/officeart/2005/8/layout/process1"/>
     <dgm:cxn modelId="{0DE7CF2C-462A-4BDC-80BD-27F94EE6BA96}" type="presParOf" srcId="{2FDC7855-3016-432F-BE3F-EF9CCCFE89E8}" destId="{1A72F565-7664-4E2F-B042-9E7DA6CF8ED7}" srcOrd="1" destOrd="0" presId="urn:microsoft.com/office/officeart/2005/8/layout/process1"/>
     <dgm:cxn modelId="{5431641D-D1BF-4CC3-8C77-476B86B95995}" type="presParOf" srcId="{1A72F565-7664-4E2F-B042-9E7DA6CF8ED7}" destId="{9CC705DE-B26C-4698-835D-E18F95DABCFF}" srcOrd="0" destOrd="0" presId="urn:microsoft.com/office/officeart/2005/8/layout/process1"/>
@@ -6679,6 +6683,440 @@
 </dgm:styleDef>
 </file>
 
+<file path=ppt/notesMasters/notesMaster1.xml><?xml version="1.0" encoding="utf-8"?>
+<p:notesMaster xmlns:a="http://schemas.openxmlformats.org/drawingml/2006/main" xmlns:r="http://schemas.openxmlformats.org/officeDocument/2006/relationships" xmlns:p="http://schemas.openxmlformats.org/presentationml/2006/main">
+  <p:cSld>
+    <p:bg>
+      <p:bgRef idx="1001">
+        <a:schemeClr val="bg1"/>
+      </p:bgRef>
+    </p:bg>
+    <p:spTree>
+      <p:nvGrpSpPr>
+        <p:cNvPr id="1" name=""/>
+        <p:cNvGrpSpPr/>
+        <p:nvPr/>
+      </p:nvGrpSpPr>
+      <p:grpSpPr>
+        <a:xfrm>
+          <a:off x="0" y="0"/>
+          <a:ext cx="0" cy="0"/>
+          <a:chOff x="0" y="0"/>
+          <a:chExt cx="0" cy="0"/>
+        </a:xfrm>
+      </p:grpSpPr>
+      <p:sp>
+        <p:nvSpPr>
+          <p:cNvPr id="2" name="页眉占位符 1"/>
+          <p:cNvSpPr>
+            <a:spLocks noGrp="1"/>
+          </p:cNvSpPr>
+          <p:nvPr>
+            <p:ph type="hdr" sz="quarter"/>
+          </p:nvPr>
+        </p:nvSpPr>
+        <p:spPr>
+          <a:xfrm>
+            <a:off x="0" y="0"/>
+            <a:ext cx="2971800" cy="457200"/>
+          </a:xfrm>
+          <a:prstGeom prst="rect">
+            <a:avLst/>
+          </a:prstGeom>
+        </p:spPr>
+        <p:txBody>
+          <a:bodyPr vert="horz" lIns="91440" tIns="45720" rIns="91440" bIns="45720" rtlCol="0"/>
+          <a:lstStyle>
+            <a:lvl1pPr algn="l">
+              <a:defRPr sz="1200"/>
+            </a:lvl1pPr>
+          </a:lstStyle>
+          <a:p>
+            <a:endParaRPr lang="en-GB"/>
+          </a:p>
+        </p:txBody>
+      </p:sp>
+      <p:sp>
+        <p:nvSpPr>
+          <p:cNvPr id="3" name="日期占位符 2"/>
+          <p:cNvSpPr>
+            <a:spLocks noGrp="1"/>
+          </p:cNvSpPr>
+          <p:nvPr>
+            <p:ph type="dt" idx="1"/>
+          </p:nvPr>
+        </p:nvSpPr>
+        <p:spPr>
+          <a:xfrm>
+            <a:off x="3884613" y="0"/>
+            <a:ext cx="2971800" cy="457200"/>
+          </a:xfrm>
+          <a:prstGeom prst="rect">
+            <a:avLst/>
+          </a:prstGeom>
+        </p:spPr>
+        <p:txBody>
+          <a:bodyPr vert="horz" lIns="91440" tIns="45720" rIns="91440" bIns="45720" rtlCol="0"/>
+          <a:lstStyle>
+            <a:lvl1pPr algn="r">
+              <a:defRPr sz="1200"/>
+            </a:lvl1pPr>
+          </a:lstStyle>
+          <a:p>
+            <a:fld id="{7963829F-6B89-7C4A-9C99-DC089128B8D4}" type="datetimeFigureOut">
+              <a:rPr lang="zh-CN" altLang="en-US" smtClean="0"/>
+              <a:t>14/08/15</a:t>
+            </a:fld>
+            <a:endParaRPr lang="en-GB"/>
+          </a:p>
+        </p:txBody>
+      </p:sp>
+      <p:sp>
+        <p:nvSpPr>
+          <p:cNvPr id="4" name="幻灯片图像占位符 3"/>
+          <p:cNvSpPr>
+            <a:spLocks noGrp="1" noRot="1" noChangeAspect="1"/>
+          </p:cNvSpPr>
+          <p:nvPr>
+            <p:ph type="sldImg" idx="2"/>
+          </p:nvPr>
+        </p:nvSpPr>
+        <p:spPr>
+          <a:xfrm>
+            <a:off x="1143000" y="685800"/>
+            <a:ext cx="4572000" cy="3429000"/>
+          </a:xfrm>
+          <a:prstGeom prst="rect">
+            <a:avLst/>
+          </a:prstGeom>
+          <a:noFill/>
+          <a:ln w="12700">
+            <a:solidFill>
+              <a:prstClr val="black"/>
+            </a:solidFill>
+          </a:ln>
+        </p:spPr>
+        <p:txBody>
+          <a:bodyPr vert="horz" lIns="91440" tIns="45720" rIns="91440" bIns="45720" rtlCol="0" anchor="ctr"/>
+          <a:lstStyle/>
+          <a:p>
+            <a:endParaRPr lang="en-GB"/>
+          </a:p>
+        </p:txBody>
+      </p:sp>
+      <p:sp>
+        <p:nvSpPr>
+          <p:cNvPr id="5" name="备注占位符 4"/>
+          <p:cNvSpPr>
+            <a:spLocks noGrp="1"/>
+          </p:cNvSpPr>
+          <p:nvPr>
+            <p:ph type="body" sz="quarter" idx="3"/>
+          </p:nvPr>
+        </p:nvSpPr>
+        <p:spPr>
+          <a:xfrm>
+            <a:off x="685800" y="4343400"/>
+            <a:ext cx="5486400" cy="4114800"/>
+          </a:xfrm>
+          <a:prstGeom prst="rect">
+            <a:avLst/>
+          </a:prstGeom>
+        </p:spPr>
+        <p:txBody>
+          <a:bodyPr vert="horz" lIns="91440" tIns="45720" rIns="91440" bIns="45720" rtlCol="0"/>
+          <a:lstStyle/>
+          <a:p>
+            <a:pPr lvl="0"/>
+            <a:r>
+              <a:rPr lang="en-US" smtClean="0"/>
+              <a:t>单击此处编辑母版文本样式</a:t>
+            </a:r>
+          </a:p>
+          <a:p>
+            <a:pPr lvl="1"/>
+            <a:r>
+              <a:rPr lang="en-US" smtClean="0"/>
+              <a:t>二级</a:t>
+            </a:r>
+          </a:p>
+          <a:p>
+            <a:pPr lvl="2"/>
+            <a:r>
+              <a:rPr lang="en-US" smtClean="0"/>
+              <a:t>三级</a:t>
+            </a:r>
+          </a:p>
+          <a:p>
+            <a:pPr lvl="3"/>
+            <a:r>
+              <a:rPr lang="en-US" smtClean="0"/>
+              <a:t>四级</a:t>
+            </a:r>
+          </a:p>
+          <a:p>
+            <a:pPr lvl="4"/>
+            <a:r>
+              <a:rPr lang="en-US" smtClean="0"/>
+              <a:t>五级</a:t>
+            </a:r>
+            <a:endParaRPr lang="en-GB"/>
+          </a:p>
+        </p:txBody>
+      </p:sp>
+      <p:sp>
+        <p:nvSpPr>
+          <p:cNvPr id="6" name="页脚占位符 5"/>
+          <p:cNvSpPr>
+            <a:spLocks noGrp="1"/>
+          </p:cNvSpPr>
+          <p:nvPr>
+            <p:ph type="ftr" sz="quarter" idx="4"/>
+          </p:nvPr>
+        </p:nvSpPr>
+        <p:spPr>
+          <a:xfrm>
+            <a:off x="0" y="8685213"/>
+            <a:ext cx="2971800" cy="457200"/>
+          </a:xfrm>
+          <a:prstGeom prst="rect">
+            <a:avLst/>
+          </a:prstGeom>
+        </p:spPr>
+        <p:txBody>
+          <a:bodyPr vert="horz" lIns="91440" tIns="45720" rIns="91440" bIns="45720" rtlCol="0" anchor="b"/>
+          <a:lstStyle>
+            <a:lvl1pPr algn="l">
+              <a:defRPr sz="1200"/>
+            </a:lvl1pPr>
+          </a:lstStyle>
+          <a:p>
+            <a:endParaRPr lang="en-GB"/>
+          </a:p>
+        </p:txBody>
+      </p:sp>
+      <p:sp>
+        <p:nvSpPr>
+          <p:cNvPr id="7" name="幻灯片编号占位符 6"/>
+          <p:cNvSpPr>
+            <a:spLocks noGrp="1"/>
+          </p:cNvSpPr>
+          <p:nvPr>
+            <p:ph type="sldNum" sz="quarter" idx="5"/>
+          </p:nvPr>
+        </p:nvSpPr>
+        <p:spPr>
+          <a:xfrm>
+            <a:off x="3884613" y="8685213"/>
+            <a:ext cx="2971800" cy="457200"/>
+          </a:xfrm>
+          <a:prstGeom prst="rect">
+            <a:avLst/>
+          </a:prstGeom>
+        </p:spPr>
+        <p:txBody>
+          <a:bodyPr vert="horz" lIns="91440" tIns="45720" rIns="91440" bIns="45720" rtlCol="0" anchor="b"/>
+          <a:lstStyle>
+            <a:lvl1pPr algn="r">
+              <a:defRPr sz="1200"/>
+            </a:lvl1pPr>
+          </a:lstStyle>
+          <a:p>
+            <a:fld id="{92C1F5ED-D777-7E43-93E8-E4B53EEB7264}" type="slidenum">
+              <a:rPr lang="en-GB" smtClean="0"/>
+              <a:t>‹#›</a:t>
+            </a:fld>
+            <a:endParaRPr lang="en-GB"/>
+          </a:p>
+        </p:txBody>
+      </p:sp>
+    </p:spTree>
+    <p:extLst>
+      <p:ext uri="{BB962C8B-B14F-4D97-AF65-F5344CB8AC3E}">
+        <p14:creationId xmlns:p14="http://schemas.microsoft.com/office/powerpoint/2010/main" val="2949542331"/>
+      </p:ext>
+    </p:extLst>
+  </p:cSld>
+  <p:clrMap bg1="lt1" tx1="dk1" bg2="lt2" tx2="dk2" accent1="accent1" accent2="accent2" accent3="accent3" accent4="accent4" accent5="accent5" accent6="accent6" hlink="hlink" folHlink="folHlink"/>
+  <p:notesStyle>
+    <a:lvl1pPr marL="0" algn="l" defTabSz="457200" rtl="0" eaLnBrk="1" latinLnBrk="0" hangingPunct="1">
+      <a:defRPr sz="1200" kern="1200">
+        <a:solidFill>
+          <a:schemeClr val="tx1"/>
+        </a:solidFill>
+        <a:latin typeface="+mn-lt"/>
+        <a:ea typeface="+mn-ea"/>
+        <a:cs typeface="+mn-cs"/>
+      </a:defRPr>
+    </a:lvl1pPr>
+    <a:lvl2pPr marL="457200" algn="l" defTabSz="457200" rtl="0" eaLnBrk="1" latinLnBrk="0" hangingPunct="1">
+      <a:defRPr sz="1200" kern="1200">
+        <a:solidFill>
+          <a:schemeClr val="tx1"/>
+        </a:solidFill>
+        <a:latin typeface="+mn-lt"/>
+        <a:ea typeface="+mn-ea"/>
+        <a:cs typeface="+mn-cs"/>
+      </a:defRPr>
+    </a:lvl2pPr>
+    <a:lvl3pPr marL="914400" algn="l" defTabSz="457200" rtl="0" eaLnBrk="1" latinLnBrk="0" hangingPunct="1">
+      <a:defRPr sz="1200" kern="1200">
+        <a:solidFill>
+          <a:schemeClr val="tx1"/>
+        </a:solidFill>
+        <a:latin typeface="+mn-lt"/>
+        <a:ea typeface="+mn-ea"/>
+        <a:cs typeface="+mn-cs"/>
+      </a:defRPr>
+    </a:lvl3pPr>
+    <a:lvl4pPr marL="1371600" algn="l" defTabSz="457200" rtl="0" eaLnBrk="1" latinLnBrk="0" hangingPunct="1">
+      <a:defRPr sz="1200" kern="1200">
+        <a:solidFill>
+          <a:schemeClr val="tx1"/>
+        </a:solidFill>
+        <a:latin typeface="+mn-lt"/>
+        <a:ea typeface="+mn-ea"/>
+        <a:cs typeface="+mn-cs"/>
+      </a:defRPr>
+    </a:lvl4pPr>
+    <a:lvl5pPr marL="1828800" algn="l" defTabSz="457200" rtl="0" eaLnBrk="1" latinLnBrk="0" hangingPunct="1">
+      <a:defRPr sz="1200" kern="1200">
+        <a:solidFill>
+          <a:schemeClr val="tx1"/>
+        </a:solidFill>
+        <a:latin typeface="+mn-lt"/>
+        <a:ea typeface="+mn-ea"/>
+        <a:cs typeface="+mn-cs"/>
+      </a:defRPr>
+    </a:lvl5pPr>
+    <a:lvl6pPr marL="2286000" algn="l" defTabSz="457200" rtl="0" eaLnBrk="1" latinLnBrk="0" hangingPunct="1">
+      <a:defRPr sz="1200" kern="1200">
+        <a:solidFill>
+          <a:schemeClr val="tx1"/>
+        </a:solidFill>
+        <a:latin typeface="+mn-lt"/>
+        <a:ea typeface="+mn-ea"/>
+        <a:cs typeface="+mn-cs"/>
+      </a:defRPr>
+    </a:lvl6pPr>
+    <a:lvl7pPr marL="2743200" algn="l" defTabSz="457200" rtl="0" eaLnBrk="1" latinLnBrk="0" hangingPunct="1">
+      <a:defRPr sz="1200" kern="1200">
+        <a:solidFill>
+          <a:schemeClr val="tx1"/>
+        </a:solidFill>
+        <a:latin typeface="+mn-lt"/>
+        <a:ea typeface="+mn-ea"/>
+        <a:cs typeface="+mn-cs"/>
+      </a:defRPr>
+    </a:lvl7pPr>
+    <a:lvl8pPr marL="3200400" algn="l" defTabSz="457200" rtl="0" eaLnBrk="1" latinLnBrk="0" hangingPunct="1">
+      <a:defRPr sz="1200" kern="1200">
+        <a:solidFill>
+          <a:schemeClr val="tx1"/>
+        </a:solidFill>
+        <a:latin typeface="+mn-lt"/>
+        <a:ea typeface="+mn-ea"/>
+        <a:cs typeface="+mn-cs"/>
+      </a:defRPr>
+    </a:lvl8pPr>
+    <a:lvl9pPr marL="3657600" algn="l" defTabSz="457200" rtl="0" eaLnBrk="1" latinLnBrk="0" hangingPunct="1">
+      <a:defRPr sz="1200" kern="1200">
+        <a:solidFill>
+          <a:schemeClr val="tx1"/>
+        </a:solidFill>
+        <a:latin typeface="+mn-lt"/>
+        <a:ea typeface="+mn-ea"/>
+        <a:cs typeface="+mn-cs"/>
+      </a:defRPr>
+    </a:lvl9pPr>
+  </p:notesStyle>
+</p:notesMaster>
+</file>
+
+<file path=ppt/notesSlides/notesSlide1.xml><?xml version="1.0" encoding="utf-8"?>
+<p:notes xmlns:a="http://schemas.openxmlformats.org/drawingml/2006/main" xmlns:r="http://schemas.openxmlformats.org/officeDocument/2006/relationships" xmlns:p="http://schemas.openxmlformats.org/presentationml/2006/main">
+  <p:cSld>
+    <p:spTree>
+      <p:nvGrpSpPr>
+        <p:cNvPr id="1" name=""/>
+        <p:cNvGrpSpPr/>
+        <p:nvPr/>
+      </p:nvGrpSpPr>
+      <p:grpSpPr>
+        <a:xfrm>
+          <a:off x="0" y="0"/>
+          <a:ext cx="0" cy="0"/>
+          <a:chOff x="0" y="0"/>
+          <a:chExt cx="0" cy="0"/>
+        </a:xfrm>
+      </p:grpSpPr>
+      <p:sp>
+        <p:nvSpPr>
+          <p:cNvPr id="2" name="幻灯片图像占位符 1"/>
+          <p:cNvSpPr>
+            <a:spLocks noGrp="1" noRot="1" noChangeAspect="1"/>
+          </p:cNvSpPr>
+          <p:nvPr>
+            <p:ph type="sldImg"/>
+          </p:nvPr>
+        </p:nvSpPr>
+        <p:spPr/>
+      </p:sp>
+      <p:sp>
+        <p:nvSpPr>
+          <p:cNvPr id="3" name="备注占位符 2"/>
+          <p:cNvSpPr>
+            <a:spLocks noGrp="1"/>
+          </p:cNvSpPr>
+          <p:nvPr>
+            <p:ph type="body" idx="1"/>
+          </p:nvPr>
+        </p:nvSpPr>
+        <p:spPr/>
+        <p:txBody>
+          <a:bodyPr/>
+          <a:lstStyle/>
+          <a:p>
+            <a:endParaRPr lang="zh-CN" altLang="en-US" dirty="0"/>
+          </a:p>
+        </p:txBody>
+      </p:sp>
+      <p:sp>
+        <p:nvSpPr>
+          <p:cNvPr id="4" name="灯片编号占位符 3"/>
+          <p:cNvSpPr>
+            <a:spLocks noGrp="1"/>
+          </p:cNvSpPr>
+          <p:nvPr>
+            <p:ph type="sldNum" sz="quarter" idx="10"/>
+          </p:nvPr>
+        </p:nvSpPr>
+        <p:spPr/>
+        <p:txBody>
+          <a:bodyPr/>
+          <a:lstStyle/>
+          <a:p>
+            <a:fld id="{3C6DDE9F-6F4A-48AD-9367-30B5F5253198}" type="slidenum">
+              <a:rPr lang="zh-CN" altLang="en-US" smtClean="0"/>
+              <a:t>4</a:t>
+            </a:fld>
+            <a:endParaRPr lang="zh-CN" altLang="en-US"/>
+          </a:p>
+        </p:txBody>
+      </p:sp>
+    </p:spTree>
+    <p:extLst>
+      <p:ext uri="{BB962C8B-B14F-4D97-AF65-F5344CB8AC3E}">
+        <p14:creationId xmlns:p14="http://schemas.microsoft.com/office/powerpoint/2010/main" val="1648700153"/>
+      </p:ext>
+    </p:extLst>
+  </p:cSld>
+  <p:clrMapOvr>
+    <a:masterClrMapping/>
+  </p:clrMapOvr>
+</p:notes>
+</file>
+
 <file path=ppt/slideLayouts/slideLayout1.xml><?xml version="1.0" encoding="utf-8"?>
 <p:sldLayout xmlns:a="http://schemas.openxmlformats.org/drawingml/2006/main" xmlns:r="http://schemas.openxmlformats.org/officeDocument/2006/relationships" xmlns:p="http://schemas.openxmlformats.org/presentationml/2006/main" type="title" preserve="1">
   <p:cSld name="标题幻灯片">
@@ -6713,7 +7151,7 @@
           <a:p>
             <a:fld id="{4251665B-C24A-4702-B522-6A4334602E03}" type="datetimeFigureOut">
               <a:rPr lang="en-US" smtClean="0"/>
-              <a:t>8/13/2015</a:t>
+              <a:t>14/08/15</a:t>
             </a:fld>
             <a:endParaRPr lang="en-US"/>
           </a:p>
@@ -7470,7 +7908,7 @@
           <a:p>
             <a:fld id="{4251665B-C24A-4702-B522-6A4334602E03}" type="datetimeFigureOut">
               <a:rPr lang="en-US" smtClean="0"/>
-              <a:t>8/13/2015</a:t>
+              <a:t>14/08/15</a:t>
             </a:fld>
             <a:endParaRPr lang="en-US"/>
           </a:p>
@@ -8094,7 +8532,7 @@
           <a:p>
             <a:fld id="{4251665B-C24A-4702-B522-6A4334602E03}" type="datetimeFigureOut">
               <a:rPr lang="en-US" smtClean="0"/>
-              <a:t>8/13/2015</a:t>
+              <a:t>14/08/15</a:t>
             </a:fld>
             <a:endParaRPr lang="en-US"/>
           </a:p>
@@ -8517,7 +8955,7 @@
           <a:p>
             <a:fld id="{4251665B-C24A-4702-B522-6A4334602E03}" type="datetimeFigureOut">
               <a:rPr lang="en-US" smtClean="0"/>
-              <a:t>8/13/2015</a:t>
+              <a:t>14/08/15</a:t>
             </a:fld>
             <a:endParaRPr lang="en-US"/>
           </a:p>
@@ -8694,7 +9132,7 @@
           <a:p>
             <a:fld id="{4251665B-C24A-4702-B522-6A4334602E03}" type="datetimeFigureOut">
               <a:rPr lang="en-US" smtClean="0"/>
-              <a:t>8/13/2015</a:t>
+              <a:t>14/08/15</a:t>
             </a:fld>
             <a:endParaRPr lang="en-US"/>
           </a:p>
@@ -9511,7 +9949,7 @@
           <a:p>
             <a:fld id="{4251665B-C24A-4702-B522-6A4334602E03}" type="datetimeFigureOut">
               <a:rPr lang="en-US" smtClean="0"/>
-              <a:t>8/13/2015</a:t>
+              <a:t>14/08/15</a:t>
             </a:fld>
             <a:endParaRPr lang="en-US"/>
           </a:p>
@@ -10022,7 +10460,7 @@
           <a:p>
             <a:fld id="{4251665B-C24A-4702-B522-6A4334602E03}" type="datetimeFigureOut">
               <a:rPr lang="en-US" smtClean="0"/>
-              <a:t>8/13/2015</a:t>
+              <a:t>14/08/15</a:t>
             </a:fld>
             <a:endParaRPr lang="en-US"/>
           </a:p>
@@ -10255,7 +10693,7 @@
           <a:p>
             <a:fld id="{4251665B-C24A-4702-B522-6A4334602E03}" type="datetimeFigureOut">
               <a:rPr lang="en-US" smtClean="0"/>
-              <a:t>8/13/2015</a:t>
+              <a:t>14/08/15</a:t>
             </a:fld>
             <a:endParaRPr lang="en-US"/>
           </a:p>
@@ -10457,6 +10895,166 @@
         </p:sp>
       </p:grpSp>
     </p:spTree>
+  </p:cSld>
+  <p:clrMapOvr>
+    <a:masterClrMapping/>
+  </p:clrMapOvr>
+</p:sldLayout>
+</file>
+
+<file path=ppt/slideLayouts/slideLayout17.xml><?xml version="1.0" encoding="utf-8"?>
+<p:sldLayout xmlns:a="http://schemas.openxmlformats.org/drawingml/2006/main" xmlns:r="http://schemas.openxmlformats.org/officeDocument/2006/relationships" xmlns:p="http://schemas.openxmlformats.org/presentationml/2006/main">
+  <p:cSld name="自定义版式">
+    <p:spTree>
+      <p:nvGrpSpPr>
+        <p:cNvPr id="1" name=""/>
+        <p:cNvGrpSpPr/>
+        <p:nvPr/>
+      </p:nvGrpSpPr>
+      <p:grpSpPr>
+        <a:xfrm>
+          <a:off x="0" y="0"/>
+          <a:ext cx="0" cy="0"/>
+          <a:chOff x="0" y="0"/>
+          <a:chExt cx="0" cy="0"/>
+        </a:xfrm>
+      </p:grpSpPr>
+      <p:sp>
+        <p:nvSpPr>
+          <p:cNvPr id="2" name="标题 1"/>
+          <p:cNvSpPr>
+            <a:spLocks noGrp="1"/>
+          </p:cNvSpPr>
+          <p:nvPr>
+            <p:ph type="title"/>
+          </p:nvPr>
+        </p:nvSpPr>
+        <p:spPr>
+          <a:xfrm>
+            <a:off x="284163" y="630238"/>
+            <a:ext cx="8574087" cy="968375"/>
+          </a:xfrm>
+        </p:spPr>
+        <p:txBody>
+          <a:bodyPr/>
+          <a:lstStyle/>
+          <a:p>
+            <a:r>
+              <a:rPr lang="en-US" smtClean="0"/>
+              <a:t>单击此处编辑母版标题样式</a:t>
+            </a:r>
+            <a:endParaRPr lang="en-GB"/>
+          </a:p>
+        </p:txBody>
+      </p:sp>
+      <p:sp>
+        <p:nvSpPr>
+          <p:cNvPr id="3" name="日期占位符 2"/>
+          <p:cNvSpPr>
+            <a:spLocks noGrp="1"/>
+          </p:cNvSpPr>
+          <p:nvPr>
+            <p:ph type="dt" sz="half" idx="10"/>
+          </p:nvPr>
+        </p:nvSpPr>
+        <p:spPr>
+          <a:xfrm>
+            <a:off x="6794500" y="6437313"/>
+            <a:ext cx="2133600" cy="365125"/>
+          </a:xfrm>
+        </p:spPr>
+        <p:txBody>
+          <a:bodyPr/>
+          <a:lstStyle>
+            <a:lvl1pPr>
+              <a:defRPr/>
+            </a:lvl1pPr>
+          </a:lstStyle>
+          <a:p>
+            <a:fld id="{8D4F3373-90E5-9644-86A6-B3094212B6A5}" type="datetime1">
+              <a:rPr lang="zh-CN" altLang="en-US"/>
+              <a:pPr/>
+              <a:t>14/08/15</a:t>
+            </a:fld>
+            <a:endParaRPr lang="en-US" sz="1800" b="0">
+              <a:solidFill>
+                <a:schemeClr val="tx1"/>
+              </a:solidFill>
+            </a:endParaRPr>
+          </a:p>
+        </p:txBody>
+      </p:sp>
+      <p:sp>
+        <p:nvSpPr>
+          <p:cNvPr id="4" name="页脚占位符 3"/>
+          <p:cNvSpPr>
+            <a:spLocks noGrp="1"/>
+          </p:cNvSpPr>
+          <p:nvPr>
+            <p:ph type="ftr" sz="quarter" idx="11"/>
+          </p:nvPr>
+        </p:nvSpPr>
+        <p:spPr>
+          <a:xfrm>
+            <a:off x="200025" y="6437313"/>
+            <a:ext cx="6124575" cy="365125"/>
+          </a:xfrm>
+        </p:spPr>
+        <p:txBody>
+          <a:bodyPr/>
+          <a:lstStyle>
+            <a:lvl1pPr>
+              <a:defRPr/>
+            </a:lvl1pPr>
+          </a:lstStyle>
+          <a:p>
+            <a:endParaRPr lang="en-GB"/>
+          </a:p>
+        </p:txBody>
+      </p:sp>
+      <p:sp>
+        <p:nvSpPr>
+          <p:cNvPr id="5" name="幻灯片编号占位符 4"/>
+          <p:cNvSpPr>
+            <a:spLocks noGrp="1"/>
+          </p:cNvSpPr>
+          <p:nvPr>
+            <p:ph type="sldNum" sz="quarter" idx="12"/>
+          </p:nvPr>
+        </p:nvSpPr>
+        <p:spPr>
+          <a:xfrm>
+            <a:off x="8305800" y="168275"/>
+            <a:ext cx="631825" cy="358775"/>
+          </a:xfrm>
+        </p:spPr>
+        <p:txBody>
+          <a:bodyPr/>
+          <a:lstStyle>
+            <a:lvl1pPr>
+              <a:defRPr/>
+            </a:lvl1pPr>
+          </a:lstStyle>
+          <a:p>
+            <a:fld id="{FE2D7D31-FC25-E542-8580-C7611C6F22C1}" type="slidenum">
+              <a:rPr lang="zh-CN" altLang="en-US"/>
+              <a:pPr/>
+              <a:t>‹#›</a:t>
+            </a:fld>
+            <a:endParaRPr lang="en-US" sz="1800" b="0">
+              <a:solidFill>
+                <a:schemeClr val="tx1"/>
+              </a:solidFill>
+            </a:endParaRPr>
+          </a:p>
+        </p:txBody>
+      </p:sp>
+    </p:spTree>
+    <p:extLst>
+      <p:ext uri="{BB962C8B-B14F-4D97-AF65-F5344CB8AC3E}">
+        <p14:creationId xmlns:p14="http://schemas.microsoft.com/office/powerpoint/2010/main" val="4010144384"/>
+      </p:ext>
+    </p:extLst>
   </p:cSld>
   <p:clrMapOvr>
     <a:masterClrMapping/>
@@ -10780,7 +11378,7 @@
           <a:p>
             <a:fld id="{4251665B-C24A-4702-B522-6A4334602E03}" type="datetimeFigureOut">
               <a:rPr lang="en-US" smtClean="0"/>
-              <a:t>8/13/2015</a:t>
+              <a:t>14/08/15</a:t>
             </a:fld>
             <a:endParaRPr lang="en-US"/>
           </a:p>
@@ -10915,7 +11513,7 @@
           <a:p>
             <a:fld id="{4251665B-C24A-4702-B522-6A4334602E03}" type="datetimeFigureOut">
               <a:rPr lang="en-US" smtClean="0"/>
-              <a:t>8/13/2015</a:t>
+              <a:t>14/08/15</a:t>
             </a:fld>
             <a:endParaRPr lang="en-US"/>
           </a:p>
@@ -11813,7 +12411,7 @@
           <a:p>
             <a:fld id="{4251665B-C24A-4702-B522-6A4334602E03}" type="datetimeFigureOut">
               <a:rPr lang="en-US" smtClean="0"/>
-              <a:t>8/13/2015</a:t>
+              <a:t>14/08/15</a:t>
             </a:fld>
             <a:endParaRPr lang="en-US"/>
           </a:p>
@@ -11936,7 +12534,7 @@
           <a:p>
             <a:fld id="{4251665B-C24A-4702-B522-6A4334602E03}" type="datetimeFigureOut">
               <a:rPr lang="en-US" smtClean="0"/>
-              <a:t>8/13/2015</a:t>
+              <a:t>14/08/15</a:t>
             </a:fld>
             <a:endParaRPr lang="en-US"/>
           </a:p>
@@ -12820,7 +13418,7 @@
           <a:p>
             <a:fld id="{4251665B-C24A-4702-B522-6A4334602E03}" type="datetimeFigureOut">
               <a:rPr lang="en-US" smtClean="0"/>
-              <a:t>8/13/2015</a:t>
+              <a:t>14/08/15</a:t>
             </a:fld>
             <a:endParaRPr lang="en-US"/>
           </a:p>
@@ -13468,7 +14066,7 @@
           <a:p>
             <a:fld id="{4251665B-C24A-4702-B522-6A4334602E03}" type="datetimeFigureOut">
               <a:rPr lang="en-US" smtClean="0"/>
-              <a:t>8/13/2015</a:t>
+              <a:t>14/08/15</a:t>
             </a:fld>
             <a:endParaRPr lang="en-US"/>
           </a:p>
@@ -13784,7 +14382,7 @@
           <a:p>
             <a:fld id="{4251665B-C24A-4702-B522-6A4334602E03}" type="datetimeFigureOut">
               <a:rPr lang="en-US" smtClean="0"/>
-              <a:t>8/13/2015</a:t>
+              <a:t>14/08/15</a:t>
             </a:fld>
             <a:endParaRPr lang="en-US"/>
           </a:p>
@@ -13874,7 +14472,7 @@
           <a:p>
             <a:fld id="{4251665B-C24A-4702-B522-6A4334602E03}" type="datetimeFigureOut">
               <a:rPr lang="en-US" smtClean="0"/>
-              <a:t>8/13/2015</a:t>
+              <a:t>14/08/15</a:t>
             </a:fld>
             <a:endParaRPr lang="en-US"/>
           </a:p>
@@ -14202,7 +14800,7 @@
           <a:p>
             <a:fld id="{4251665B-C24A-4702-B522-6A4334602E03}" type="datetimeFigureOut">
               <a:rPr lang="en-US" smtClean="0"/>
-              <a:t>8/13/2015</a:t>
+              <a:t>14/08/15</a:t>
             </a:fld>
             <a:endParaRPr lang="en-US"/>
           </a:p>
@@ -14347,6 +14945,7 @@
     <p:sldLayoutId id="2147483674" r:id="rId14"/>
     <p:sldLayoutId id="2147483675" r:id="rId15"/>
     <p:sldLayoutId id="2147483676" r:id="rId16"/>
+    <p:sldLayoutId id="2147483677" r:id="rId17"/>
   </p:sldLayoutIdLst>
   <p:txStyles>
     <p:titleStyle>
@@ -14805,7 +15404,7 @@
             <a:pPr algn="l"/>
             <a:r>
               <a:rPr lang="en-GB" dirty="0" smtClean="0"/>
-              <a:t>6. Scrum PM Tool (3)</a:t>
+              <a:t>6. Scrum PM Tool (2)</a:t>
             </a:r>
             <a:endParaRPr lang="en-GB" dirty="0"/>
           </a:p>
@@ -14852,14 +15451,22 @@
             </a:pPr>
             <a:r>
               <a:rPr lang="en-NZ" dirty="0" smtClean="0"/>
-              <a:t>Image of Burn-Down Chart</a:t>
+              <a:t>Image of User </a:t>
+            </a:r>
+            <a:r>
+              <a:rPr lang="en-NZ" dirty="0"/>
+              <a:t>S</a:t>
+            </a:r>
+            <a:r>
+              <a:rPr lang="en-NZ" dirty="0" smtClean="0"/>
+              <a:t>tories and Tasks List of one sprint</a:t>
             </a:r>
           </a:p>
         </p:txBody>
       </p:sp>
       <p:pic>
         <p:nvPicPr>
-          <p:cNvPr id="3077" name="Picture 5"/>
+          <p:cNvPr id="2050" name="Picture 2"/>
           <p:cNvPicPr>
             <a:picLocks noChangeAspect="1" noChangeArrowheads="1"/>
           </p:cNvPicPr>
@@ -14880,8 +15487,8 @@
         </p:blipFill>
         <p:spPr bwMode="auto">
           <a:xfrm>
-            <a:off x="1131310" y="2733624"/>
-            <a:ext cx="5477308" cy="4000282"/>
+            <a:off x="1122219" y="2733623"/>
+            <a:ext cx="7265966" cy="3872345"/>
           </a:xfrm>
           <a:prstGeom prst="rect">
             <a:avLst/>
@@ -14892,14 +15499,14 @@
           </a:ln>
           <a:effectLst/>
           <a:extLst>
-            <a:ext uri="{909E8E84-426E-40DD-AFC4-6F175D3DCCD1}">
+            <a:ext uri="{909E8E84-426E-40dd-AFC4-6F175D3DCCD1}">
               <a14:hiddenFill xmlns:a14="http://schemas.microsoft.com/office/drawing/2010/main">
                 <a:solidFill>
                   <a:schemeClr val="accent1"/>
                 </a:solidFill>
               </a14:hiddenFill>
             </a:ext>
-            <a:ext uri="{91240B29-F687-4F45-9708-019B960494DF}">
+            <a:ext uri="{91240B29-F687-4f45-9708-019B960494DF}">
               <a14:hiddenLine xmlns:a14="http://schemas.microsoft.com/office/drawing/2010/main" w="9525">
                 <a:solidFill>
                   <a:schemeClr val="tx1"/>
@@ -14909,7 +15516,7 @@
                 <a:tailEnd/>
               </a14:hiddenLine>
             </a:ext>
-            <a:ext uri="{AF507438-7753-43E0-B8FC-AC1667EBCBE1}">
+            <a:ext uri="{AF507438-7753-43e0-B8FC-AC1667EBCBE1}">
               <a14:hiddenEffects xmlns:a14="http://schemas.microsoft.com/office/drawing/2010/main">
                 <a:effectLst>
                   <a:outerShdw dist="35921" dir="2700000" algn="ctr" rotWithShape="0">
@@ -14924,7 +15531,7 @@
     </p:spTree>
     <p:extLst>
       <p:ext uri="{BB962C8B-B14F-4D97-AF65-F5344CB8AC3E}">
-        <p14:creationId xmlns:p14="http://schemas.microsoft.com/office/powerpoint/2010/main" val="2767928531"/>
+        <p14:creationId xmlns:p14="http://schemas.microsoft.com/office/powerpoint/2010/main" val="1755179611"/>
       </p:ext>
     </p:extLst>
   </p:cSld>
@@ -14968,16 +15575,176 @@
           <a:p>
             <a:pPr algn="l"/>
             <a:r>
+              <a:rPr lang="en-GB" dirty="0" smtClean="0"/>
+              <a:t>6. Scrum PM Tool (3)</a:t>
+            </a:r>
+            <a:endParaRPr lang="en-GB" dirty="0"/>
+          </a:p>
+        </p:txBody>
+      </p:sp>
+      <p:sp>
+        <p:nvSpPr>
+          <p:cNvPr id="3" name="TextBox 2"/>
+          <p:cNvSpPr txBox="1"/>
+          <p:nvPr/>
+        </p:nvSpPr>
+        <p:spPr>
+          <a:xfrm>
+            <a:off x="284163" y="1717960"/>
+            <a:ext cx="8574087" cy="1015663"/>
+          </a:xfrm>
+          <a:prstGeom prst="rect">
+            <a:avLst/>
+          </a:prstGeom>
+          <a:noFill/>
+        </p:spPr>
+        <p:txBody>
+          <a:bodyPr wrap="square" rtlCol="0">
+            <a:spAutoFit/>
+          </a:bodyPr>
+          <a:lstStyle/>
+          <a:p>
+            <a:r>
+              <a:rPr lang="en-NZ" sz="2400" b="1" dirty="0" smtClean="0"/>
+              <a:t>SeeNowDo</a:t>
+            </a:r>
+          </a:p>
+          <a:p>
+            <a:pPr marL="742950" lvl="1" indent="-285750">
+              <a:buFont typeface="Wingdings" pitchFamily="2" charset="2"/>
+              <a:buChar char="v"/>
+            </a:pPr>
+            <a:endParaRPr lang="en-NZ" b="1" dirty="0" smtClean="0"/>
+          </a:p>
+          <a:p>
+            <a:pPr marL="742950" lvl="1" indent="-285750">
+              <a:buFont typeface="Wingdings" pitchFamily="2" charset="2"/>
+              <a:buChar char="v"/>
+            </a:pPr>
+            <a:r>
+              <a:rPr lang="en-NZ" dirty="0" smtClean="0"/>
+              <a:t>Image of Burn-Down Chart</a:t>
+            </a:r>
+          </a:p>
+        </p:txBody>
+      </p:sp>
+      <p:pic>
+        <p:nvPicPr>
+          <p:cNvPr id="3077" name="Picture 5"/>
+          <p:cNvPicPr>
+            <a:picLocks noChangeAspect="1" noChangeArrowheads="1"/>
+          </p:cNvPicPr>
+          <p:nvPr/>
+        </p:nvPicPr>
+        <p:blipFill>
+          <a:blip r:embed="rId2" cstate="email">
+            <a:extLst>
+              <a:ext uri="{28A0092B-C50C-407E-A947-70E740481C1C}">
+                <a14:useLocalDpi xmlns:a14="http://schemas.microsoft.com/office/drawing/2010/main" val="0"/>
+              </a:ext>
+            </a:extLst>
+          </a:blip>
+          <a:srcRect/>
+          <a:stretch>
+            <a:fillRect/>
+          </a:stretch>
+        </p:blipFill>
+        <p:spPr bwMode="auto">
+          <a:xfrm>
+            <a:off x="1131310" y="2733624"/>
+            <a:ext cx="5477308" cy="4000282"/>
+          </a:xfrm>
+          <a:prstGeom prst="rect">
+            <a:avLst/>
+          </a:prstGeom>
+          <a:noFill/>
+          <a:ln>
+            <a:noFill/>
+          </a:ln>
+          <a:effectLst/>
+          <a:extLst>
+            <a:ext uri="{909E8E84-426E-40dd-AFC4-6F175D3DCCD1}">
+              <a14:hiddenFill xmlns:a14="http://schemas.microsoft.com/office/drawing/2010/main">
+                <a:solidFill>
+                  <a:schemeClr val="accent1"/>
+                </a:solidFill>
+              </a14:hiddenFill>
+            </a:ext>
+            <a:ext uri="{91240B29-F687-4f45-9708-019B960494DF}">
+              <a14:hiddenLine xmlns:a14="http://schemas.microsoft.com/office/drawing/2010/main" w="9525">
+                <a:solidFill>
+                  <a:schemeClr val="tx1"/>
+                </a:solidFill>
+                <a:miter lim="800000"/>
+                <a:headEnd/>
+                <a:tailEnd/>
+              </a14:hiddenLine>
+            </a:ext>
+            <a:ext uri="{AF507438-7753-43e0-B8FC-AC1667EBCBE1}">
+              <a14:hiddenEffects xmlns:a14="http://schemas.microsoft.com/office/drawing/2010/main">
+                <a:effectLst>
+                  <a:outerShdw dist="35921" dir="2700000" algn="ctr" rotWithShape="0">
+                    <a:schemeClr val="bg2"/>
+                  </a:outerShdw>
+                </a:effectLst>
+              </a14:hiddenEffects>
+            </a:ext>
+          </a:extLst>
+        </p:spPr>
+      </p:pic>
+    </p:spTree>
+    <p:extLst>
+      <p:ext uri="{BB962C8B-B14F-4D97-AF65-F5344CB8AC3E}">
+        <p14:creationId xmlns:p14="http://schemas.microsoft.com/office/powerpoint/2010/main" val="2767928531"/>
+      </p:ext>
+    </p:extLst>
+  </p:cSld>
+  <p:clrMapOvr>
+    <a:masterClrMapping/>
+  </p:clrMapOvr>
+</p:sld>
+</file>
+
+<file path=ppt/slides/slide12.xml><?xml version="1.0" encoding="utf-8"?>
+<p:sld xmlns:a="http://schemas.openxmlformats.org/drawingml/2006/main" xmlns:r="http://schemas.openxmlformats.org/officeDocument/2006/relationships" xmlns:p="http://schemas.openxmlformats.org/presentationml/2006/main">
+  <p:cSld>
+    <p:spTree>
+      <p:nvGrpSpPr>
+        <p:cNvPr id="1" name=""/>
+        <p:cNvGrpSpPr/>
+        <p:nvPr/>
+      </p:nvGrpSpPr>
+      <p:grpSpPr>
+        <a:xfrm>
+          <a:off x="0" y="0"/>
+          <a:ext cx="0" cy="0"/>
+          <a:chOff x="0" y="0"/>
+          <a:chExt cx="0" cy="0"/>
+        </a:xfrm>
+      </p:grpSpPr>
+      <p:sp>
+        <p:nvSpPr>
+          <p:cNvPr id="2" name="标题 1"/>
+          <p:cNvSpPr>
+            <a:spLocks noGrp="1"/>
+          </p:cNvSpPr>
+          <p:nvPr>
+            <p:ph type="title"/>
+          </p:nvPr>
+        </p:nvSpPr>
+        <p:spPr/>
+        <p:txBody>
+          <a:bodyPr/>
+          <a:lstStyle/>
+          <a:p>
+            <a:pPr algn="l"/>
+            <a:r>
               <a:rPr lang="en-GB" dirty="0"/>
               <a:t>7</a:t>
             </a:r>
             <a:r>
               <a:rPr lang="en-GB" dirty="0" smtClean="0"/>
-              <a:t>. One User </a:t>
-            </a:r>
-            <a:r>
-              <a:rPr lang="en-GB" dirty="0" smtClean="0"/>
-              <a:t>Story (1)</a:t>
+              <a:t>. One User Story (1)</a:t>
             </a:r>
             <a:endParaRPr lang="en-GB" dirty="0"/>
           </a:p>
@@ -15166,7 +15933,7 @@
 </p:sld>
 </file>
 
-<file path=ppt/slides/slide12.xml><?xml version="1.0" encoding="utf-8"?>
+<file path=ppt/slides/slide13.xml><?xml version="1.0" encoding="utf-8"?>
 <p:sld xmlns:a="http://schemas.openxmlformats.org/drawingml/2006/main" xmlns:r="http://schemas.openxmlformats.org/officeDocument/2006/relationships" xmlns:p="http://schemas.openxmlformats.org/presentationml/2006/main">
   <p:cSld>
     <p:spTree>
@@ -15314,7 +16081,7 @@
 </p:sld>
 </file>
 
-<file path=ppt/slides/slide13.xml><?xml version="1.0" encoding="utf-8"?>
+<file path=ppt/slides/slide14.xml><?xml version="1.0" encoding="utf-8"?>
 <p:sld xmlns:a="http://schemas.openxmlformats.org/drawingml/2006/main" xmlns:r="http://schemas.openxmlformats.org/officeDocument/2006/relationships" xmlns:p="http://schemas.openxmlformats.org/presentationml/2006/main">
   <p:cSld>
     <p:spTree>
@@ -15353,11 +16120,7 @@
             </a:r>
             <a:r>
               <a:rPr lang="en-GB" dirty="0" smtClean="0"/>
-              <a:t>. One User </a:t>
-            </a:r>
-            <a:r>
-              <a:rPr lang="en-GB" dirty="0" smtClean="0"/>
-              <a:t>Story (3)</a:t>
+              <a:t>. One User Story (3)</a:t>
             </a:r>
             <a:endParaRPr lang="en-GB" dirty="0"/>
           </a:p>
@@ -15568,7 +16331,7 @@
 </p:sld>
 </file>
 
-<file path=ppt/slides/slide14.xml><?xml version="1.0" encoding="utf-8"?>
+<file path=ppt/slides/slide15.xml><?xml version="1.0" encoding="utf-8"?>
 <p:sld xmlns:a="http://schemas.openxmlformats.org/drawingml/2006/main" xmlns:r="http://schemas.openxmlformats.org/officeDocument/2006/relationships" xmlns:p="http://schemas.openxmlformats.org/presentationml/2006/main">
   <p:cSld>
     <p:spTree>
@@ -15587,32 +16350,511 @@
       </p:grpSpPr>
       <p:sp>
         <p:nvSpPr>
-          <p:cNvPr id="2" name="标题 1"/>
+          <p:cNvPr id="16386" name="Rectangle 5"/>
           <p:cNvSpPr>
-            <a:spLocks noGrp="1"/>
+            <a:spLocks noChangeArrowheads="1"/>
+          </p:cNvSpPr>
+          <p:nvPr/>
+        </p:nvSpPr>
+        <p:spPr bwMode="auto">
+          <a:xfrm>
+            <a:off x="284163" y="455613"/>
+            <a:ext cx="8574087" cy="1135062"/>
+          </a:xfrm>
+          <a:prstGeom prst="rect">
+            <a:avLst/>
+          </a:prstGeom>
+          <a:solidFill>
+            <a:srgbClr val="262626">
+              <a:alpha val="68999"/>
+            </a:srgbClr>
+          </a:solidFill>
+          <a:ln>
+            <a:noFill/>
+          </a:ln>
+          <a:extLst>
+            <a:ext uri="{91240B29-F687-4f45-9708-019B960494DF}">
+              <a14:hiddenLine xmlns:a14="http://schemas.microsoft.com/office/drawing/2010/main" w="25400" cap="flat" cmpd="sng">
+                <a:solidFill>
+                  <a:srgbClr val="700000"/>
+                </a:solidFill>
+                <a:bevel/>
+                <a:headEnd/>
+                <a:tailEnd/>
+              </a14:hiddenLine>
+            </a:ext>
+          </a:extLst>
+        </p:spPr>
+        <p:txBody>
+          <a:bodyPr anchor="ctr"/>
+          <a:lstStyle/>
+          <a:p>
+            <a:pPr algn="ctr"/>
+            <a:endParaRPr lang="en-GB">
+              <a:solidFill>
+                <a:srgbClr val="FFFFFF"/>
+              </a:solidFill>
+            </a:endParaRPr>
+          </a:p>
+        </p:txBody>
+      </p:sp>
+      <p:grpSp>
+        <p:nvGrpSpPr>
+          <p:cNvPr id="16387" name="Group 6"/>
+          <p:cNvGrpSpPr>
+            <a:grpSpLocks/>
+          </p:cNvGrpSpPr>
+          <p:nvPr/>
+        </p:nvGrpSpPr>
+        <p:grpSpPr bwMode="auto">
+          <a:xfrm>
+            <a:off x="284163" y="1577975"/>
+            <a:ext cx="8577262" cy="136525"/>
+            <a:chOff x="0" y="0"/>
+            <a:chExt cx="8576373" cy="137411"/>
+          </a:xfrm>
+        </p:grpSpPr>
+        <p:sp>
+          <p:nvSpPr>
+            <p:cNvPr id="16388" name="Rectangle 7"/>
+            <p:cNvSpPr>
+              <a:spLocks noChangeArrowheads="1"/>
+            </p:cNvSpPr>
+            <p:nvPr/>
+          </p:nvSpPr>
+          <p:spPr bwMode="auto">
+            <a:xfrm>
+              <a:off x="0" y="0"/>
+              <a:ext cx="1600200" cy="137411"/>
+            </a:xfrm>
+            <a:prstGeom prst="rect">
+              <a:avLst/>
+            </a:prstGeom>
+            <a:solidFill>
+              <a:schemeClr val="accent1"/>
+            </a:solidFill>
+            <a:ln>
+              <a:noFill/>
+            </a:ln>
+            <a:extLst>
+              <a:ext uri="{91240B29-F687-4f45-9708-019B960494DF}">
+                <a14:hiddenLine xmlns:a14="http://schemas.microsoft.com/office/drawing/2010/main" w="25400" cap="flat" cmpd="sng">
+                  <a:solidFill>
+                    <a:srgbClr val="700000"/>
+                  </a:solidFill>
+                  <a:bevel/>
+                  <a:headEnd/>
+                  <a:tailEnd/>
+                </a14:hiddenLine>
+              </a:ext>
+            </a:extLst>
+          </p:spPr>
+          <p:txBody>
+            <a:bodyPr anchor="ctr"/>
+            <a:lstStyle/>
+            <a:p>
+              <a:pPr algn="ctr"/>
+              <a:endParaRPr lang="en-GB">
+                <a:solidFill>
+                  <a:srgbClr val="FFFFFF"/>
+                </a:solidFill>
+              </a:endParaRPr>
+            </a:p>
+          </p:txBody>
+        </p:sp>
+        <p:sp>
+          <p:nvSpPr>
+            <p:cNvPr id="16389" name="Rectangle 8"/>
+            <p:cNvSpPr>
+              <a:spLocks noChangeArrowheads="1"/>
+            </p:cNvSpPr>
+            <p:nvPr/>
+          </p:nvSpPr>
+          <p:spPr bwMode="auto">
+            <a:xfrm>
+              <a:off x="1601011" y="0"/>
+              <a:ext cx="2743200" cy="137411"/>
+            </a:xfrm>
+            <a:prstGeom prst="rect">
+              <a:avLst/>
+            </a:prstGeom>
+            <a:solidFill>
+              <a:schemeClr val="accent2"/>
+            </a:solidFill>
+            <a:ln>
+              <a:noFill/>
+            </a:ln>
+            <a:extLst>
+              <a:ext uri="{91240B29-F687-4f45-9708-019B960494DF}">
+                <a14:hiddenLine xmlns:a14="http://schemas.microsoft.com/office/drawing/2010/main" w="25400" cap="flat" cmpd="sng">
+                  <a:solidFill>
+                    <a:srgbClr val="700000"/>
+                  </a:solidFill>
+                  <a:bevel/>
+                  <a:headEnd/>
+                  <a:tailEnd/>
+                </a14:hiddenLine>
+              </a:ext>
+            </a:extLst>
+          </p:spPr>
+          <p:txBody>
+            <a:bodyPr anchor="ctr"/>
+            <a:lstStyle/>
+            <a:p>
+              <a:pPr algn="ctr"/>
+              <a:endParaRPr lang="en-GB">
+                <a:solidFill>
+                  <a:srgbClr val="FFFFFF"/>
+                </a:solidFill>
+              </a:endParaRPr>
+            </a:p>
+          </p:txBody>
+        </p:sp>
+        <p:sp>
+          <p:nvSpPr>
+            <p:cNvPr id="16390" name="Rectangle 9"/>
+            <p:cNvSpPr>
+              <a:spLocks noChangeArrowheads="1"/>
+            </p:cNvSpPr>
+            <p:nvPr/>
+          </p:nvSpPr>
+          <p:spPr bwMode="auto">
+            <a:xfrm>
+              <a:off x="4342701" y="0"/>
+              <a:ext cx="4233672" cy="137411"/>
+            </a:xfrm>
+            <a:prstGeom prst="rect">
+              <a:avLst/>
+            </a:prstGeom>
+            <a:solidFill>
+              <a:srgbClr val="99CC00"/>
+            </a:solidFill>
+            <a:ln>
+              <a:noFill/>
+            </a:ln>
+            <a:extLst>
+              <a:ext uri="{91240B29-F687-4f45-9708-019B960494DF}">
+                <a14:hiddenLine xmlns:a14="http://schemas.microsoft.com/office/drawing/2010/main" w="25400" cap="flat" cmpd="sng">
+                  <a:solidFill>
+                    <a:srgbClr val="700000"/>
+                  </a:solidFill>
+                  <a:bevel/>
+                  <a:headEnd/>
+                  <a:tailEnd/>
+                </a14:hiddenLine>
+              </a:ext>
+            </a:extLst>
+          </p:spPr>
+          <p:txBody>
+            <a:bodyPr anchor="ctr"/>
+            <a:lstStyle/>
+            <a:p>
+              <a:pPr algn="ctr"/>
+              <a:endParaRPr lang="en-GB">
+                <a:solidFill>
+                  <a:srgbClr val="FFFFFF"/>
+                </a:solidFill>
+              </a:endParaRPr>
+            </a:p>
+          </p:txBody>
+        </p:sp>
+      </p:grpSp>
+      <p:sp>
+        <p:nvSpPr>
+          <p:cNvPr id="16391" name="标题 1"/>
+          <p:cNvSpPr>
+            <a:spLocks noGrp="1" noChangeArrowheads="1"/>
           </p:cNvSpPr>
           <p:nvPr>
-            <p:ph type="title"/>
+            <p:ph type="title" idx="4294967295"/>
           </p:nvPr>
         </p:nvSpPr>
-        <p:spPr/>
+        <p:spPr>
+          <a:ln/>
+        </p:spPr>
         <p:txBody>
           <a:bodyPr/>
           <a:lstStyle/>
           <a:p>
             <a:pPr algn="l"/>
             <a:r>
-              <a:rPr lang="en-GB" dirty="0" smtClean="0"/>
+              <a:rPr lang="en-GB" altLang="zh-CN"/>
               <a:t>8. Risk Management</a:t>
             </a:r>
-            <a:endParaRPr lang="en-GB" dirty="0"/>
+          </a:p>
+        </p:txBody>
+      </p:sp>
+      <p:pic>
+        <p:nvPicPr>
+          <p:cNvPr id="16392" name="Picture 8"/>
+          <p:cNvPicPr>
+            <a:picLocks noChangeAspect="1" noChangeArrowheads="1"/>
+          </p:cNvPicPr>
+          <p:nvPr/>
+        </p:nvPicPr>
+        <p:blipFill>
+          <a:blip r:embed="rId2">
+            <a:extLst>
+              <a:ext uri="{28A0092B-C50C-407E-A947-70E740481C1C}">
+                <a14:useLocalDpi xmlns:a14="http://schemas.microsoft.com/office/drawing/2010/main" val="0"/>
+              </a:ext>
+            </a:extLst>
+          </a:blip>
+          <a:srcRect/>
+          <a:stretch>
+            <a:fillRect/>
+          </a:stretch>
+        </p:blipFill>
+        <p:spPr bwMode="auto">
+          <a:xfrm>
+            <a:off x="284163" y="2004773"/>
+            <a:ext cx="8761412" cy="2673350"/>
+          </a:xfrm>
+          <a:prstGeom prst="rect">
+            <a:avLst/>
+          </a:prstGeom>
+          <a:noFill/>
+          <a:ln>
+            <a:noFill/>
+          </a:ln>
+          <a:effectLst/>
+          <a:extLst>
+            <a:ext uri="{909E8E84-426E-40dd-AFC4-6F175D3DCCD1}">
+              <a14:hiddenFill xmlns:a14="http://schemas.microsoft.com/office/drawing/2010/main">
+                <a:solidFill>
+                  <a:srgbClr val="FFFFFF"/>
+                </a:solidFill>
+              </a14:hiddenFill>
+            </a:ext>
+            <a:ext uri="{91240B29-F687-4f45-9708-019B960494DF}">
+              <a14:hiddenLine xmlns:a14="http://schemas.microsoft.com/office/drawing/2010/main" w="9525">
+                <a:solidFill>
+                  <a:srgbClr val="000000"/>
+                </a:solidFill>
+                <a:miter lim="800000"/>
+                <a:headEnd/>
+                <a:tailEnd/>
+              </a14:hiddenLine>
+            </a:ext>
+            <a:ext uri="{AF507438-7753-43e0-B8FC-AC1667EBCBE1}">
+              <a14:hiddenEffects xmlns:a14="http://schemas.microsoft.com/office/drawing/2010/main">
+                <a:effectLst>
+                  <a:outerShdw blurRad="63500" dist="38099" dir="2700000" algn="ctr" rotWithShape="0">
+                    <a:srgbClr val="000000">
+                      <a:alpha val="74998"/>
+                    </a:srgbClr>
+                  </a:outerShdw>
+                </a:effectLst>
+              </a14:hiddenEffects>
+            </a:ext>
+          </a:extLst>
+        </p:spPr>
+      </p:pic>
+      <p:sp>
+        <p:nvSpPr>
+          <p:cNvPr id="16393" name="Text Box 9"/>
+          <p:cNvSpPr txBox="1">
+            <a:spLocks noChangeArrowheads="1"/>
+          </p:cNvSpPr>
+          <p:nvPr/>
+        </p:nvSpPr>
+        <p:spPr bwMode="auto">
+          <a:xfrm>
+            <a:off x="246608" y="4878663"/>
+            <a:ext cx="8761412" cy="1384995"/>
+          </a:xfrm>
+          <a:prstGeom prst="rect">
+            <a:avLst/>
+          </a:prstGeom>
+          <a:noFill/>
+          <a:ln>
+            <a:noFill/>
+          </a:ln>
+          <a:extLst>
+            <a:ext uri="{909E8E84-426E-40dd-AFC4-6F175D3DCCD1}">
+              <a14:hiddenFill xmlns:a14="http://schemas.microsoft.com/office/drawing/2010/main">
+                <a:solidFill>
+                  <a:srgbClr val="FFFFFF"/>
+                </a:solidFill>
+              </a14:hiddenFill>
+            </a:ext>
+            <a:ext uri="{91240B29-F687-4f45-9708-019B960494DF}">
+              <a14:hiddenLine xmlns:a14="http://schemas.microsoft.com/office/drawing/2010/main" w="9525">
+                <a:solidFill>
+                  <a:srgbClr val="000000"/>
+                </a:solidFill>
+                <a:miter lim="800000"/>
+                <a:headEnd/>
+                <a:tailEnd/>
+              </a14:hiddenLine>
+            </a:ext>
+          </a:extLst>
+        </p:spPr>
+        <p:txBody>
+          <a:bodyPr wrap="square">
+            <a:spAutoFit/>
+          </a:bodyPr>
+          <a:lstStyle>
+            <a:lvl1pPr>
+              <a:defRPr kumimoji="1">
+                <a:solidFill>
+                  <a:schemeClr val="tx1"/>
+                </a:solidFill>
+                <a:latin typeface="Arial" charset="0"/>
+                <a:ea typeface="宋体" charset="0"/>
+              </a:defRPr>
+            </a:lvl1pPr>
+            <a:lvl2pPr>
+              <a:defRPr kumimoji="1">
+                <a:solidFill>
+                  <a:schemeClr val="tx1"/>
+                </a:solidFill>
+                <a:latin typeface="Arial" charset="0"/>
+                <a:ea typeface="宋体" charset="0"/>
+              </a:defRPr>
+            </a:lvl2pPr>
+            <a:lvl3pPr>
+              <a:defRPr kumimoji="1">
+                <a:solidFill>
+                  <a:schemeClr val="tx1"/>
+                </a:solidFill>
+                <a:latin typeface="Arial" charset="0"/>
+                <a:ea typeface="宋体" charset="0"/>
+              </a:defRPr>
+            </a:lvl3pPr>
+            <a:lvl4pPr>
+              <a:defRPr kumimoji="1">
+                <a:solidFill>
+                  <a:schemeClr val="tx1"/>
+                </a:solidFill>
+                <a:latin typeface="Arial" charset="0"/>
+                <a:ea typeface="宋体" charset="0"/>
+              </a:defRPr>
+            </a:lvl4pPr>
+            <a:lvl5pPr>
+              <a:defRPr kumimoji="1">
+                <a:solidFill>
+                  <a:schemeClr val="tx1"/>
+                </a:solidFill>
+                <a:latin typeface="Arial" charset="0"/>
+                <a:ea typeface="宋体" charset="0"/>
+              </a:defRPr>
+            </a:lvl5pPr>
+            <a:lvl6pPr fontAlgn="base">
+              <a:spcBef>
+                <a:spcPct val="0"/>
+              </a:spcBef>
+              <a:spcAft>
+                <a:spcPct val="0"/>
+              </a:spcAft>
+              <a:buFont typeface="Arial" charset="0"/>
+              <a:defRPr kumimoji="1">
+                <a:solidFill>
+                  <a:schemeClr val="tx1"/>
+                </a:solidFill>
+                <a:latin typeface="Arial" charset="0"/>
+                <a:ea typeface="宋体" charset="0"/>
+              </a:defRPr>
+            </a:lvl6pPr>
+            <a:lvl7pPr fontAlgn="base">
+              <a:spcBef>
+                <a:spcPct val="0"/>
+              </a:spcBef>
+              <a:spcAft>
+                <a:spcPct val="0"/>
+              </a:spcAft>
+              <a:buFont typeface="Arial" charset="0"/>
+              <a:defRPr kumimoji="1">
+                <a:solidFill>
+                  <a:schemeClr val="tx1"/>
+                </a:solidFill>
+                <a:latin typeface="Arial" charset="0"/>
+                <a:ea typeface="宋体" charset="0"/>
+              </a:defRPr>
+            </a:lvl7pPr>
+            <a:lvl8pPr fontAlgn="base">
+              <a:spcBef>
+                <a:spcPct val="0"/>
+              </a:spcBef>
+              <a:spcAft>
+                <a:spcPct val="0"/>
+              </a:spcAft>
+              <a:buFont typeface="Arial" charset="0"/>
+              <a:defRPr kumimoji="1">
+                <a:solidFill>
+                  <a:schemeClr val="tx1"/>
+                </a:solidFill>
+                <a:latin typeface="Arial" charset="0"/>
+                <a:ea typeface="宋体" charset="0"/>
+              </a:defRPr>
+            </a:lvl8pPr>
+            <a:lvl9pPr fontAlgn="base">
+              <a:spcBef>
+                <a:spcPct val="0"/>
+              </a:spcBef>
+              <a:spcAft>
+                <a:spcPct val="0"/>
+              </a:spcAft>
+              <a:buFont typeface="Arial" charset="0"/>
+              <a:defRPr kumimoji="1">
+                <a:solidFill>
+                  <a:schemeClr val="tx1"/>
+                </a:solidFill>
+                <a:latin typeface="Arial" charset="0"/>
+                <a:ea typeface="宋体" charset="0"/>
+              </a:defRPr>
+            </a:lvl9pPr>
+          </a:lstStyle>
+          <a:p>
+            <a:r>
+              <a:rPr lang="zh-CN" altLang="en-US" sz="2800" b="1" dirty="0">
+                <a:latin typeface="Calibri" charset="0"/>
+                <a:cs typeface="Calibri" charset="0"/>
+                <a:sym typeface="Calibri" charset="0"/>
+              </a:rPr>
+              <a:t>The Risk Tracking will be carried out after daily scrum</a:t>
+            </a:r>
+            <a:r>
+              <a:rPr lang="zh-CN" altLang="en-US" sz="2800" b="1" dirty="0">
+                <a:latin typeface="Calibri" charset="0"/>
+                <a:sym typeface="Calibri" charset="0"/>
+              </a:rPr>
+              <a:t>. You can find the documentation in our</a:t>
+            </a:r>
+            <a:r>
+              <a:rPr lang="zh-CN" altLang="en-US" sz="2800" b="1" dirty="0">
+                <a:latin typeface="Calibri" charset="0"/>
+                <a:cs typeface="Calibri" charset="0"/>
+                <a:sym typeface="Calibri" charset="0"/>
+              </a:rPr>
+              <a:t> GitHub, located </a:t>
+            </a:r>
+            <a:r>
+              <a:rPr lang="zh-CN" altLang="en-US" sz="2800" b="1" u="sng" dirty="0">
+                <a:solidFill>
+                  <a:srgbClr val="0070C0"/>
+                </a:solidFill>
+                <a:latin typeface="Calibri" charset="0"/>
+                <a:cs typeface="Calibri" charset="0"/>
+                <a:sym typeface="Calibri" charset="0"/>
+              </a:rPr>
+              <a:t>/PCB/02 Plans &amp; Actuals/2.3_Risk &amp; Issue</a:t>
+            </a:r>
+            <a:r>
+              <a:rPr lang="zh-CN" altLang="en-US" sz="2800" b="1" dirty="0">
+                <a:latin typeface="Calibri" charset="0"/>
+                <a:cs typeface="Calibri" charset="0"/>
+                <a:sym typeface="Calibri" charset="0"/>
+              </a:rPr>
+              <a:t>.</a:t>
+            </a:r>
           </a:p>
         </p:txBody>
       </p:sp>
     </p:spTree>
     <p:extLst>
       <p:ext uri="{BB962C8B-B14F-4D97-AF65-F5344CB8AC3E}">
-        <p14:creationId xmlns:p14="http://schemas.microsoft.com/office/powerpoint/2010/main" val="3096073942"/>
+        <p14:creationId xmlns:p14="http://schemas.microsoft.com/office/powerpoint/2010/main" val="547582084"/>
       </p:ext>
     </p:extLst>
   </p:cSld>
@@ -15698,7 +16940,7 @@
   <p:timing>
     <p:tnLst>
       <p:par>
-        <p:cTn id="1" dur="indefinite" restart="never" nodeType="tmRoot"/>
+        <p:cTn xmlns:p14="http://schemas.microsoft.com/office/powerpoint/2010/main" id="1" dur="indefinite" restart="never" nodeType="tmRoot"/>
       </p:par>
     </p:tnLst>
   </p:timing>
@@ -15786,6 +17028,57 @@
       </p:grpSpPr>
       <p:sp>
         <p:nvSpPr>
+          <p:cNvPr id="12" name="圆角矩形 11"/>
+          <p:cNvSpPr/>
+          <p:nvPr/>
+        </p:nvSpPr>
+        <p:spPr>
+          <a:xfrm>
+            <a:off x="284163" y="2029968"/>
+            <a:ext cx="8546412" cy="4528038"/>
+          </a:xfrm>
+          <a:prstGeom prst="roundRect">
+            <a:avLst/>
+          </a:prstGeom>
+          <a:solidFill>
+            <a:srgbClr val="0070C0"/>
+          </a:solidFill>
+          <a:ln>
+            <a:noFill/>
+          </a:ln>
+        </p:spPr>
+        <p:style>
+          <a:lnRef idx="1">
+            <a:schemeClr val="accent1"/>
+          </a:lnRef>
+          <a:fillRef idx="3">
+            <a:schemeClr val="accent1"/>
+          </a:fillRef>
+          <a:effectRef idx="2">
+            <a:schemeClr val="accent1"/>
+          </a:effectRef>
+          <a:fontRef idx="minor">
+            <a:schemeClr val="lt1"/>
+          </a:fontRef>
+        </p:style>
+        <p:txBody>
+          <a:bodyPr rtlCol="0" anchor="ctr"/>
+          <a:lstStyle/>
+          <a:p>
+            <a:r>
+              <a:rPr lang="en-US" altLang="zh-CN" sz="2000" dirty="0" smtClean="0"/>
+              <a:t>		</a:t>
+            </a:r>
+            <a:r>
+              <a:rPr lang="en-US" altLang="zh-CN" sz="2000" u="sng" dirty="0" smtClean="0"/>
+              <a:t>www.getskills.ac.nz</a:t>
+            </a:r>
+            <a:endParaRPr lang="zh-CN" altLang="en-US" sz="2000" u="sng" dirty="0"/>
+          </a:p>
+        </p:txBody>
+      </p:sp>
+      <p:sp>
+        <p:nvSpPr>
           <p:cNvPr id="2" name="标题 1"/>
           <p:cNvSpPr>
             <a:spLocks noGrp="1"/>
@@ -15802,16 +17095,305 @@
             <a:pPr algn="l"/>
             <a:r>
               <a:rPr lang="en-GB" dirty="0" smtClean="0"/>
-              <a:t>2. Product Owner</a:t>
-            </a:r>
-            <a:endParaRPr lang="en-GB" dirty="0"/>
+              <a:t>2. Product Owner – </a:t>
+            </a:r>
+            <a:r>
+              <a:rPr lang="en-GB" sz="3200" dirty="0" smtClean="0">
+                <a:effectLst>
+                  <a:outerShdw blurRad="38100" dist="38100" dir="2700000" algn="tl">
+                    <a:srgbClr val="000000">
+                      <a:alpha val="43137"/>
+                    </a:srgbClr>
+                  </a:outerShdw>
+                </a:effectLst>
+              </a:rPr>
+              <a:t>CEO of GetSkills.co.nz</a:t>
+            </a:r>
+            <a:endParaRPr lang="en-GB" sz="3200" dirty="0">
+              <a:effectLst>
+                <a:outerShdw blurRad="38100" dist="38100" dir="2700000" algn="tl">
+                  <a:srgbClr val="000000">
+                    <a:alpha val="43137"/>
+                  </a:srgbClr>
+                </a:outerShdw>
+              </a:effectLst>
+            </a:endParaRPr>
+          </a:p>
+        </p:txBody>
+      </p:sp>
+      <p:pic>
+        <p:nvPicPr>
+          <p:cNvPr id="9" name="图片 8"/>
+          <p:cNvPicPr>
+            <a:picLocks noChangeAspect="1"/>
+          </p:cNvPicPr>
+          <p:nvPr/>
+        </p:nvPicPr>
+        <p:blipFill>
+          <a:blip r:embed="rId3">
+            <a:extLst>
+              <a:ext uri="{28A0092B-C50C-407E-A947-70E740481C1C}">
+                <a14:useLocalDpi xmlns:a14="http://schemas.microsoft.com/office/drawing/2010/main" val="0"/>
+              </a:ext>
+            </a:extLst>
+          </a:blip>
+          <a:stretch>
+            <a:fillRect/>
+          </a:stretch>
+        </p:blipFill>
+        <p:spPr>
+          <a:xfrm>
+            <a:off x="816733" y="2414345"/>
+            <a:ext cx="4252607" cy="1958245"/>
+          </a:xfrm>
+          <a:prstGeom prst="rect">
+            <a:avLst/>
+          </a:prstGeom>
+        </p:spPr>
+      </p:pic>
+      <p:sp>
+        <p:nvSpPr>
+          <p:cNvPr id="10" name="文本框 9"/>
+          <p:cNvSpPr txBox="1"/>
+          <p:nvPr/>
+        </p:nvSpPr>
+        <p:spPr>
+          <a:xfrm>
+            <a:off x="844408" y="4526003"/>
+            <a:ext cx="8013842" cy="1877437"/>
+          </a:xfrm>
+          <a:prstGeom prst="rect">
+            <a:avLst/>
+          </a:prstGeom>
+          <a:noFill/>
+        </p:spPr>
+        <p:txBody>
+          <a:bodyPr wrap="square" rtlCol="0">
+            <a:spAutoFit/>
+          </a:bodyPr>
+          <a:lstStyle/>
+          <a:p>
+            <a:pPr fontAlgn="base"/>
+            <a:r>
+              <a:rPr lang="en-US" altLang="zh-CN" sz="3200" b="1" dirty="0">
+                <a:solidFill>
+                  <a:schemeClr val="accent3">
+                    <a:lumMod val="60000"/>
+                    <a:lumOff val="40000"/>
+                  </a:schemeClr>
+                </a:solidFill>
+              </a:rPr>
+              <a:t>About </a:t>
+            </a:r>
+            <a:r>
+              <a:rPr lang="en-US" altLang="zh-CN" sz="3200" b="1" dirty="0" smtClean="0">
+                <a:solidFill>
+                  <a:schemeClr val="accent3">
+                    <a:lumMod val="60000"/>
+                    <a:lumOff val="40000"/>
+                  </a:schemeClr>
+                </a:solidFill>
+              </a:rPr>
+              <a:t>Them:</a:t>
+            </a:r>
+          </a:p>
+          <a:p>
+            <a:pPr marL="742950" lvl="1" indent="-285750">
+              <a:buFont typeface="Wingdings" pitchFamily="2" charset="2"/>
+              <a:buChar char="v"/>
+            </a:pPr>
+            <a:r>
+              <a:rPr lang="en-NZ" altLang="zh-CN" sz="2800" b="1" dirty="0">
+                <a:solidFill>
+                  <a:schemeClr val="bg1">
+                    <a:lumMod val="85000"/>
+                  </a:schemeClr>
+                </a:solidFill>
+              </a:rPr>
+              <a:t> </a:t>
+            </a:r>
+            <a:r>
+              <a:rPr lang="en-US" altLang="zh-CN" sz="2800" b="1" dirty="0" smtClean="0">
+                <a:solidFill>
+                  <a:schemeClr val="bg1">
+                    <a:lumMod val="85000"/>
+                  </a:schemeClr>
+                </a:solidFill>
+              </a:rPr>
+              <a:t>New Zealand based IT training company</a:t>
+            </a:r>
+          </a:p>
+          <a:p>
+            <a:pPr marL="742950" lvl="1" indent="-285750">
+              <a:buFont typeface="Wingdings" pitchFamily="2" charset="2"/>
+              <a:buChar char="v"/>
+            </a:pPr>
+            <a:r>
+              <a:rPr lang="en-US" altLang="zh-CN" sz="2800" b="1" dirty="0" smtClean="0">
+                <a:solidFill>
+                  <a:schemeClr val="bg1">
+                    <a:lumMod val="85000"/>
+                  </a:schemeClr>
+                </a:solidFill>
+              </a:rPr>
+              <a:t> Objective: Teach, Train and Place</a:t>
+            </a:r>
+          </a:p>
+          <a:p>
+            <a:pPr marL="742950" lvl="1" indent="-285750">
+              <a:buFont typeface="Wingdings" pitchFamily="2" charset="2"/>
+              <a:buChar char="v"/>
+            </a:pPr>
+            <a:r>
+              <a:rPr lang="en-US" altLang="zh-CN" sz="2800" b="1" dirty="0">
+                <a:solidFill>
+                  <a:schemeClr val="bg1">
+                    <a:lumMod val="85000"/>
+                  </a:schemeClr>
+                </a:solidFill>
+              </a:rPr>
+              <a:t> </a:t>
+            </a:r>
+            <a:r>
+              <a:rPr lang="en-US" altLang="zh-CN" sz="2800" b="1" dirty="0" smtClean="0">
+                <a:solidFill>
+                  <a:schemeClr val="bg1">
+                    <a:lumMod val="85000"/>
+                  </a:schemeClr>
+                </a:solidFill>
+              </a:rPr>
+              <a:t>Placement is Commitment</a:t>
+            </a:r>
+          </a:p>
+        </p:txBody>
+      </p:sp>
+      <p:sp>
+        <p:nvSpPr>
+          <p:cNvPr id="13" name="矩形 12"/>
+          <p:cNvSpPr/>
+          <p:nvPr/>
+        </p:nvSpPr>
+        <p:spPr>
+          <a:xfrm>
+            <a:off x="2432304" y="3986784"/>
+            <a:ext cx="3657600" cy="385806"/>
+          </a:xfrm>
+          <a:prstGeom prst="rect">
+            <a:avLst/>
+          </a:prstGeom>
+          <a:noFill/>
+          <a:ln>
+            <a:noFill/>
+          </a:ln>
+        </p:spPr>
+        <p:style>
+          <a:lnRef idx="1">
+            <a:schemeClr val="accent1"/>
+          </a:lnRef>
+          <a:fillRef idx="3">
+            <a:schemeClr val="accent1"/>
+          </a:fillRef>
+          <a:effectRef idx="2">
+            <a:schemeClr val="accent1"/>
+          </a:effectRef>
+          <a:fontRef idx="minor">
+            <a:schemeClr val="lt1"/>
+          </a:fontRef>
+        </p:style>
+        <p:txBody>
+          <a:bodyPr rtlCol="0" anchor="ctr"/>
+          <a:lstStyle/>
+          <a:p>
+            <a:pPr algn="ctr"/>
+            <a:endParaRPr lang="zh-CN" altLang="en-US"/>
+          </a:p>
+        </p:txBody>
+      </p:sp>
+      <p:sp>
+        <p:nvSpPr>
+          <p:cNvPr id="17" name="上凸带形 16"/>
+          <p:cNvSpPr/>
+          <p:nvPr/>
+        </p:nvSpPr>
+        <p:spPr>
+          <a:xfrm>
+            <a:off x="5126402" y="2686682"/>
+            <a:ext cx="3431881" cy="1720501"/>
+          </a:xfrm>
+          <a:prstGeom prst="ribbon2">
+            <a:avLst>
+              <a:gd name="adj1" fmla="val 16667"/>
+              <a:gd name="adj2" fmla="val 69184"/>
+            </a:avLst>
+          </a:prstGeom>
+          <a:solidFill>
+            <a:schemeClr val="accent3">
+              <a:lumMod val="60000"/>
+              <a:lumOff val="40000"/>
+            </a:schemeClr>
+          </a:solidFill>
+          <a:ln>
+            <a:solidFill>
+              <a:schemeClr val="tx2">
+                <a:lumMod val="75000"/>
+                <a:lumOff val="25000"/>
+              </a:schemeClr>
+            </a:solidFill>
+          </a:ln>
+        </p:spPr>
+        <p:style>
+          <a:lnRef idx="1">
+            <a:schemeClr val="accent1"/>
+          </a:lnRef>
+          <a:fillRef idx="3">
+            <a:schemeClr val="accent1"/>
+          </a:fillRef>
+          <a:effectRef idx="2">
+            <a:schemeClr val="accent1"/>
+          </a:effectRef>
+          <a:fontRef idx="minor">
+            <a:schemeClr val="lt1"/>
+          </a:fontRef>
+        </p:style>
+        <p:txBody>
+          <a:bodyPr rtlCol="0" anchor="ctr"/>
+          <a:lstStyle/>
+          <a:p>
+            <a:pPr algn="ctr"/>
+            <a:r>
+              <a:rPr lang="en-US" altLang="zh-CN" sz="2400" b="1" dirty="0">
+                <a:solidFill>
+                  <a:schemeClr val="accent2">
+                    <a:lumMod val="50000"/>
+                  </a:schemeClr>
+                </a:solidFill>
+              </a:rPr>
+              <a:t>CEO have some concerns about their </a:t>
+            </a:r>
+            <a:r>
+              <a:rPr lang="en-US" altLang="zh-CN" sz="2400" b="1" dirty="0" smtClean="0">
+                <a:solidFill>
+                  <a:schemeClr val="accent2">
+                    <a:lumMod val="50000"/>
+                  </a:schemeClr>
+                </a:solidFill>
+              </a:rPr>
+              <a:t>website</a:t>
+            </a:r>
+            <a:endParaRPr lang="zh-CN" altLang="en-US" sz="2400" b="1" dirty="0">
+              <a:solidFill>
+                <a:schemeClr val="accent2">
+                  <a:lumMod val="50000"/>
+                </a:schemeClr>
+              </a:solidFill>
+            </a:endParaRPr>
           </a:p>
         </p:txBody>
       </p:sp>
     </p:spTree>
     <p:extLst>
       <p:ext uri="{BB962C8B-B14F-4D97-AF65-F5344CB8AC3E}">
-        <p14:creationId xmlns:p14="http://schemas.microsoft.com/office/powerpoint/2010/main" val="3326875674"/>
+        <p14:creationId xmlns:p14="http://schemas.microsoft.com/office/powerpoint/2010/main" val="4029337604"/>
       </p:ext>
     </p:extLst>
   </p:cSld>
@@ -15866,10 +17448,98 @@
           </a:p>
         </p:txBody>
       </p:sp>
+      <p:pic>
+        <p:nvPicPr>
+          <p:cNvPr id="1025" name="Picture 1" descr="C:\Users\Miranda\AppData\Roaming\Tencent\Users\1251226696\QQ\WinTemp\RichOle\200_7AGCDBV}QU`PXH~2AGP.png"/>
+          <p:cNvPicPr>
+            <a:picLocks noChangeAspect="1" noChangeArrowheads="1"/>
+          </p:cNvPicPr>
+          <p:nvPr/>
+        </p:nvPicPr>
+        <p:blipFill>
+          <a:blip r:embed="rId2" cstate="email">
+            <a:extLst>
+              <a:ext uri="{28A0092B-C50C-407E-A947-70E740481C1C}">
+                <a14:useLocalDpi xmlns:a14="http://schemas.microsoft.com/office/drawing/2010/main" val="0"/>
+              </a:ext>
+            </a:extLst>
+          </a:blip>
+          <a:srcRect/>
+          <a:stretch>
+            <a:fillRect/>
+          </a:stretch>
+        </p:blipFill>
+        <p:spPr bwMode="auto">
+          <a:xfrm>
+            <a:off x="0" y="2514089"/>
+            <a:ext cx="9144000" cy="4343911"/>
+          </a:xfrm>
+          <a:prstGeom prst="rect">
+            <a:avLst/>
+          </a:prstGeom>
+          <a:noFill/>
+          <a:extLst>
+            <a:ext uri="{909E8E84-426E-40dd-AFC4-6F175D3DCCD1}">
+              <a14:hiddenFill xmlns:a14="http://schemas.microsoft.com/office/drawing/2010/main">
+                <a:solidFill>
+                  <a:srgbClr val="FFFFFF"/>
+                </a:solidFill>
+              </a14:hiddenFill>
+            </a:ext>
+          </a:extLst>
+        </p:spPr>
+      </p:pic>
+      <p:sp>
+        <p:nvSpPr>
+          <p:cNvPr id="3" name="TextBox 2"/>
+          <p:cNvSpPr txBox="1"/>
+          <p:nvPr/>
+        </p:nvSpPr>
+        <p:spPr>
+          <a:xfrm>
+            <a:off x="284163" y="1856414"/>
+            <a:ext cx="3788229" cy="523220"/>
+          </a:xfrm>
+          <a:prstGeom prst="rect">
+            <a:avLst/>
+          </a:prstGeom>
+          <a:noFill/>
+        </p:spPr>
+        <p:txBody>
+          <a:bodyPr wrap="square" rtlCol="0">
+            <a:spAutoFit/>
+          </a:bodyPr>
+          <a:lstStyle/>
+          <a:p>
+            <a:r>
+              <a:rPr lang="en-US" altLang="zh-CN" sz="2800" dirty="0" smtClean="0">
+                <a:solidFill>
+                  <a:srgbClr val="0070C0"/>
+                </a:solidFill>
+                <a:hlinkClick r:id="rId3"/>
+              </a:rPr>
+              <a:t>getskills.co.nz/</a:t>
+            </a:r>
+            <a:r>
+              <a:rPr lang="en-US" altLang="zh-CN" sz="2800" dirty="0" smtClean="0">
+                <a:solidFill>
+                  <a:srgbClr val="0070C0"/>
+                </a:solidFill>
+              </a:rPr>
+              <a:t> </a:t>
+            </a:r>
+            <a:endParaRPr lang="zh-CN" altLang="en-US" sz="2800" dirty="0">
+              <a:solidFill>
+                <a:srgbClr val="0070C0"/>
+              </a:solidFill>
+            </a:endParaRPr>
+          </a:p>
+        </p:txBody>
+      </p:sp>
     </p:spTree>
     <p:extLst>
       <p:ext uri="{BB962C8B-B14F-4D97-AF65-F5344CB8AC3E}">
-        <p14:creationId xmlns:p14="http://schemas.microsoft.com/office/powerpoint/2010/main" val="1003356158"/>
+        <p14:creationId xmlns:p14="http://schemas.microsoft.com/office/powerpoint/2010/main" val="610763998"/>
       </p:ext>
     </p:extLst>
   </p:cSld>
@@ -15879,7 +17549,7 @@
   <p:timing>
     <p:tnLst>
       <p:par>
-        <p:cTn id="1" dur="indefinite" restart="never" nodeType="tmRoot"/>
+        <p:cTn xmlns:p14="http://schemas.microsoft.com/office/powerpoint/2010/main" id="1" dur="indefinite" restart="never" nodeType="tmRoot"/>
       </p:par>
     </p:tnLst>
   </p:timing>
@@ -15920,23 +17590,220 @@
           <a:p>
             <a:pPr algn="l"/>
             <a:r>
+              <a:rPr lang="en-GB" dirty="0"/>
+              <a:t>3</a:t>
+            </a:r>
+            <a:r>
               <a:rPr lang="en-GB" dirty="0" smtClean="0"/>
-              <a:t>4. Product Backlog</a:t>
+              <a:t>. Project Goal and Major Capability</a:t>
             </a:r>
             <a:endParaRPr lang="en-GB" dirty="0"/>
+          </a:p>
+        </p:txBody>
+      </p:sp>
+      <p:sp>
+        <p:nvSpPr>
+          <p:cNvPr id="3" name="TextBox 2"/>
+          <p:cNvSpPr txBox="1"/>
+          <p:nvPr/>
+        </p:nvSpPr>
+        <p:spPr>
+          <a:xfrm>
+            <a:off x="284160" y="1965720"/>
+            <a:ext cx="8574087" cy="4062651"/>
+          </a:xfrm>
+          <a:prstGeom prst="rect">
+            <a:avLst/>
+          </a:prstGeom>
+          <a:noFill/>
+        </p:spPr>
+        <p:txBody>
+          <a:bodyPr wrap="square" rtlCol="0">
+            <a:spAutoFit/>
+          </a:bodyPr>
+          <a:lstStyle/>
+          <a:p>
+            <a:pPr>
+              <a:lnSpc>
+                <a:spcPct val="150000"/>
+              </a:lnSpc>
+            </a:pPr>
+            <a:r>
+              <a:rPr lang="en-US" altLang="zh-CN" sz="3200" dirty="0" smtClean="0"/>
+              <a:t>Major Capabilities:</a:t>
+            </a:r>
+          </a:p>
+          <a:p>
+            <a:pPr lvl="0" algn="just">
+              <a:lnSpc>
+                <a:spcPct val="150000"/>
+              </a:lnSpc>
+              <a:spcAft>
+                <a:spcPts val="1200"/>
+              </a:spcAft>
+            </a:pPr>
+            <a:r>
+              <a:rPr lang="en-US" altLang="zh-CN" sz="2000" dirty="0" smtClean="0"/>
+              <a:t>1) Visitor ----- </a:t>
+            </a:r>
+            <a:r>
+              <a:rPr lang="en-US" altLang="zh-CN" sz="2000" dirty="0"/>
+              <a:t>view the </a:t>
+            </a:r>
+            <a:r>
+              <a:rPr lang="en-US" altLang="zh-CN" sz="2000" dirty="0" smtClean="0"/>
+              <a:t>website, scan </a:t>
+            </a:r>
+            <a:r>
+              <a:rPr lang="en-US" altLang="zh-CN" sz="2000" dirty="0"/>
+              <a:t>the course </a:t>
+            </a:r>
+            <a:r>
+              <a:rPr lang="en-US" altLang="zh-CN" sz="2000" dirty="0" smtClean="0"/>
+              <a:t>list, take </a:t>
+            </a:r>
+            <a:r>
+              <a:rPr lang="en-US" altLang="zh-CN" sz="2000" dirty="0"/>
+              <a:t>a </a:t>
+            </a:r>
+            <a:r>
+              <a:rPr lang="en-US" altLang="zh-CN" sz="2000" dirty="0" smtClean="0"/>
+              <a:t> test </a:t>
+            </a:r>
+            <a:r>
+              <a:rPr lang="en-US" altLang="zh-CN" sz="2000" dirty="0"/>
+              <a:t>without </a:t>
+            </a:r>
+            <a:r>
+              <a:rPr lang="en-US" altLang="zh-CN" sz="2000" dirty="0" smtClean="0"/>
+              <a:t>registering</a:t>
+            </a:r>
+            <a:endParaRPr lang="zh-CN" altLang="zh-CN" sz="2000" dirty="0"/>
+          </a:p>
+          <a:p>
+            <a:pPr lvl="0" algn="just">
+              <a:lnSpc>
+                <a:spcPct val="150000"/>
+              </a:lnSpc>
+              <a:spcAft>
+                <a:spcPts val="1200"/>
+              </a:spcAft>
+            </a:pPr>
+            <a:r>
+              <a:rPr lang="en-US" altLang="zh-CN" sz="2000" dirty="0" smtClean="0"/>
+              <a:t>2) </a:t>
+            </a:r>
+            <a:r>
+              <a:rPr lang="en-US" altLang="zh-CN" sz="2000" dirty="0"/>
+              <a:t>S</a:t>
+            </a:r>
+            <a:r>
+              <a:rPr lang="en-US" altLang="zh-CN" sz="2000" dirty="0" smtClean="0"/>
+              <a:t>ystem </a:t>
+            </a:r>
+            <a:r>
+              <a:rPr lang="en-US" altLang="zh-CN" sz="2000" dirty="0"/>
+              <a:t>(course advisor) </a:t>
+            </a:r>
+            <a:r>
+              <a:rPr lang="en-US" altLang="zh-CN" sz="2000" dirty="0" smtClean="0"/>
+              <a:t>---- give </a:t>
+            </a:r>
+            <a:r>
+              <a:rPr lang="en-US" altLang="zh-CN" sz="2000" dirty="0"/>
+              <a:t>the user a short </a:t>
+            </a:r>
+            <a:r>
+              <a:rPr lang="en-US" altLang="zh-CN" sz="2000" dirty="0" smtClean="0"/>
+              <a:t>survey, give </a:t>
+            </a:r>
+            <a:r>
+              <a:rPr lang="en-US" altLang="zh-CN" sz="2000" dirty="0"/>
+              <a:t>a list of successful </a:t>
+            </a:r>
+            <a:r>
+              <a:rPr lang="en-US" altLang="zh-CN" sz="2000" dirty="0" smtClean="0"/>
+              <a:t>examples, recommend </a:t>
+            </a:r>
+            <a:r>
+              <a:rPr lang="en-US" altLang="zh-CN" sz="2000" dirty="0"/>
+              <a:t>some suitable </a:t>
+            </a:r>
+            <a:r>
+              <a:rPr lang="en-US" altLang="zh-CN" sz="2000" dirty="0" smtClean="0"/>
+              <a:t>courses</a:t>
+            </a:r>
+            <a:endParaRPr lang="zh-CN" altLang="zh-CN" sz="2000" dirty="0"/>
+          </a:p>
+          <a:p>
+            <a:pPr lvl="0" algn="just">
+              <a:lnSpc>
+                <a:spcPct val="150000"/>
+              </a:lnSpc>
+              <a:spcAft>
+                <a:spcPts val="1200"/>
+              </a:spcAft>
+            </a:pPr>
+            <a:r>
+              <a:rPr lang="en-US" altLang="zh-CN" sz="2000" dirty="0" smtClean="0"/>
+              <a:t>3) </a:t>
+            </a:r>
+            <a:r>
+              <a:rPr lang="en-US" altLang="zh-CN" sz="2000" dirty="0"/>
+              <a:t>U</a:t>
+            </a:r>
+            <a:r>
+              <a:rPr lang="en-US" altLang="zh-CN" sz="2000" dirty="0" smtClean="0"/>
+              <a:t>ser ---- select courses, make </a:t>
+            </a:r>
+            <a:r>
+              <a:rPr lang="en-US" altLang="zh-CN" sz="2000" dirty="0"/>
+              <a:t>payments </a:t>
+            </a:r>
+            <a:r>
+              <a:rPr lang="en-US" altLang="zh-CN" sz="2000" dirty="0" smtClean="0"/>
+              <a:t>online, take </a:t>
+            </a:r>
+            <a:r>
+              <a:rPr lang="en-US" altLang="zh-CN" sz="2000" dirty="0"/>
+              <a:t>courses via video or </a:t>
+            </a:r>
+            <a:r>
+              <a:rPr lang="en-US" altLang="zh-CN" sz="2000" dirty="0" smtClean="0"/>
+              <a:t>audio</a:t>
+            </a:r>
+            <a:endParaRPr lang="zh-CN" altLang="zh-CN" sz="2000" dirty="0"/>
+          </a:p>
+          <a:p>
+            <a:pPr>
+              <a:lnSpc>
+                <a:spcPct val="150000"/>
+              </a:lnSpc>
+              <a:spcAft>
+                <a:spcPts val="1200"/>
+              </a:spcAft>
+            </a:pPr>
+            <a:endParaRPr lang="zh-CN" altLang="en-US" sz="2000" dirty="0"/>
           </a:p>
         </p:txBody>
       </p:sp>
     </p:spTree>
     <p:extLst>
       <p:ext uri="{BB962C8B-B14F-4D97-AF65-F5344CB8AC3E}">
-        <p14:creationId xmlns:p14="http://schemas.microsoft.com/office/powerpoint/2010/main" val="3302002388"/>
+        <p14:creationId xmlns:p14="http://schemas.microsoft.com/office/powerpoint/2010/main" val="244040733"/>
       </p:ext>
     </p:extLst>
   </p:cSld>
   <p:clrMapOvr>
     <a:masterClrMapping/>
   </p:clrMapOvr>
+  <p:timing>
+    <p:tnLst>
+      <p:par>
+        <p:cTn xmlns:p14="http://schemas.microsoft.com/office/powerpoint/2010/main" id="1" dur="indefinite" restart="never" nodeType="tmRoot"/>
+      </p:par>
+    </p:tnLst>
+  </p:timing>
 </p:sld>
 </file>
 
@@ -15974,21 +17841,372 @@
           <a:p>
             <a:pPr algn="l"/>
             <a:r>
-              <a:rPr lang="en-GB" dirty="0"/>
-              <a:t>5</a:t>
-            </a:r>
-            <a:r>
               <a:rPr lang="en-GB" dirty="0" smtClean="0"/>
-              <a:t>. Development Plan</a:t>
+              <a:t>4. Product Backlog</a:t>
             </a:r>
             <a:endParaRPr lang="en-GB" dirty="0"/>
           </a:p>
         </p:txBody>
       </p:sp>
+      <p:graphicFrame>
+        <p:nvGraphicFramePr>
+          <p:cNvPr id="3" name="Table 7"/>
+          <p:cNvGraphicFramePr>
+            <a:graphicFrameLocks noGrp="1"/>
+          </p:cNvGraphicFramePr>
+          <p:nvPr>
+            <p:extLst>
+              <p:ext uri="{D42A27DB-BD31-4B8C-83A1-F6EECF244321}">
+                <p14:modId xmlns:p14="http://schemas.microsoft.com/office/powerpoint/2010/main" val="2385701164"/>
+              </p:ext>
+            </p:extLst>
+          </p:nvPr>
+        </p:nvGraphicFramePr>
+        <p:xfrm>
+          <a:off x="301104" y="1781679"/>
+          <a:ext cx="8557146" cy="4947459"/>
+        </p:xfrm>
+        <a:graphic>
+          <a:graphicData uri="http://schemas.openxmlformats.org/drawingml/2006/table">
+            <a:tbl>
+              <a:tblPr firstRow="1" bandRow="1">
+                <a:tableStyleId>{FABFCF23-3B69-468F-B69F-88F6DE6A72F2}</a:tableStyleId>
+              </a:tblPr>
+              <a:tblGrid>
+                <a:gridCol w="723331"/>
+                <a:gridCol w="1105469"/>
+                <a:gridCol w="6728346"/>
+              </a:tblGrid>
+              <a:tr h="555954">
+                <a:tc>
+                  <a:txBody>
+                    <a:bodyPr/>
+                    <a:lstStyle/>
+                    <a:p>
+                      <a:pPr algn="ctr"/>
+                      <a:r>
+                        <a:rPr lang="en-IN" sz="1600" dirty="0" smtClean="0">
+                          <a:latin typeface="Arial" panose="020B0604020202020204" pitchFamily="34" charset="0"/>
+                          <a:cs typeface="Arial" panose="020B0604020202020204" pitchFamily="34" charset="0"/>
+                        </a:rPr>
+                        <a:t>S.No.</a:t>
+                      </a:r>
+                      <a:endParaRPr lang="en-IN" sz="1600" dirty="0">
+                        <a:latin typeface="Arial" panose="020B0604020202020204" pitchFamily="34" charset="0"/>
+                        <a:cs typeface="Arial" panose="020B0604020202020204" pitchFamily="34" charset="0"/>
+                      </a:endParaRPr>
+                    </a:p>
+                  </a:txBody>
+                  <a:tcPr/>
+                </a:tc>
+                <a:tc>
+                  <a:txBody>
+                    <a:bodyPr/>
+                    <a:lstStyle/>
+                    <a:p>
+                      <a:pPr algn="ctr"/>
+                      <a:r>
+                        <a:rPr lang="en-IN" sz="1600" dirty="0" smtClean="0">
+                          <a:latin typeface="Arial" panose="020B0604020202020204" pitchFamily="34" charset="0"/>
+                          <a:cs typeface="Arial" panose="020B0604020202020204" pitchFamily="34" charset="0"/>
+                        </a:rPr>
+                        <a:t>Priority Level</a:t>
+                      </a:r>
+                      <a:endParaRPr lang="en-IN" sz="1600" dirty="0">
+                        <a:latin typeface="Arial" panose="020B0604020202020204" pitchFamily="34" charset="0"/>
+                        <a:cs typeface="Arial" panose="020B0604020202020204" pitchFamily="34" charset="0"/>
+                      </a:endParaRPr>
+                    </a:p>
+                  </a:txBody>
+                  <a:tcPr/>
+                </a:tc>
+                <a:tc>
+                  <a:txBody>
+                    <a:bodyPr/>
+                    <a:lstStyle/>
+                    <a:p>
+                      <a:pPr algn="ctr"/>
+                      <a:r>
+                        <a:rPr lang="en-IN" sz="1600" dirty="0" smtClean="0">
+                          <a:latin typeface="Arial" panose="020B0604020202020204" pitchFamily="34" charset="0"/>
+                          <a:cs typeface="Arial" panose="020B0604020202020204" pitchFamily="34" charset="0"/>
+                        </a:rPr>
+                        <a:t>Product Backlog</a:t>
+                      </a:r>
+                      <a:endParaRPr lang="en-IN" sz="1600" dirty="0">
+                        <a:latin typeface="Arial" panose="020B0604020202020204" pitchFamily="34" charset="0"/>
+                        <a:cs typeface="Arial" panose="020B0604020202020204" pitchFamily="34" charset="0"/>
+                      </a:endParaRPr>
+                    </a:p>
+                  </a:txBody>
+                  <a:tcPr/>
+                </a:tc>
+              </a:tr>
+              <a:tr h="1652128">
+                <a:tc>
+                  <a:txBody>
+                    <a:bodyPr/>
+                    <a:lstStyle/>
+                    <a:p>
+                      <a:pPr algn="ctr"/>
+                      <a:r>
+                        <a:rPr lang="en-IN" sz="1400" dirty="0" smtClean="0">
+                          <a:latin typeface="Arial" panose="020B0604020202020204" pitchFamily="34" charset="0"/>
+                          <a:cs typeface="Arial" panose="020B0604020202020204" pitchFamily="34" charset="0"/>
+                        </a:rPr>
+                        <a:t>1</a:t>
+                      </a:r>
+                      <a:endParaRPr lang="en-IN" sz="1400" dirty="0">
+                        <a:latin typeface="Arial" panose="020B0604020202020204" pitchFamily="34" charset="0"/>
+                        <a:cs typeface="Arial" panose="020B0604020202020204" pitchFamily="34" charset="0"/>
+                      </a:endParaRPr>
+                    </a:p>
+                  </a:txBody>
+                  <a:tcPr/>
+                </a:tc>
+                <a:tc>
+                  <a:txBody>
+                    <a:bodyPr/>
+                    <a:lstStyle/>
+                    <a:p>
+                      <a:pPr algn="ctr"/>
+                      <a:r>
+                        <a:rPr lang="en-IN" sz="1400" dirty="0" smtClean="0">
+                          <a:latin typeface="Arial" panose="020B0604020202020204" pitchFamily="34" charset="0"/>
+                          <a:cs typeface="Arial" panose="020B0604020202020204" pitchFamily="34" charset="0"/>
+                        </a:rPr>
+                        <a:t>1</a:t>
+                      </a:r>
+                      <a:endParaRPr lang="en-IN" sz="1400" dirty="0">
+                        <a:latin typeface="Arial" panose="020B0604020202020204" pitchFamily="34" charset="0"/>
+                        <a:cs typeface="Arial" panose="020B0604020202020204" pitchFamily="34" charset="0"/>
+                      </a:endParaRPr>
+                    </a:p>
+                  </a:txBody>
+                  <a:tcPr/>
+                </a:tc>
+                <a:tc>
+                  <a:txBody>
+                    <a:bodyPr/>
+                    <a:lstStyle/>
+                    <a:p>
+                      <a:pPr algn="just"/>
+                      <a:r>
+                        <a:rPr lang="en-IN" sz="1400" dirty="0" smtClean="0">
+                          <a:latin typeface="Arial" panose="020B0604020202020204" pitchFamily="34" charset="0"/>
+                          <a:cs typeface="Arial" panose="020B0604020202020204" pitchFamily="34" charset="0"/>
+                        </a:rPr>
+                        <a:t>Getskills website should adapt the size of the browser automatically with respect to the device in which the website is seen. For e.g. if the website is seen then the mobile phone, then the browser should change its size according to mobile phone screen, and display its contents properly. If the website is viewed from a Tablet / Laptop then the browser should change its size automatically in such a way that it displays content properly in the tablet/Laptop respectively.</a:t>
+                      </a:r>
+                      <a:endParaRPr lang="en-IN" sz="1400" dirty="0">
+                        <a:latin typeface="Arial" panose="020B0604020202020204" pitchFamily="34" charset="0"/>
+                        <a:cs typeface="Arial" panose="020B0604020202020204" pitchFamily="34" charset="0"/>
+                      </a:endParaRPr>
+                    </a:p>
+                  </a:txBody>
+                  <a:tcPr/>
+                </a:tc>
+              </a:tr>
+              <a:tr h="756059">
+                <a:tc>
+                  <a:txBody>
+                    <a:bodyPr/>
+                    <a:lstStyle/>
+                    <a:p>
+                      <a:pPr algn="ctr"/>
+                      <a:r>
+                        <a:rPr lang="en-IN" sz="1400" dirty="0" smtClean="0">
+                          <a:latin typeface="Arial" panose="020B0604020202020204" pitchFamily="34" charset="0"/>
+                          <a:cs typeface="Arial" panose="020B0604020202020204" pitchFamily="34" charset="0"/>
+                        </a:rPr>
+                        <a:t>2</a:t>
+                      </a:r>
+                      <a:endParaRPr lang="en-IN" sz="1400" dirty="0">
+                        <a:latin typeface="Arial" panose="020B0604020202020204" pitchFamily="34" charset="0"/>
+                        <a:cs typeface="Arial" panose="020B0604020202020204" pitchFamily="34" charset="0"/>
+                      </a:endParaRPr>
+                    </a:p>
+                  </a:txBody>
+                  <a:tcPr/>
+                </a:tc>
+                <a:tc>
+                  <a:txBody>
+                    <a:bodyPr/>
+                    <a:lstStyle/>
+                    <a:p>
+                      <a:pPr algn="ctr"/>
+                      <a:r>
+                        <a:rPr lang="en-IN" sz="1400" dirty="0" smtClean="0">
+                          <a:latin typeface="Arial" panose="020B0604020202020204" pitchFamily="34" charset="0"/>
+                          <a:cs typeface="Arial" panose="020B0604020202020204" pitchFamily="34" charset="0"/>
+                        </a:rPr>
+                        <a:t>2</a:t>
+                      </a:r>
+                      <a:endParaRPr lang="en-IN" sz="1400" dirty="0">
+                        <a:latin typeface="Arial" panose="020B0604020202020204" pitchFamily="34" charset="0"/>
+                        <a:cs typeface="Arial" panose="020B0604020202020204" pitchFamily="34" charset="0"/>
+                      </a:endParaRPr>
+                    </a:p>
+                  </a:txBody>
+                  <a:tcPr/>
+                </a:tc>
+                <a:tc>
+                  <a:txBody>
+                    <a:bodyPr/>
+                    <a:lstStyle/>
+                    <a:p>
+                      <a:r>
+                        <a:rPr lang="en-IN" sz="1400" dirty="0" smtClean="0">
+                          <a:latin typeface="Arial" panose="020B0604020202020204" pitchFamily="34" charset="0"/>
+                          <a:cs typeface="Arial" panose="020B0604020202020204" pitchFamily="34" charset="0"/>
+                        </a:rPr>
+                        <a:t>As a visitor to "GetSkills" website, the visitor can select a test and make payments to the selected tests, without registering in the Getskills website.</a:t>
+                      </a:r>
+                      <a:endParaRPr lang="en-IN" sz="1400" dirty="0">
+                        <a:latin typeface="Arial" panose="020B0604020202020204" pitchFamily="34" charset="0"/>
+                        <a:cs typeface="Arial" panose="020B0604020202020204" pitchFamily="34" charset="0"/>
+                      </a:endParaRPr>
+                    </a:p>
+                  </a:txBody>
+                  <a:tcPr/>
+                </a:tc>
+              </a:tr>
+              <a:tr h="1204093">
+                <a:tc>
+                  <a:txBody>
+                    <a:bodyPr/>
+                    <a:lstStyle/>
+                    <a:p>
+                      <a:pPr algn="ctr"/>
+                      <a:r>
+                        <a:rPr lang="en-IN" sz="1400" dirty="0" smtClean="0">
+                          <a:latin typeface="Arial" panose="020B0604020202020204" pitchFamily="34" charset="0"/>
+                          <a:cs typeface="Arial" panose="020B0604020202020204" pitchFamily="34" charset="0"/>
+                        </a:rPr>
+                        <a:t>3</a:t>
+                      </a:r>
+                      <a:endParaRPr lang="en-IN" sz="1400" dirty="0">
+                        <a:latin typeface="Arial" panose="020B0604020202020204" pitchFamily="34" charset="0"/>
+                        <a:cs typeface="Arial" panose="020B0604020202020204" pitchFamily="34" charset="0"/>
+                      </a:endParaRPr>
+                    </a:p>
+                  </a:txBody>
+                  <a:tcPr/>
+                </a:tc>
+                <a:tc>
+                  <a:txBody>
+                    <a:bodyPr/>
+                    <a:lstStyle/>
+                    <a:p>
+                      <a:pPr algn="ctr"/>
+                      <a:r>
+                        <a:rPr lang="en-IN" sz="1400" dirty="0" smtClean="0">
+                          <a:latin typeface="Arial" panose="020B0604020202020204" pitchFamily="34" charset="0"/>
+                          <a:cs typeface="Arial" panose="020B0604020202020204" pitchFamily="34" charset="0"/>
+                        </a:rPr>
+                        <a:t>2</a:t>
+                      </a:r>
+                      <a:endParaRPr lang="en-IN" sz="1400" dirty="0">
+                        <a:latin typeface="Arial" panose="020B0604020202020204" pitchFamily="34" charset="0"/>
+                        <a:cs typeface="Arial" panose="020B0604020202020204" pitchFamily="34" charset="0"/>
+                      </a:endParaRPr>
+                    </a:p>
+                  </a:txBody>
+                  <a:tcPr/>
+                </a:tc>
+                <a:tc>
+                  <a:txBody>
+                    <a:bodyPr/>
+                    <a:lstStyle/>
+                    <a:p>
+                      <a:r>
+                        <a:rPr lang="en-IN" sz="1400" dirty="0" smtClean="0">
+                          <a:latin typeface="Arial" panose="020B0604020202020204" pitchFamily="34" charset="0"/>
+                          <a:cs typeface="Arial" panose="020B0604020202020204" pitchFamily="34" charset="0"/>
+                        </a:rPr>
+                        <a:t>Visitors of Getskills website is categorised based on the survey. Based on the category, Successful stories of alumni's associated with Getskills is published. On viewing the Successful stories of Alumni, the visitor is prompted to take a similar course / test that is available in Getskills.</a:t>
+                      </a:r>
+                      <a:endParaRPr lang="en-IN" sz="1400" dirty="0">
+                        <a:latin typeface="Arial" panose="020B0604020202020204" pitchFamily="34" charset="0"/>
+                        <a:cs typeface="Arial" panose="020B0604020202020204" pitchFamily="34" charset="0"/>
+                      </a:endParaRPr>
+                    </a:p>
+                  </a:txBody>
+                  <a:tcPr/>
+                </a:tc>
+              </a:tr>
+              <a:tr h="756059">
+                <a:tc>
+                  <a:txBody>
+                    <a:bodyPr/>
+                    <a:lstStyle/>
+                    <a:p>
+                      <a:pPr algn="ctr"/>
+                      <a:r>
+                        <a:rPr lang="en-IN" sz="1400" dirty="0" smtClean="0">
+                          <a:latin typeface="Arial" panose="020B0604020202020204" pitchFamily="34" charset="0"/>
+                          <a:cs typeface="Arial" panose="020B0604020202020204" pitchFamily="34" charset="0"/>
+                        </a:rPr>
+                        <a:t>4</a:t>
+                      </a:r>
+                      <a:endParaRPr lang="en-IN" sz="1400" dirty="0">
+                        <a:latin typeface="Arial" panose="020B0604020202020204" pitchFamily="34" charset="0"/>
+                        <a:cs typeface="Arial" panose="020B0604020202020204" pitchFamily="34" charset="0"/>
+                      </a:endParaRPr>
+                    </a:p>
+                  </a:txBody>
+                  <a:tcPr/>
+                </a:tc>
+                <a:tc>
+                  <a:txBody>
+                    <a:bodyPr/>
+                    <a:lstStyle/>
+                    <a:p>
+                      <a:pPr algn="ctr"/>
+                      <a:r>
+                        <a:rPr lang="en-IN" sz="1400" dirty="0" smtClean="0">
+                          <a:latin typeface="Arial" panose="020B0604020202020204" pitchFamily="34" charset="0"/>
+                          <a:cs typeface="Arial" panose="020B0604020202020204" pitchFamily="34" charset="0"/>
+                        </a:rPr>
+                        <a:t>3</a:t>
+                      </a:r>
+                      <a:endParaRPr lang="en-IN" sz="1400" dirty="0">
+                        <a:latin typeface="Arial" panose="020B0604020202020204" pitchFamily="34" charset="0"/>
+                        <a:cs typeface="Arial" panose="020B0604020202020204" pitchFamily="34" charset="0"/>
+                      </a:endParaRPr>
+                    </a:p>
+                  </a:txBody>
+                  <a:tcPr/>
+                </a:tc>
+                <a:tc>
+                  <a:txBody>
+                    <a:bodyPr/>
+                    <a:lstStyle/>
+                    <a:p>
+                      <a:r>
+                        <a:rPr lang="en-IN" sz="1400" dirty="0" smtClean="0">
+                          <a:latin typeface="Arial" panose="020B0604020202020204" pitchFamily="34" charset="0"/>
+                          <a:cs typeface="Arial" panose="020B0604020202020204" pitchFamily="34" charset="0"/>
+                        </a:rPr>
+                        <a:t>An exclusive webpage is allotted to promote Getskills Automation Tool, with Successful stories of automation tool implemented companies.</a:t>
+                      </a:r>
+                      <a:endParaRPr lang="en-IN" sz="1400" dirty="0">
+                        <a:latin typeface="Arial" panose="020B0604020202020204" pitchFamily="34" charset="0"/>
+                        <a:cs typeface="Arial" panose="020B0604020202020204" pitchFamily="34" charset="0"/>
+                      </a:endParaRPr>
+                    </a:p>
+                  </a:txBody>
+                  <a:tcPr/>
+                </a:tc>
+              </a:tr>
+            </a:tbl>
+          </a:graphicData>
+        </a:graphic>
+      </p:graphicFrame>
     </p:spTree>
     <p:extLst>
       <p:ext uri="{BB962C8B-B14F-4D97-AF65-F5344CB8AC3E}">
-        <p14:creationId xmlns:p14="http://schemas.microsoft.com/office/powerpoint/2010/main" val="3846193174"/>
+        <p14:creationId xmlns:p14="http://schemas.microsoft.com/office/powerpoint/2010/main" val="3302002388"/>
       </p:ext>
     </p:extLst>
   </p:cSld>
@@ -16032,174 +18250,21 @@
           <a:p>
             <a:pPr algn="l"/>
             <a:r>
+              <a:rPr lang="en-GB" dirty="0"/>
+              <a:t>5</a:t>
+            </a:r>
+            <a:r>
               <a:rPr lang="en-GB" dirty="0" smtClean="0"/>
-              <a:t>6. Scrum PM Tool (1)</a:t>
+              <a:t>. Development Plan</a:t>
             </a:r>
             <a:endParaRPr lang="en-GB" dirty="0"/>
           </a:p>
         </p:txBody>
       </p:sp>
-      <p:sp>
-        <p:nvSpPr>
-          <p:cNvPr id="3" name="TextBox 2"/>
-          <p:cNvSpPr txBox="1"/>
-          <p:nvPr/>
-        </p:nvSpPr>
-        <p:spPr>
-          <a:xfrm>
-            <a:off x="284163" y="1717960"/>
-            <a:ext cx="8574087" cy="1569660"/>
-          </a:xfrm>
-          <a:prstGeom prst="rect">
-            <a:avLst/>
-          </a:prstGeom>
-          <a:noFill/>
-        </p:spPr>
-        <p:txBody>
-          <a:bodyPr wrap="square" rtlCol="0">
-            <a:spAutoFit/>
-          </a:bodyPr>
-          <a:lstStyle/>
-          <a:p>
-            <a:r>
-              <a:rPr lang="en-NZ" sz="2400" b="1" dirty="0" smtClean="0"/>
-              <a:t>SeeNowDo</a:t>
-            </a:r>
-          </a:p>
-          <a:p>
-            <a:pPr marL="742950" lvl="1" indent="-285750">
-              <a:buFont typeface="Wingdings" pitchFamily="2" charset="2"/>
-              <a:buChar char="v"/>
-            </a:pPr>
-            <a:r>
-              <a:rPr lang="en-NZ" dirty="0"/>
-              <a:t>URL</a:t>
-            </a:r>
-            <a:r>
-              <a:rPr lang="en-NZ" dirty="0" smtClean="0"/>
-              <a:t>:  	       </a:t>
-            </a:r>
-            <a:r>
-              <a:rPr lang="en-NZ" dirty="0" smtClean="0">
-                <a:hlinkClick r:id="rId2"/>
-              </a:rPr>
-              <a:t>https</a:t>
-            </a:r>
-            <a:r>
-              <a:rPr lang="en-NZ" dirty="0">
-                <a:hlinkClick r:id="rId2"/>
-              </a:rPr>
-              <a:t>://</a:t>
-            </a:r>
-            <a:r>
-              <a:rPr lang="en-NZ" dirty="0" smtClean="0">
-                <a:hlinkClick r:id="rId2"/>
-              </a:rPr>
-              <a:t>www.seenowdo.com/pages/login/index.html</a:t>
-            </a:r>
-            <a:endParaRPr lang="en-NZ" dirty="0" smtClean="0"/>
-          </a:p>
-          <a:p>
-            <a:pPr marL="742950" lvl="1" indent="-285750">
-              <a:buFont typeface="Wingdings" pitchFamily="2" charset="2"/>
-              <a:buChar char="v"/>
-            </a:pPr>
-            <a:r>
-              <a:rPr lang="en-NZ" dirty="0" smtClean="0"/>
-              <a:t>Project Name:  </a:t>
-            </a:r>
-            <a:r>
-              <a:rPr lang="en-NZ" b="1" dirty="0" smtClean="0"/>
-              <a:t>OEE(Android)</a:t>
-            </a:r>
-          </a:p>
-          <a:p>
-            <a:pPr marL="742950" lvl="1" indent="-285750">
-              <a:buFont typeface="Wingdings" pitchFamily="2" charset="2"/>
-              <a:buChar char="v"/>
-            </a:pPr>
-            <a:endParaRPr lang="en-NZ" b="1" dirty="0" smtClean="0"/>
-          </a:p>
-          <a:p>
-            <a:pPr marL="742950" lvl="1" indent="-285750">
-              <a:buFont typeface="Wingdings" pitchFamily="2" charset="2"/>
-              <a:buChar char="v"/>
-            </a:pPr>
-            <a:r>
-              <a:rPr lang="en-NZ" dirty="0" smtClean="0"/>
-              <a:t>Image of project list &amp; iteration list</a:t>
-            </a:r>
-          </a:p>
-        </p:txBody>
-      </p:sp>
-      <p:pic>
-        <p:nvPicPr>
-          <p:cNvPr id="1027" name="Picture 3"/>
-          <p:cNvPicPr>
-            <a:picLocks noChangeAspect="1" noChangeArrowheads="1"/>
-          </p:cNvPicPr>
-          <p:nvPr/>
-        </p:nvPicPr>
-        <p:blipFill>
-          <a:blip r:embed="rId3" cstate="email">
-            <a:extLst>
-              <a:ext uri="{28A0092B-C50C-407E-A947-70E740481C1C}">
-                <a14:useLocalDpi xmlns:a14="http://schemas.microsoft.com/office/drawing/2010/main" val="0"/>
-              </a:ext>
-            </a:extLst>
-          </a:blip>
-          <a:srcRect/>
-          <a:stretch>
-            <a:fillRect/>
-          </a:stretch>
-        </p:blipFill>
-        <p:spPr bwMode="auto">
-          <a:xfrm>
-            <a:off x="1128280" y="3258737"/>
-            <a:ext cx="6311611" cy="3363728"/>
-          </a:xfrm>
-          <a:prstGeom prst="rect">
-            <a:avLst/>
-          </a:prstGeom>
-          <a:noFill/>
-          <a:ln>
-            <a:noFill/>
-          </a:ln>
-          <a:effectLst/>
-          <a:extLst>
-            <a:ext uri="{909E8E84-426E-40DD-AFC4-6F175D3DCCD1}">
-              <a14:hiddenFill xmlns:a14="http://schemas.microsoft.com/office/drawing/2010/main">
-                <a:solidFill>
-                  <a:schemeClr val="accent1"/>
-                </a:solidFill>
-              </a14:hiddenFill>
-            </a:ext>
-            <a:ext uri="{91240B29-F687-4F45-9708-019B960494DF}">
-              <a14:hiddenLine xmlns:a14="http://schemas.microsoft.com/office/drawing/2010/main" w="9525">
-                <a:solidFill>
-                  <a:schemeClr val="tx1"/>
-                </a:solidFill>
-                <a:miter lim="800000"/>
-                <a:headEnd/>
-                <a:tailEnd/>
-              </a14:hiddenLine>
-            </a:ext>
-            <a:ext uri="{AF507438-7753-43E0-B8FC-AC1667EBCBE1}">
-              <a14:hiddenEffects xmlns:a14="http://schemas.microsoft.com/office/drawing/2010/main">
-                <a:effectLst>
-                  <a:outerShdw dist="35921" dir="2700000" algn="ctr" rotWithShape="0">
-                    <a:schemeClr val="bg2"/>
-                  </a:outerShdw>
-                </a:effectLst>
-              </a14:hiddenEffects>
-            </a:ext>
-          </a:extLst>
-        </p:spPr>
-      </p:pic>
     </p:spTree>
     <p:extLst>
       <p:ext uri="{BB962C8B-B14F-4D97-AF65-F5344CB8AC3E}">
-        <p14:creationId xmlns:p14="http://schemas.microsoft.com/office/powerpoint/2010/main" val="2406204136"/>
+        <p14:creationId xmlns:p14="http://schemas.microsoft.com/office/powerpoint/2010/main" val="3846193174"/>
       </p:ext>
     </p:extLst>
   </p:cSld>
@@ -16244,7 +18309,7 @@
             <a:pPr algn="l"/>
             <a:r>
               <a:rPr lang="en-GB" dirty="0" smtClean="0"/>
-              <a:t>6. Scrum PM Tool (2)</a:t>
+              <a:t>6. Scrum PM Tool (1)</a:t>
             </a:r>
             <a:endParaRPr lang="en-GB" dirty="0"/>
           </a:p>
@@ -16259,7 +18324,7 @@
         <p:spPr>
           <a:xfrm>
             <a:off x="284163" y="1717960"/>
-            <a:ext cx="8574087" cy="1015663"/>
+            <a:ext cx="8574087" cy="1569660"/>
           </a:xfrm>
           <a:prstGeom prst="rect">
             <a:avLst/>
@@ -16282,7 +18347,33 @@
               <a:buFont typeface="Wingdings" pitchFamily="2" charset="2"/>
               <a:buChar char="v"/>
             </a:pPr>
-            <a:endParaRPr lang="en-NZ" b="1" dirty="0" smtClean="0"/>
+            <a:r>
+              <a:rPr lang="en-NZ" dirty="0"/>
+              <a:t>URL</a:t>
+            </a:r>
+            <a:r>
+              <a:rPr lang="en-NZ" dirty="0" smtClean="0"/>
+              <a:t>:  	       </a:t>
+            </a:r>
+            <a:r>
+              <a:rPr lang="en-NZ" dirty="0" smtClean="0">
+                <a:hlinkClick r:id="rId2"/>
+              </a:rPr>
+              <a:t>https</a:t>
+            </a:r>
+            <a:r>
+              <a:rPr lang="en-NZ" dirty="0">
+                <a:hlinkClick r:id="rId2"/>
+              </a:rPr>
+              <a:t>://</a:t>
+            </a:r>
+            <a:r>
+              <a:rPr lang="en-NZ" dirty="0" smtClean="0">
+                <a:hlinkClick r:id="rId2"/>
+              </a:rPr>
+              <a:t>www.seenowdo.com/pages/login/index.html</a:t>
+            </a:r>
+            <a:endParaRPr lang="en-NZ" dirty="0" smtClean="0"/>
           </a:p>
           <a:p>
             <a:pPr marL="742950" lvl="1" indent="-285750">
@@ -16291,29 +18382,42 @@
             </a:pPr>
             <a:r>
               <a:rPr lang="en-NZ" dirty="0" smtClean="0"/>
-              <a:t>Image of User </a:t>
-            </a:r>
-            <a:r>
-              <a:rPr lang="en-NZ" dirty="0"/>
-              <a:t>S</a:t>
-            </a:r>
+              <a:t>Project Name:  </a:t>
+            </a:r>
+            <a:r>
+              <a:rPr lang="en-NZ" b="1" dirty="0" smtClean="0"/>
+              <a:t>OEE(Android)</a:t>
+            </a:r>
+          </a:p>
+          <a:p>
+            <a:pPr marL="742950" lvl="1" indent="-285750">
+              <a:buFont typeface="Wingdings" pitchFamily="2" charset="2"/>
+              <a:buChar char="v"/>
+            </a:pPr>
+            <a:endParaRPr lang="en-NZ" b="1" dirty="0" smtClean="0"/>
+          </a:p>
+          <a:p>
+            <a:pPr marL="742950" lvl="1" indent="-285750">
+              <a:buFont typeface="Wingdings" pitchFamily="2" charset="2"/>
+              <a:buChar char="v"/>
+            </a:pPr>
             <a:r>
               <a:rPr lang="en-NZ" dirty="0" smtClean="0"/>
-              <a:t>tories and Tasks List of one sprint</a:t>
+              <a:t>Image of project list &amp; iteration list</a:t>
             </a:r>
           </a:p>
         </p:txBody>
       </p:sp>
       <p:pic>
         <p:nvPicPr>
-          <p:cNvPr id="2050" name="Picture 2"/>
+          <p:cNvPr id="1027" name="Picture 3"/>
           <p:cNvPicPr>
             <a:picLocks noChangeAspect="1" noChangeArrowheads="1"/>
           </p:cNvPicPr>
           <p:nvPr/>
         </p:nvPicPr>
         <p:blipFill>
-          <a:blip r:embed="rId2" cstate="email">
+          <a:blip r:embed="rId3" cstate="email">
             <a:extLst>
               <a:ext uri="{28A0092B-C50C-407E-A947-70E740481C1C}">
                 <a14:useLocalDpi xmlns:a14="http://schemas.microsoft.com/office/drawing/2010/main" val="0"/>
@@ -16327,8 +18431,8 @@
         </p:blipFill>
         <p:spPr bwMode="auto">
           <a:xfrm>
-            <a:off x="1122219" y="2733623"/>
-            <a:ext cx="7265966" cy="3872345"/>
+            <a:off x="1128280" y="3258737"/>
+            <a:ext cx="6311611" cy="3363728"/>
           </a:xfrm>
           <a:prstGeom prst="rect">
             <a:avLst/>
@@ -16339,14 +18443,14 @@
           </a:ln>
           <a:effectLst/>
           <a:extLst>
-            <a:ext uri="{909E8E84-426E-40DD-AFC4-6F175D3DCCD1}">
+            <a:ext uri="{909E8E84-426E-40dd-AFC4-6F175D3DCCD1}">
               <a14:hiddenFill xmlns:a14="http://schemas.microsoft.com/office/drawing/2010/main">
                 <a:solidFill>
                   <a:schemeClr val="accent1"/>
                 </a:solidFill>
               </a14:hiddenFill>
             </a:ext>
-            <a:ext uri="{91240B29-F687-4F45-9708-019B960494DF}">
+            <a:ext uri="{91240B29-F687-4f45-9708-019B960494DF}">
               <a14:hiddenLine xmlns:a14="http://schemas.microsoft.com/office/drawing/2010/main" w="9525">
                 <a:solidFill>
                   <a:schemeClr val="tx1"/>
@@ -16356,7 +18460,7 @@
                 <a:tailEnd/>
               </a14:hiddenLine>
             </a:ext>
-            <a:ext uri="{AF507438-7753-43E0-B8FC-AC1667EBCBE1}">
+            <a:ext uri="{AF507438-7753-43e0-B8FC-AC1667EBCBE1}">
               <a14:hiddenEffects xmlns:a14="http://schemas.microsoft.com/office/drawing/2010/main">
                 <a:effectLst>
                   <a:outerShdw dist="35921" dir="2700000" algn="ctr" rotWithShape="0">
@@ -16371,7 +18475,7 @@
     </p:spTree>
     <p:extLst>
       <p:ext uri="{BB962C8B-B14F-4D97-AF65-F5344CB8AC3E}">
-        <p14:creationId xmlns:p14="http://schemas.microsoft.com/office/powerpoint/2010/main" val="1755179611"/>
+        <p14:creationId xmlns:p14="http://schemas.microsoft.com/office/powerpoint/2010/main" val="2406204136"/>
       </p:ext>
     </p:extLst>
   </p:cSld>
@@ -16638,4 +18742,324 @@
   </a:objectDefaults>
   <a:extraClrSchemeLst/>
 </a:theme>
+</file>
+
+<file path=ppt/theme/theme2.xml><?xml version="1.0" encoding="utf-8"?>
+<a:theme xmlns:a="http://schemas.openxmlformats.org/drawingml/2006/main" name="Office 主题">
+  <a:themeElements>
+    <a:clrScheme name="办公室">
+      <a:dk1>
+        <a:sysClr val="windowText" lastClr="000000"/>
+      </a:dk1>
+      <a:lt1>
+        <a:sysClr val="window" lastClr="FFFFFF"/>
+      </a:lt1>
+      <a:dk2>
+        <a:srgbClr val="1F497D"/>
+      </a:dk2>
+      <a:lt2>
+        <a:srgbClr val="EEECE1"/>
+      </a:lt2>
+      <a:accent1>
+        <a:srgbClr val="4F81BD"/>
+      </a:accent1>
+      <a:accent2>
+        <a:srgbClr val="C0504D"/>
+      </a:accent2>
+      <a:accent3>
+        <a:srgbClr val="9BBB59"/>
+      </a:accent3>
+      <a:accent4>
+        <a:srgbClr val="8064A2"/>
+      </a:accent4>
+      <a:accent5>
+        <a:srgbClr val="4BACC6"/>
+      </a:accent5>
+      <a:accent6>
+        <a:srgbClr val="F79646"/>
+      </a:accent6>
+      <a:hlink>
+        <a:srgbClr val="0000FF"/>
+      </a:hlink>
+      <a:folHlink>
+        <a:srgbClr val="800080"/>
+      </a:folHlink>
+    </a:clrScheme>
+    <a:fontScheme name="办公室">
+      <a:majorFont>
+        <a:latin typeface="Calibri"/>
+        <a:ea typeface=""/>
+        <a:cs typeface=""/>
+        <a:font script="Jpan" typeface="ＭＳ Ｐゴシック"/>
+        <a:font script="Hang" typeface="맑은 고딕"/>
+        <a:font script="Hans" typeface="宋体"/>
+        <a:font script="Hant" typeface="新細明體"/>
+        <a:font script="Arab" typeface="Times New Roman"/>
+        <a:font script="Hebr" typeface="Times New Roman"/>
+        <a:font script="Thai" typeface="Angsana New"/>
+        <a:font script="Ethi" typeface="Nyala"/>
+        <a:font script="Beng" typeface="Vrinda"/>
+        <a:font script="Gujr" typeface="Shruti"/>
+        <a:font script="Khmr" typeface="MoolBoran"/>
+        <a:font script="Knda" typeface="Tunga"/>
+        <a:font script="Guru" typeface="Raavi"/>
+        <a:font script="Cans" typeface="Euphemia"/>
+        <a:font script="Cher" typeface="Plantagenet Cherokee"/>
+        <a:font script="Yiii" typeface="Microsoft Yi Baiti"/>
+        <a:font script="Tibt" typeface="Microsoft Himalaya"/>
+        <a:font script="Thaa" typeface="MV Boli"/>
+        <a:font script="Deva" typeface="Mangal"/>
+        <a:font script="Telu" typeface="Gautami"/>
+        <a:font script="Taml" typeface="Latha"/>
+        <a:font script="Syrc" typeface="Estrangelo Edessa"/>
+        <a:font script="Orya" typeface="Kalinga"/>
+        <a:font script="Mlym" typeface="Kartika"/>
+        <a:font script="Laoo" typeface="DokChampa"/>
+        <a:font script="Sinh" typeface="Iskoola Pota"/>
+        <a:font script="Mong" typeface="Mongolian Baiti"/>
+        <a:font script="Viet" typeface="Times New Roman"/>
+        <a:font script="Uigh" typeface="Microsoft Uighur"/>
+        <a:font script="Geor" typeface="Sylfaen"/>
+      </a:majorFont>
+      <a:minorFont>
+        <a:latin typeface="Calibri"/>
+        <a:ea typeface=""/>
+        <a:cs typeface=""/>
+        <a:font script="Jpan" typeface="ＭＳ Ｐゴシック"/>
+        <a:font script="Hang" typeface="맑은 고딕"/>
+        <a:font script="Hans" typeface="宋体"/>
+        <a:font script="Hant" typeface="新細明體"/>
+        <a:font script="Arab" typeface="Arial"/>
+        <a:font script="Hebr" typeface="Arial"/>
+        <a:font script="Thai" typeface="Cordia New"/>
+        <a:font script="Ethi" typeface="Nyala"/>
+        <a:font script="Beng" typeface="Vrinda"/>
+        <a:font script="Gujr" typeface="Shruti"/>
+        <a:font script="Khmr" typeface="DaunPenh"/>
+        <a:font script="Knda" typeface="Tunga"/>
+        <a:font script="Guru" typeface="Raavi"/>
+        <a:font script="Cans" typeface="Euphemia"/>
+        <a:font script="Cher" typeface="Plantagenet Cherokee"/>
+        <a:font script="Yiii" typeface="Microsoft Yi Baiti"/>
+        <a:font script="Tibt" typeface="Microsoft Himalaya"/>
+        <a:font script="Thaa" typeface="MV Boli"/>
+        <a:font script="Deva" typeface="Mangal"/>
+        <a:font script="Telu" typeface="Gautami"/>
+        <a:font script="Taml" typeface="Latha"/>
+        <a:font script="Syrc" typeface="Estrangelo Edessa"/>
+        <a:font script="Orya" typeface="Kalinga"/>
+        <a:font script="Mlym" typeface="Kartika"/>
+        <a:font script="Laoo" typeface="DokChampa"/>
+        <a:font script="Sinh" typeface="Iskoola Pota"/>
+        <a:font script="Mong" typeface="Mongolian Baiti"/>
+        <a:font script="Viet" typeface="Arial"/>
+        <a:font script="Uigh" typeface="Microsoft Uighur"/>
+        <a:font script="Geor" typeface="Sylfaen"/>
+      </a:minorFont>
+    </a:fontScheme>
+    <a:fmtScheme name="办公室">
+      <a:fillStyleLst>
+        <a:solidFill>
+          <a:schemeClr val="phClr"/>
+        </a:solidFill>
+        <a:gradFill rotWithShape="1">
+          <a:gsLst>
+            <a:gs pos="0">
+              <a:schemeClr val="phClr">
+                <a:tint val="50000"/>
+                <a:satMod val="300000"/>
+              </a:schemeClr>
+            </a:gs>
+            <a:gs pos="35000">
+              <a:schemeClr val="phClr">
+                <a:tint val="37000"/>
+                <a:satMod val="300000"/>
+              </a:schemeClr>
+            </a:gs>
+            <a:gs pos="100000">
+              <a:schemeClr val="phClr">
+                <a:tint val="15000"/>
+                <a:satMod val="350000"/>
+              </a:schemeClr>
+            </a:gs>
+          </a:gsLst>
+          <a:lin ang="16200000" scaled="1"/>
+        </a:gradFill>
+        <a:gradFill rotWithShape="1">
+          <a:gsLst>
+            <a:gs pos="0">
+              <a:schemeClr val="phClr">
+                <a:tint val="100000"/>
+                <a:shade val="100000"/>
+                <a:satMod val="130000"/>
+              </a:schemeClr>
+            </a:gs>
+            <a:gs pos="100000">
+              <a:schemeClr val="phClr">
+                <a:tint val="50000"/>
+                <a:shade val="100000"/>
+                <a:satMod val="350000"/>
+              </a:schemeClr>
+            </a:gs>
+          </a:gsLst>
+          <a:lin ang="16200000" scaled="0"/>
+        </a:gradFill>
+      </a:fillStyleLst>
+      <a:lnStyleLst>
+        <a:ln w="9525" cap="flat" cmpd="sng" algn="ctr">
+          <a:solidFill>
+            <a:schemeClr val="phClr">
+              <a:shade val="95000"/>
+              <a:satMod val="105000"/>
+            </a:schemeClr>
+          </a:solidFill>
+          <a:prstDash val="solid"/>
+        </a:ln>
+        <a:ln w="25400" cap="flat" cmpd="sng" algn="ctr">
+          <a:solidFill>
+            <a:schemeClr val="phClr"/>
+          </a:solidFill>
+          <a:prstDash val="solid"/>
+        </a:ln>
+        <a:ln w="38100" cap="flat" cmpd="sng" algn="ctr">
+          <a:solidFill>
+            <a:schemeClr val="phClr"/>
+          </a:solidFill>
+          <a:prstDash val="solid"/>
+        </a:ln>
+      </a:lnStyleLst>
+      <a:effectStyleLst>
+        <a:effectStyle>
+          <a:effectLst>
+            <a:outerShdw blurRad="40000" dist="20000" dir="5400000" rotWithShape="0">
+              <a:srgbClr val="000000">
+                <a:alpha val="38000"/>
+              </a:srgbClr>
+            </a:outerShdw>
+          </a:effectLst>
+        </a:effectStyle>
+        <a:effectStyle>
+          <a:effectLst>
+            <a:outerShdw blurRad="40000" dist="23000" dir="5400000" rotWithShape="0">
+              <a:srgbClr val="000000">
+                <a:alpha val="35000"/>
+              </a:srgbClr>
+            </a:outerShdw>
+          </a:effectLst>
+        </a:effectStyle>
+        <a:effectStyle>
+          <a:effectLst>
+            <a:outerShdw blurRad="40000" dist="23000" dir="5400000" rotWithShape="0">
+              <a:srgbClr val="000000">
+                <a:alpha val="35000"/>
+              </a:srgbClr>
+            </a:outerShdw>
+          </a:effectLst>
+          <a:scene3d>
+            <a:camera prst="orthographicFront">
+              <a:rot lat="0" lon="0" rev="0"/>
+            </a:camera>
+            <a:lightRig rig="threePt" dir="t">
+              <a:rot lat="0" lon="0" rev="1200000"/>
+            </a:lightRig>
+          </a:scene3d>
+          <a:sp3d>
+            <a:bevelT w="63500" h="25400"/>
+          </a:sp3d>
+        </a:effectStyle>
+      </a:effectStyleLst>
+      <a:bgFillStyleLst>
+        <a:solidFill>
+          <a:schemeClr val="phClr"/>
+        </a:solidFill>
+        <a:gradFill rotWithShape="1">
+          <a:gsLst>
+            <a:gs pos="0">
+              <a:schemeClr val="phClr">
+                <a:tint val="40000"/>
+                <a:satMod val="350000"/>
+              </a:schemeClr>
+            </a:gs>
+            <a:gs pos="40000">
+              <a:schemeClr val="phClr">
+                <a:tint val="45000"/>
+                <a:shade val="99000"/>
+                <a:satMod val="350000"/>
+              </a:schemeClr>
+            </a:gs>
+            <a:gs pos="100000">
+              <a:schemeClr val="phClr">
+                <a:shade val="20000"/>
+                <a:satMod val="255000"/>
+              </a:schemeClr>
+            </a:gs>
+          </a:gsLst>
+          <a:path path="circle">
+            <a:fillToRect l="50000" t="-80000" r="50000" b="180000"/>
+          </a:path>
+        </a:gradFill>
+        <a:gradFill rotWithShape="1">
+          <a:gsLst>
+            <a:gs pos="0">
+              <a:schemeClr val="phClr">
+                <a:tint val="80000"/>
+                <a:satMod val="300000"/>
+              </a:schemeClr>
+            </a:gs>
+            <a:gs pos="100000">
+              <a:schemeClr val="phClr">
+                <a:shade val="30000"/>
+                <a:satMod val="200000"/>
+              </a:schemeClr>
+            </a:gs>
+          </a:gsLst>
+          <a:path path="circle">
+            <a:fillToRect l="50000" t="50000" r="50000" b="50000"/>
+          </a:path>
+        </a:gradFill>
+      </a:bgFillStyleLst>
+    </a:fmtScheme>
+  </a:themeElements>
+  <a:objectDefaults>
+    <a:spDef>
+      <a:spPr/>
+      <a:bodyPr/>
+      <a:lstStyle/>
+      <a:style>
+        <a:lnRef idx="1">
+          <a:schemeClr val="accent1"/>
+        </a:lnRef>
+        <a:fillRef idx="3">
+          <a:schemeClr val="accent1"/>
+        </a:fillRef>
+        <a:effectRef idx="2">
+          <a:schemeClr val="accent1"/>
+        </a:effectRef>
+        <a:fontRef idx="minor">
+          <a:schemeClr val="lt1"/>
+        </a:fontRef>
+      </a:style>
+    </a:spDef>
+    <a:lnDef>
+      <a:spPr/>
+      <a:bodyPr/>
+      <a:lstStyle/>
+      <a:style>
+        <a:lnRef idx="2">
+          <a:schemeClr val="accent1"/>
+        </a:lnRef>
+        <a:fillRef idx="0">
+          <a:schemeClr val="accent1"/>
+        </a:fillRef>
+        <a:effectRef idx="1">
+          <a:schemeClr val="accent1"/>
+        </a:effectRef>
+        <a:fontRef idx="minor">
+          <a:schemeClr val="tx1"/>
+        </a:fontRef>
+      </a:style>
+    </a:lnDef>
+  </a:objectDefaults>
+  <a:extraClrSchemeLst/>
+</a:theme>
 </file>
</xml_diff>

<commit_message>
1.write comments in ppt
</commit_message>
<xml_diff>
--- a/PCB/02 Plans & Actuals/2.1_Project Plan/Project Plan_(presentation)v0.1.pptx
+++ b/PCB/02 Plans & Actuals/2.1_Project Plan/Project Plan_(presentation)v0.1.pptx
@@ -121,6 +121,22 @@
       </a:defRPr>
     </a:lvl9pPr>
   </p:defaultTextStyle>
+  <p:extLst>
+    <p:ext uri="{EFAFB233-063F-42B5-8137-9DF3F51BA10A}">
+      <p15:sldGuideLst xmlns:p15="http://schemas.microsoft.com/office/powerpoint/2012/main">
+        <p15:guide id="1" orient="horz" pos="2160">
+          <p15:clr>
+            <a:srgbClr val="A4A3A4"/>
+          </p15:clr>
+        </p15:guide>
+        <p15:guide id="2" pos="2880">
+          <p15:clr>
+            <a:srgbClr val="A4A3A4"/>
+          </p15:clr>
+        </p15:guide>
+      </p15:sldGuideLst>
+    </p:ext>
+  </p:extLst>
 </p:presentation>
 </file>
 
@@ -2600,7 +2616,7 @@
   <dgm:whole/>
   <dgm:extLst>
     <a:ext uri="http://schemas.microsoft.com/office/drawing/2008/diagram">
-      <dsp:dataModelExt xmlns:dsp="http://schemas.microsoft.com/office/drawing/2008/diagram" relId="rId6" minVer="http://schemas.openxmlformats.org/drawingml/2006/diagram"/>
+      <dsp:dataModelExt xmlns:dsp="http://schemas.microsoft.com/office/drawing/2008/diagram" relId="rId7" minVer="http://schemas.openxmlformats.org/drawingml/2006/diagram"/>
     </a:ext>
   </dgm:extLst>
 </dgm:dataModel>
@@ -6765,7 +6781,7 @@
           <a:p>
             <a:fld id="{7963829F-6B89-7C4A-9C99-DC089128B8D4}" type="datetimeFigureOut">
               <a:rPr lang="zh-CN" altLang="en-US" smtClean="0"/>
-              <a:t>14/08/15</a:t>
+              <a:t>2015/8/14</a:t>
             </a:fld>
             <a:endParaRPr lang="en-GB"/>
           </a:p>
@@ -7117,6 +7133,298 @@
 </p:notes>
 </file>
 
+<file path=ppt/notesSlides/notesSlide2.xml><?xml version="1.0" encoding="utf-8"?>
+<p:notes xmlns:a="http://schemas.openxmlformats.org/drawingml/2006/main" xmlns:r="http://schemas.openxmlformats.org/officeDocument/2006/relationships" xmlns:p="http://schemas.openxmlformats.org/presentationml/2006/main">
+  <p:cSld>
+    <p:spTree>
+      <p:nvGrpSpPr>
+        <p:cNvPr id="1" name=""/>
+        <p:cNvGrpSpPr/>
+        <p:nvPr/>
+      </p:nvGrpSpPr>
+      <p:grpSpPr>
+        <a:xfrm>
+          <a:off x="0" y="0"/>
+          <a:ext cx="0" cy="0"/>
+          <a:chOff x="0" y="0"/>
+          <a:chExt cx="0" cy="0"/>
+        </a:xfrm>
+      </p:grpSpPr>
+      <p:sp>
+        <p:nvSpPr>
+          <p:cNvPr id="2" name="幻灯片图像占位符 1"/>
+          <p:cNvSpPr>
+            <a:spLocks noGrp="1" noRot="1" noChangeAspect="1"/>
+          </p:cNvSpPr>
+          <p:nvPr>
+            <p:ph type="sldImg"/>
+          </p:nvPr>
+        </p:nvSpPr>
+        <p:spPr/>
+      </p:sp>
+      <p:sp>
+        <p:nvSpPr>
+          <p:cNvPr id="3" name="备注占位符 2"/>
+          <p:cNvSpPr>
+            <a:spLocks noGrp="1"/>
+          </p:cNvSpPr>
+          <p:nvPr>
+            <p:ph type="body" idx="1"/>
+          </p:nvPr>
+        </p:nvSpPr>
+        <p:spPr/>
+        <p:txBody>
+          <a:bodyPr/>
+          <a:lstStyle/>
+          <a:p>
+            <a:r>
+              <a:rPr lang="en-US" altLang="zh-CN" dirty="0" smtClean="0"/>
+              <a:t>So much about scrum process, let me show you one particular user story which is prioritized</a:t>
+            </a:r>
+            <a:r>
+              <a:rPr lang="en-US" altLang="zh-CN" baseline="0" dirty="0" smtClean="0"/>
+              <a:t> on the top by customers.</a:t>
+            </a:r>
+            <a:endParaRPr lang="zh-CN" altLang="en-US" dirty="0"/>
+          </a:p>
+        </p:txBody>
+      </p:sp>
+      <p:sp>
+        <p:nvSpPr>
+          <p:cNvPr id="4" name="灯片编号占位符 3"/>
+          <p:cNvSpPr>
+            <a:spLocks noGrp="1"/>
+          </p:cNvSpPr>
+          <p:nvPr>
+            <p:ph type="sldNum" sz="quarter" idx="10"/>
+          </p:nvPr>
+        </p:nvSpPr>
+        <p:spPr/>
+        <p:txBody>
+          <a:bodyPr/>
+          <a:lstStyle/>
+          <a:p>
+            <a:fld id="{92C1F5ED-D777-7E43-93E8-E4B53EEB7264}" type="slidenum">
+              <a:rPr lang="en-GB" smtClean="0"/>
+              <a:t>12</a:t>
+            </a:fld>
+            <a:endParaRPr lang="en-GB"/>
+          </a:p>
+        </p:txBody>
+      </p:sp>
+    </p:spTree>
+    <p:extLst>
+      <p:ext uri="{BB962C8B-B14F-4D97-AF65-F5344CB8AC3E}">
+        <p14:creationId xmlns:p14="http://schemas.microsoft.com/office/powerpoint/2010/main" val="593098463"/>
+      </p:ext>
+    </p:extLst>
+  </p:cSld>
+  <p:clrMapOvr>
+    <a:masterClrMapping/>
+  </p:clrMapOvr>
+</p:notes>
+</file>
+
+<file path=ppt/notesSlides/notesSlide3.xml><?xml version="1.0" encoding="utf-8"?>
+<p:notes xmlns:a="http://schemas.openxmlformats.org/drawingml/2006/main" xmlns:r="http://schemas.openxmlformats.org/officeDocument/2006/relationships" xmlns:p="http://schemas.openxmlformats.org/presentationml/2006/main">
+  <p:cSld>
+    <p:spTree>
+      <p:nvGrpSpPr>
+        <p:cNvPr id="1" name=""/>
+        <p:cNvGrpSpPr/>
+        <p:nvPr/>
+      </p:nvGrpSpPr>
+      <p:grpSpPr>
+        <a:xfrm>
+          <a:off x="0" y="0"/>
+          <a:ext cx="0" cy="0"/>
+          <a:chOff x="0" y="0"/>
+          <a:chExt cx="0" cy="0"/>
+        </a:xfrm>
+      </p:grpSpPr>
+      <p:sp>
+        <p:nvSpPr>
+          <p:cNvPr id="2" name="幻灯片图像占位符 1"/>
+          <p:cNvSpPr>
+            <a:spLocks noGrp="1" noRot="1" noChangeAspect="1"/>
+          </p:cNvSpPr>
+          <p:nvPr>
+            <p:ph type="sldImg"/>
+          </p:nvPr>
+        </p:nvSpPr>
+        <p:spPr/>
+      </p:sp>
+      <p:sp>
+        <p:nvSpPr>
+          <p:cNvPr id="3" name="备注占位符 2"/>
+          <p:cNvSpPr>
+            <a:spLocks noGrp="1"/>
+          </p:cNvSpPr>
+          <p:nvPr>
+            <p:ph type="body" idx="1"/>
+          </p:nvPr>
+        </p:nvSpPr>
+        <p:spPr/>
+        <p:txBody>
+          <a:bodyPr/>
+          <a:lstStyle/>
+          <a:p>
+            <a:r>
+              <a:rPr lang="en-US" altLang="zh-CN" dirty="0" smtClean="0"/>
+              <a:t>As</a:t>
+            </a:r>
+            <a:r>
+              <a:rPr lang="en-US" altLang="zh-CN" baseline="0" dirty="0" smtClean="0"/>
+              <a:t> we all know, the phone screen display website in a different way from computer screen.</a:t>
+            </a:r>
+          </a:p>
+          <a:p>
+            <a:r>
+              <a:rPr lang="en-US" altLang="zh-CN" baseline="0" dirty="0" smtClean="0"/>
+              <a:t>The google has stated that they will block the websites which are not suitable for mobile device screen. </a:t>
+            </a:r>
+          </a:p>
+          <a:p>
+            <a:endParaRPr lang="zh-CN" altLang="en-US" dirty="0"/>
+          </a:p>
+        </p:txBody>
+      </p:sp>
+      <p:sp>
+        <p:nvSpPr>
+          <p:cNvPr id="4" name="灯片编号占位符 3"/>
+          <p:cNvSpPr>
+            <a:spLocks noGrp="1"/>
+          </p:cNvSpPr>
+          <p:nvPr>
+            <p:ph type="sldNum" sz="quarter" idx="10"/>
+          </p:nvPr>
+        </p:nvSpPr>
+        <p:spPr/>
+        <p:txBody>
+          <a:bodyPr/>
+          <a:lstStyle/>
+          <a:p>
+            <a:fld id="{92C1F5ED-D777-7E43-93E8-E4B53EEB7264}" type="slidenum">
+              <a:rPr lang="en-GB" smtClean="0"/>
+              <a:t>13</a:t>
+            </a:fld>
+            <a:endParaRPr lang="en-GB"/>
+          </a:p>
+        </p:txBody>
+      </p:sp>
+    </p:spTree>
+    <p:extLst>
+      <p:ext uri="{BB962C8B-B14F-4D97-AF65-F5344CB8AC3E}">
+        <p14:creationId xmlns:p14="http://schemas.microsoft.com/office/powerpoint/2010/main" val="1044956599"/>
+      </p:ext>
+    </p:extLst>
+  </p:cSld>
+  <p:clrMapOvr>
+    <a:masterClrMapping/>
+  </p:clrMapOvr>
+</p:notes>
+</file>
+
+<file path=ppt/notesSlides/notesSlide4.xml><?xml version="1.0" encoding="utf-8"?>
+<p:notes xmlns:a="http://schemas.openxmlformats.org/drawingml/2006/main" xmlns:r="http://schemas.openxmlformats.org/officeDocument/2006/relationships" xmlns:p="http://schemas.openxmlformats.org/presentationml/2006/main">
+  <p:cSld>
+    <p:spTree>
+      <p:nvGrpSpPr>
+        <p:cNvPr id="1" name=""/>
+        <p:cNvGrpSpPr/>
+        <p:nvPr/>
+      </p:nvGrpSpPr>
+      <p:grpSpPr>
+        <a:xfrm>
+          <a:off x="0" y="0"/>
+          <a:ext cx="0" cy="0"/>
+          <a:chOff x="0" y="0"/>
+          <a:chExt cx="0" cy="0"/>
+        </a:xfrm>
+      </p:grpSpPr>
+      <p:sp>
+        <p:nvSpPr>
+          <p:cNvPr id="2" name="幻灯片图像占位符 1"/>
+          <p:cNvSpPr>
+            <a:spLocks noGrp="1" noRot="1" noChangeAspect="1"/>
+          </p:cNvSpPr>
+          <p:nvPr>
+            <p:ph type="sldImg"/>
+          </p:nvPr>
+        </p:nvSpPr>
+        <p:spPr/>
+      </p:sp>
+      <p:sp>
+        <p:nvSpPr>
+          <p:cNvPr id="3" name="备注占位符 2"/>
+          <p:cNvSpPr>
+            <a:spLocks noGrp="1"/>
+          </p:cNvSpPr>
+          <p:nvPr>
+            <p:ph type="body" idx="1"/>
+          </p:nvPr>
+        </p:nvSpPr>
+        <p:spPr/>
+        <p:txBody>
+          <a:bodyPr/>
+          <a:lstStyle/>
+          <a:p>
+            <a:r>
+              <a:rPr lang="en-US" altLang="zh-CN" dirty="0" smtClean="0"/>
+              <a:t>To satisfy</a:t>
+            </a:r>
+            <a:r>
+              <a:rPr lang="en-US" altLang="zh-CN" baseline="0" dirty="0" smtClean="0"/>
+              <a:t> this user story, we need to detect device type and resolution, then calculate the DPI. Last but not least, dynamically change display by CSS.</a:t>
+            </a:r>
+          </a:p>
+          <a:p>
+            <a:r>
+              <a:rPr lang="en-US" altLang="zh-CN" baseline="0" dirty="0" smtClean="0"/>
+              <a:t>We can just use phones or pads to logon this website, check whether the layout changes or not. </a:t>
+            </a:r>
+          </a:p>
+          <a:p>
+            <a:endParaRPr lang="zh-CN" altLang="en-US" dirty="0"/>
+          </a:p>
+        </p:txBody>
+      </p:sp>
+      <p:sp>
+        <p:nvSpPr>
+          <p:cNvPr id="4" name="灯片编号占位符 3"/>
+          <p:cNvSpPr>
+            <a:spLocks noGrp="1"/>
+          </p:cNvSpPr>
+          <p:nvPr>
+            <p:ph type="sldNum" sz="quarter" idx="10"/>
+          </p:nvPr>
+        </p:nvSpPr>
+        <p:spPr/>
+        <p:txBody>
+          <a:bodyPr/>
+          <a:lstStyle/>
+          <a:p>
+            <a:fld id="{92C1F5ED-D777-7E43-93E8-E4B53EEB7264}" type="slidenum">
+              <a:rPr lang="en-GB" smtClean="0"/>
+              <a:t>14</a:t>
+            </a:fld>
+            <a:endParaRPr lang="en-GB"/>
+          </a:p>
+        </p:txBody>
+      </p:sp>
+    </p:spTree>
+    <p:extLst>
+      <p:ext uri="{BB962C8B-B14F-4D97-AF65-F5344CB8AC3E}">
+        <p14:creationId xmlns:p14="http://schemas.microsoft.com/office/powerpoint/2010/main" val="1861740759"/>
+      </p:ext>
+    </p:extLst>
+  </p:cSld>
+  <p:clrMapOvr>
+    <a:masterClrMapping/>
+  </p:clrMapOvr>
+</p:notes>
+</file>
+
 <file path=ppt/slideLayouts/slideLayout1.xml><?xml version="1.0" encoding="utf-8"?>
 <p:sldLayout xmlns:a="http://schemas.openxmlformats.org/drawingml/2006/main" xmlns:r="http://schemas.openxmlformats.org/officeDocument/2006/relationships" xmlns:p="http://schemas.openxmlformats.org/presentationml/2006/main" type="title" preserve="1">
   <p:cSld name="标题幻灯片">
@@ -7151,7 +7459,7 @@
           <a:p>
             <a:fld id="{4251665B-C24A-4702-B522-6A4334602E03}" type="datetimeFigureOut">
               <a:rPr lang="en-US" smtClean="0"/>
-              <a:t>14/08/15</a:t>
+              <a:t>8/14/2015</a:t>
             </a:fld>
             <a:endParaRPr lang="en-US"/>
           </a:p>
@@ -7908,7 +8216,7 @@
           <a:p>
             <a:fld id="{4251665B-C24A-4702-B522-6A4334602E03}" type="datetimeFigureOut">
               <a:rPr lang="en-US" smtClean="0"/>
-              <a:t>14/08/15</a:t>
+              <a:t>8/14/2015</a:t>
             </a:fld>
             <a:endParaRPr lang="en-US"/>
           </a:p>
@@ -8532,7 +8840,7 @@
           <a:p>
             <a:fld id="{4251665B-C24A-4702-B522-6A4334602E03}" type="datetimeFigureOut">
               <a:rPr lang="en-US" smtClean="0"/>
-              <a:t>14/08/15</a:t>
+              <a:t>8/14/2015</a:t>
             </a:fld>
             <a:endParaRPr lang="en-US"/>
           </a:p>
@@ -8955,7 +9263,7 @@
           <a:p>
             <a:fld id="{4251665B-C24A-4702-B522-6A4334602E03}" type="datetimeFigureOut">
               <a:rPr lang="en-US" smtClean="0"/>
-              <a:t>14/08/15</a:t>
+              <a:t>8/14/2015</a:t>
             </a:fld>
             <a:endParaRPr lang="en-US"/>
           </a:p>
@@ -9132,7 +9440,7 @@
           <a:p>
             <a:fld id="{4251665B-C24A-4702-B522-6A4334602E03}" type="datetimeFigureOut">
               <a:rPr lang="en-US" smtClean="0"/>
-              <a:t>14/08/15</a:t>
+              <a:t>8/14/2015</a:t>
             </a:fld>
             <a:endParaRPr lang="en-US"/>
           </a:p>
@@ -9949,7 +10257,7 @@
           <a:p>
             <a:fld id="{4251665B-C24A-4702-B522-6A4334602E03}" type="datetimeFigureOut">
               <a:rPr lang="en-US" smtClean="0"/>
-              <a:t>14/08/15</a:t>
+              <a:t>8/14/2015</a:t>
             </a:fld>
             <a:endParaRPr lang="en-US"/>
           </a:p>
@@ -10460,7 +10768,7 @@
           <a:p>
             <a:fld id="{4251665B-C24A-4702-B522-6A4334602E03}" type="datetimeFigureOut">
               <a:rPr lang="en-US" smtClean="0"/>
-              <a:t>14/08/15</a:t>
+              <a:t>8/14/2015</a:t>
             </a:fld>
             <a:endParaRPr lang="en-US"/>
           </a:p>
@@ -10693,7 +11001,7 @@
           <a:p>
             <a:fld id="{4251665B-C24A-4702-B522-6A4334602E03}" type="datetimeFigureOut">
               <a:rPr lang="en-US" smtClean="0"/>
-              <a:t>14/08/15</a:t>
+              <a:t>8/14/2015</a:t>
             </a:fld>
             <a:endParaRPr lang="en-US"/>
           </a:p>
@@ -10974,7 +11282,7 @@
             <a:fld id="{8D4F3373-90E5-9644-86A6-B3094212B6A5}" type="datetime1">
               <a:rPr lang="zh-CN" altLang="en-US"/>
               <a:pPr/>
-              <a:t>14/08/15</a:t>
+              <a:t>2015/8/14</a:t>
             </a:fld>
             <a:endParaRPr lang="en-US" sz="1800" b="0">
               <a:solidFill>
@@ -11378,7 +11686,7 @@
           <a:p>
             <a:fld id="{4251665B-C24A-4702-B522-6A4334602E03}" type="datetimeFigureOut">
               <a:rPr lang="en-US" smtClean="0"/>
-              <a:t>14/08/15</a:t>
+              <a:t>8/14/2015</a:t>
             </a:fld>
             <a:endParaRPr lang="en-US"/>
           </a:p>
@@ -11513,7 +11821,7 @@
           <a:p>
             <a:fld id="{4251665B-C24A-4702-B522-6A4334602E03}" type="datetimeFigureOut">
               <a:rPr lang="en-US" smtClean="0"/>
-              <a:t>14/08/15</a:t>
+              <a:t>8/14/2015</a:t>
             </a:fld>
             <a:endParaRPr lang="en-US"/>
           </a:p>
@@ -12411,7 +12719,7 @@
           <a:p>
             <a:fld id="{4251665B-C24A-4702-B522-6A4334602E03}" type="datetimeFigureOut">
               <a:rPr lang="en-US" smtClean="0"/>
-              <a:t>14/08/15</a:t>
+              <a:t>8/14/2015</a:t>
             </a:fld>
             <a:endParaRPr lang="en-US"/>
           </a:p>
@@ -12534,7 +12842,7 @@
           <a:p>
             <a:fld id="{4251665B-C24A-4702-B522-6A4334602E03}" type="datetimeFigureOut">
               <a:rPr lang="en-US" smtClean="0"/>
-              <a:t>14/08/15</a:t>
+              <a:t>8/14/2015</a:t>
             </a:fld>
             <a:endParaRPr lang="en-US"/>
           </a:p>
@@ -13418,7 +13726,7 @@
           <a:p>
             <a:fld id="{4251665B-C24A-4702-B522-6A4334602E03}" type="datetimeFigureOut">
               <a:rPr lang="en-US" smtClean="0"/>
-              <a:t>14/08/15</a:t>
+              <a:t>8/14/2015</a:t>
             </a:fld>
             <a:endParaRPr lang="en-US"/>
           </a:p>
@@ -14066,7 +14374,7 @@
           <a:p>
             <a:fld id="{4251665B-C24A-4702-B522-6A4334602E03}" type="datetimeFigureOut">
               <a:rPr lang="en-US" smtClean="0"/>
-              <a:t>14/08/15</a:t>
+              <a:t>8/14/2015</a:t>
             </a:fld>
             <a:endParaRPr lang="en-US"/>
           </a:p>
@@ -14382,7 +14690,7 @@
           <a:p>
             <a:fld id="{4251665B-C24A-4702-B522-6A4334602E03}" type="datetimeFigureOut">
               <a:rPr lang="en-US" smtClean="0"/>
-              <a:t>14/08/15</a:t>
+              <a:t>8/14/2015</a:t>
             </a:fld>
             <a:endParaRPr lang="en-US"/>
           </a:p>
@@ -14472,7 +14780,7 @@
           <a:p>
             <a:fld id="{4251665B-C24A-4702-B522-6A4334602E03}" type="datetimeFigureOut">
               <a:rPr lang="en-US" smtClean="0"/>
-              <a:t>14/08/15</a:t>
+              <a:t>8/14/2015</a:t>
             </a:fld>
             <a:endParaRPr lang="en-US"/>
           </a:p>
@@ -14800,7 +15108,7 @@
           <a:p>
             <a:fld id="{4251665B-C24A-4702-B522-6A4334602E03}" type="datetimeFigureOut">
               <a:rPr lang="en-US" smtClean="0"/>
-              <a:t>14/08/15</a:t>
+              <a:t>8/14/2015</a:t>
             </a:fld>
             <a:endParaRPr lang="en-US"/>
           </a:p>
@@ -15500,14 +15808,14 @@
           <a:effectLst/>
           <a:extLst>
             <a:ext uri="{909E8E84-426E-40dd-AFC4-6F175D3DCCD1}">
-              <a14:hiddenFill xmlns:a14="http://schemas.microsoft.com/office/drawing/2010/main">
+              <a14:hiddenFill xmlns:a14="http://schemas.microsoft.com/office/drawing/2010/main" xmlns="">
                 <a:solidFill>
                   <a:schemeClr val="accent1"/>
                 </a:solidFill>
               </a14:hiddenFill>
             </a:ext>
             <a:ext uri="{91240B29-F687-4f45-9708-019B960494DF}">
-              <a14:hiddenLine xmlns:a14="http://schemas.microsoft.com/office/drawing/2010/main" w="9525">
+              <a14:hiddenLine xmlns:a14="http://schemas.microsoft.com/office/drawing/2010/main" xmlns="" w="9525">
                 <a:solidFill>
                   <a:schemeClr val="tx1"/>
                 </a:solidFill>
@@ -15517,7 +15825,7 @@
               </a14:hiddenLine>
             </a:ext>
             <a:ext uri="{AF507438-7753-43e0-B8FC-AC1667EBCBE1}">
-              <a14:hiddenEffects xmlns:a14="http://schemas.microsoft.com/office/drawing/2010/main">
+              <a14:hiddenEffects xmlns:a14="http://schemas.microsoft.com/office/drawing/2010/main" xmlns="">
                 <a:effectLst>
                   <a:outerShdw dist="35921" dir="2700000" algn="ctr" rotWithShape="0">
                     <a:schemeClr val="bg2"/>
@@ -15664,14 +15972,14 @@
           <a:effectLst/>
           <a:extLst>
             <a:ext uri="{909E8E84-426E-40dd-AFC4-6F175D3DCCD1}">
-              <a14:hiddenFill xmlns:a14="http://schemas.microsoft.com/office/drawing/2010/main">
+              <a14:hiddenFill xmlns:a14="http://schemas.microsoft.com/office/drawing/2010/main" xmlns="">
                 <a:solidFill>
                   <a:schemeClr val="accent1"/>
                 </a:solidFill>
               </a14:hiddenFill>
             </a:ext>
             <a:ext uri="{91240B29-F687-4f45-9708-019B960494DF}">
-              <a14:hiddenLine xmlns:a14="http://schemas.microsoft.com/office/drawing/2010/main" w="9525">
+              <a14:hiddenLine xmlns:a14="http://schemas.microsoft.com/office/drawing/2010/main" xmlns="" w="9525">
                 <a:solidFill>
                   <a:schemeClr val="tx1"/>
                 </a:solidFill>
@@ -15681,7 +15989,7 @@
               </a14:hiddenLine>
             </a:ext>
             <a:ext uri="{AF507438-7753-43e0-B8FC-AC1667EBCBE1}">
-              <a14:hiddenEffects xmlns:a14="http://schemas.microsoft.com/office/drawing/2010/main">
+              <a14:hiddenEffects xmlns:a14="http://schemas.microsoft.com/office/drawing/2010/main" xmlns="">
                 <a:effectLst>
                   <a:outerShdw dist="35921" dir="2700000" algn="ctr" rotWithShape="0">
                     <a:schemeClr val="bg2"/>
@@ -16002,7 +16310,15 @@
           <a:p>
             <a:r>
               <a:rPr lang="en-US" altLang="zh-CN" dirty="0" smtClean="0"/>
-              <a:t>The menu, button, picture and layout may change from PC to phones.</a:t>
+              <a:t>On phones, the </a:t>
+            </a:r>
+            <a:r>
+              <a:rPr lang="en-US" altLang="zh-CN" dirty="0" smtClean="0"/>
+              <a:t>menu, button, picture and layout may change from </a:t>
+            </a:r>
+            <a:r>
+              <a:rPr lang="en-US" altLang="zh-CN" dirty="0" smtClean="0"/>
+              <a:t>what you see on PCs .</a:t>
             </a:r>
             <a:endParaRPr lang="zh-CN" altLang="en-US" dirty="0"/>
           </a:p>
@@ -16017,7 +16333,7 @@
           <p:nvPr/>
         </p:nvPicPr>
         <p:blipFill>
-          <a:blip r:embed="rId2" cstate="email">
+          <a:blip r:embed="rId3" cstate="email">
             <a:extLst>
               <a:ext uri="{28A0092B-C50C-407E-A947-70E740481C1C}">
                 <a14:useLocalDpi xmlns:a14="http://schemas.microsoft.com/office/drawing/2010/main" val="0"/>
@@ -16047,7 +16363,7 @@
           <p:nvPr/>
         </p:nvPicPr>
         <p:blipFill>
-          <a:blip r:embed="rId3" cstate="email">
+          <a:blip r:embed="rId4" cstate="email">
             <a:extLst>
               <a:ext uri="{28A0092B-C50C-407E-A947-70E740481C1C}">
                 <a14:useLocalDpi xmlns:a14="http://schemas.microsoft.com/office/drawing/2010/main" val="0"/>
@@ -16314,7 +16630,7 @@
         </p:xfrm>
         <a:graphic>
           <a:graphicData uri="http://schemas.openxmlformats.org/drawingml/2006/diagram">
-            <dgm:relIds xmlns:dgm="http://schemas.openxmlformats.org/drawingml/2006/diagram" xmlns:r="http://schemas.openxmlformats.org/officeDocument/2006/relationships" r:dm="rId2" r:lo="rId3" r:qs="rId4" r:cs="rId5"/>
+            <dgm:relIds xmlns:dgm="http://schemas.openxmlformats.org/drawingml/2006/diagram" xmlns:r="http://schemas.openxmlformats.org/officeDocument/2006/relationships" r:dm="rId3" r:lo="rId4" r:qs="rId5" r:cs="rId6"/>
           </a:graphicData>
         </a:graphic>
       </p:graphicFrame>
@@ -16374,7 +16690,7 @@
           </a:ln>
           <a:extLst>
             <a:ext uri="{91240B29-F687-4f45-9708-019B960494DF}">
-              <a14:hiddenLine xmlns:a14="http://schemas.microsoft.com/office/drawing/2010/main" w="25400" cap="flat" cmpd="sng">
+              <a14:hiddenLine xmlns:a14="http://schemas.microsoft.com/office/drawing/2010/main" xmlns="" w="25400" cap="flat" cmpd="sng">
                 <a:solidFill>
                   <a:srgbClr val="700000"/>
                 </a:solidFill>
@@ -16438,7 +16754,7 @@
             </a:ln>
             <a:extLst>
               <a:ext uri="{91240B29-F687-4f45-9708-019B960494DF}">
-                <a14:hiddenLine xmlns:a14="http://schemas.microsoft.com/office/drawing/2010/main" w="25400" cap="flat" cmpd="sng">
+                <a14:hiddenLine xmlns:a14="http://schemas.microsoft.com/office/drawing/2010/main" xmlns="" w="25400" cap="flat" cmpd="sng">
                   <a:solidFill>
                     <a:srgbClr val="700000"/>
                   </a:solidFill>
@@ -16486,7 +16802,7 @@
             </a:ln>
             <a:extLst>
               <a:ext uri="{91240B29-F687-4f45-9708-019B960494DF}">
-                <a14:hiddenLine xmlns:a14="http://schemas.microsoft.com/office/drawing/2010/main" w="25400" cap="flat" cmpd="sng">
+                <a14:hiddenLine xmlns:a14="http://schemas.microsoft.com/office/drawing/2010/main" xmlns="" w="25400" cap="flat" cmpd="sng">
                   <a:solidFill>
                     <a:srgbClr val="700000"/>
                   </a:solidFill>
@@ -16534,7 +16850,7 @@
             </a:ln>
             <a:extLst>
               <a:ext uri="{91240B29-F687-4f45-9708-019B960494DF}">
-                <a14:hiddenLine xmlns:a14="http://schemas.microsoft.com/office/drawing/2010/main" w="25400" cap="flat" cmpd="sng">
+                <a14:hiddenLine xmlns:a14="http://schemas.microsoft.com/office/drawing/2010/main" xmlns="" w="25400" cap="flat" cmpd="sng">
                   <a:solidFill>
                     <a:srgbClr val="700000"/>
                   </a:solidFill>
@@ -16593,7 +16909,7 @@
           <p:nvPr/>
         </p:nvPicPr>
         <p:blipFill>
-          <a:blip r:embed="rId2">
+          <a:blip r:embed="rId2" cstate="email">
             <a:extLst>
               <a:ext uri="{28A0092B-C50C-407E-A947-70E740481C1C}">
                 <a14:useLocalDpi xmlns:a14="http://schemas.microsoft.com/office/drawing/2010/main" val="0"/>
@@ -16620,14 +16936,14 @@
           <a:effectLst/>
           <a:extLst>
             <a:ext uri="{909E8E84-426E-40dd-AFC4-6F175D3DCCD1}">
-              <a14:hiddenFill xmlns:a14="http://schemas.microsoft.com/office/drawing/2010/main">
+              <a14:hiddenFill xmlns:a14="http://schemas.microsoft.com/office/drawing/2010/main" xmlns="">
                 <a:solidFill>
                   <a:srgbClr val="FFFFFF"/>
                 </a:solidFill>
               </a14:hiddenFill>
             </a:ext>
             <a:ext uri="{91240B29-F687-4f45-9708-019B960494DF}">
-              <a14:hiddenLine xmlns:a14="http://schemas.microsoft.com/office/drawing/2010/main" w="9525">
+              <a14:hiddenLine xmlns:a14="http://schemas.microsoft.com/office/drawing/2010/main" xmlns="" w="9525">
                 <a:solidFill>
                   <a:srgbClr val="000000"/>
                 </a:solidFill>
@@ -16637,7 +16953,7 @@
               </a14:hiddenLine>
             </a:ext>
             <a:ext uri="{AF507438-7753-43e0-B8FC-AC1667EBCBE1}">
-              <a14:hiddenEffects xmlns:a14="http://schemas.microsoft.com/office/drawing/2010/main">
+              <a14:hiddenEffects xmlns:a14="http://schemas.microsoft.com/office/drawing/2010/main" xmlns="">
                 <a:effectLst>
                   <a:outerShdw blurRad="63500" dist="38099" dir="2700000" algn="ctr" rotWithShape="0">
                     <a:srgbClr val="000000">
@@ -16672,14 +16988,14 @@
           </a:ln>
           <a:extLst>
             <a:ext uri="{909E8E84-426E-40dd-AFC4-6F175D3DCCD1}">
-              <a14:hiddenFill xmlns:a14="http://schemas.microsoft.com/office/drawing/2010/main">
+              <a14:hiddenFill xmlns:a14="http://schemas.microsoft.com/office/drawing/2010/main" xmlns="">
                 <a:solidFill>
                   <a:srgbClr val="FFFFFF"/>
                 </a:solidFill>
               </a14:hiddenFill>
             </a:ext>
             <a:ext uri="{91240B29-F687-4f45-9708-019B960494DF}">
-              <a14:hiddenLine xmlns:a14="http://schemas.microsoft.com/office/drawing/2010/main" w="9525">
+              <a14:hiddenLine xmlns:a14="http://schemas.microsoft.com/office/drawing/2010/main" xmlns="" w="9525">
                 <a:solidFill>
                   <a:srgbClr val="000000"/>
                 </a:solidFill>
@@ -16940,7 +17256,7 @@
   <p:timing>
     <p:tnLst>
       <p:par>
-        <p:cTn xmlns:p14="http://schemas.microsoft.com/office/powerpoint/2010/main" id="1" dur="indefinite" restart="never" nodeType="tmRoot"/>
+        <p:cTn id="1" dur="indefinite" restart="never" nodeType="tmRoot"/>
       </p:par>
     </p:tnLst>
   </p:timing>
@@ -17480,7 +17796,7 @@
           <a:noFill/>
           <a:extLst>
             <a:ext uri="{909E8E84-426E-40dd-AFC4-6F175D3DCCD1}">
-              <a14:hiddenFill xmlns:a14="http://schemas.microsoft.com/office/drawing/2010/main">
+              <a14:hiddenFill xmlns:a14="http://schemas.microsoft.com/office/drawing/2010/main" xmlns="">
                 <a:solidFill>
                   <a:srgbClr val="FFFFFF"/>
                 </a:solidFill>
@@ -17549,7 +17865,7 @@
   <p:timing>
     <p:tnLst>
       <p:par>
-        <p:cTn xmlns:p14="http://schemas.microsoft.com/office/powerpoint/2010/main" id="1" dur="indefinite" restart="never" nodeType="tmRoot"/>
+        <p:cTn id="1" dur="indefinite" restart="never" nodeType="tmRoot"/>
       </p:par>
     </p:tnLst>
   </p:timing>
@@ -17800,7 +18116,7 @@
   <p:timing>
     <p:tnLst>
       <p:par>
-        <p:cTn xmlns:p14="http://schemas.microsoft.com/office/powerpoint/2010/main" id="1" dur="indefinite" restart="never" nodeType="tmRoot"/>
+        <p:cTn id="1" dur="indefinite" restart="never" nodeType="tmRoot"/>
       </p:par>
     </p:tnLst>
   </p:timing>
@@ -18444,14 +18760,14 @@
           <a:effectLst/>
           <a:extLst>
             <a:ext uri="{909E8E84-426E-40dd-AFC4-6F175D3DCCD1}">
-              <a14:hiddenFill xmlns:a14="http://schemas.microsoft.com/office/drawing/2010/main">
+              <a14:hiddenFill xmlns:a14="http://schemas.microsoft.com/office/drawing/2010/main" xmlns="">
                 <a:solidFill>
                   <a:schemeClr val="accent1"/>
                 </a:solidFill>
               </a14:hiddenFill>
             </a:ext>
             <a:ext uri="{91240B29-F687-4f45-9708-019B960494DF}">
-              <a14:hiddenLine xmlns:a14="http://schemas.microsoft.com/office/drawing/2010/main" w="9525">
+              <a14:hiddenLine xmlns:a14="http://schemas.microsoft.com/office/drawing/2010/main" xmlns="" w="9525">
                 <a:solidFill>
                   <a:schemeClr val="tx1"/>
                 </a:solidFill>
@@ -18461,7 +18777,7 @@
               </a14:hiddenLine>
             </a:ext>
             <a:ext uri="{AF507438-7753-43e0-B8FC-AC1667EBCBE1}">
-              <a14:hiddenEffects xmlns:a14="http://schemas.microsoft.com/office/drawing/2010/main">
+              <a14:hiddenEffects xmlns:a14="http://schemas.microsoft.com/office/drawing/2010/main" xmlns="">
                 <a:effectLst>
                   <a:outerShdw dist="35921" dir="2700000" algn="ctr" rotWithShape="0">
                     <a:schemeClr val="bg2"/>

</xml_diff>